<commit_message>
Wrote outline into slides as prep
</commit_message>
<xml_diff>
--- a/ES data project presentation_salmon diet.pptx
+++ b/ES data project presentation_salmon diet.pptx
@@ -5,15 +5,19 @@
     <p:sldMasterId id="2147483648" r:id="rId1"/>
   </p:sldMasterIdLst>
   <p:notesMasterIdLst>
-    <p:notesMasterId r:id="rId8"/>
+    <p:notesMasterId r:id="rId12"/>
   </p:notesMasterIdLst>
   <p:sldIdLst>
     <p:sldId id="256" r:id="rId2"/>
     <p:sldId id="257" r:id="rId3"/>
     <p:sldId id="258" r:id="rId4"/>
-    <p:sldId id="259" r:id="rId5"/>
-    <p:sldId id="260" r:id="rId6"/>
-    <p:sldId id="261" r:id="rId7"/>
+    <p:sldId id="263" r:id="rId5"/>
+    <p:sldId id="259" r:id="rId6"/>
+    <p:sldId id="265" r:id="rId7"/>
+    <p:sldId id="260" r:id="rId8"/>
+    <p:sldId id="266" r:id="rId9"/>
+    <p:sldId id="261" r:id="rId10"/>
+    <p:sldId id="264" r:id="rId11"/>
   </p:sldIdLst>
   <p:sldSz cx="12192000" cy="6858000"/>
   <p:notesSz cx="6858000" cy="9144000"/>
@@ -120,9 +124,13 @@
             <p14:sldId id="256"/>
             <p14:sldId id="257"/>
             <p14:sldId id="258"/>
+            <p14:sldId id="263"/>
             <p14:sldId id="259"/>
+            <p14:sldId id="265"/>
             <p14:sldId id="260"/>
+            <p14:sldId id="266"/>
             <p14:sldId id="261"/>
+            <p14:sldId id="264"/>
           </p14:sldIdLst>
         </p14:section>
       </p14:sectionLst>
@@ -227,7 +235,7 @@
           <a:p>
             <a:fld id="{EE49B232-0CCD-EA45-8373-748F71E32B73}" type="datetimeFigureOut">
               <a:rPr lang="en-US" smtClean="0"/>
-              <a:t>4/1/20</a:t>
+              <a:t>4/5/2020</a:t>
             </a:fld>
             <a:endParaRPr lang="en-US"/>
           </a:p>
@@ -805,7 +813,7 @@
           <a:p>
             <a:fld id="{3E52D604-0742-9243-810E-1096192DBA15}" type="datetimeFigureOut">
               <a:rPr lang="en-US" smtClean="0"/>
-              <a:t>4/1/20</a:t>
+              <a:t>4/5/2020</a:t>
             </a:fld>
             <a:endParaRPr lang="en-US"/>
           </a:p>
@@ -1003,7 +1011,7 @@
           <a:p>
             <a:fld id="{3E52D604-0742-9243-810E-1096192DBA15}" type="datetimeFigureOut">
               <a:rPr lang="en-US" smtClean="0"/>
-              <a:t>4/1/20</a:t>
+              <a:t>4/5/2020</a:t>
             </a:fld>
             <a:endParaRPr lang="en-US"/>
           </a:p>
@@ -1211,7 +1219,7 @@
           <a:p>
             <a:fld id="{3E52D604-0742-9243-810E-1096192DBA15}" type="datetimeFigureOut">
               <a:rPr lang="en-US" smtClean="0"/>
-              <a:t>4/1/20</a:t>
+              <a:t>4/5/2020</a:t>
             </a:fld>
             <a:endParaRPr lang="en-US"/>
           </a:p>
@@ -1409,7 +1417,7 @@
           <a:p>
             <a:fld id="{3E52D604-0742-9243-810E-1096192DBA15}" type="datetimeFigureOut">
               <a:rPr lang="en-US" smtClean="0"/>
-              <a:t>4/1/20</a:t>
+              <a:t>4/5/2020</a:t>
             </a:fld>
             <a:endParaRPr lang="en-US"/>
           </a:p>
@@ -1684,7 +1692,7 @@
           <a:p>
             <a:fld id="{3E52D604-0742-9243-810E-1096192DBA15}" type="datetimeFigureOut">
               <a:rPr lang="en-US" smtClean="0"/>
-              <a:t>4/1/20</a:t>
+              <a:t>4/5/2020</a:t>
             </a:fld>
             <a:endParaRPr lang="en-US"/>
           </a:p>
@@ -1949,7 +1957,7 @@
           <a:p>
             <a:fld id="{3E52D604-0742-9243-810E-1096192DBA15}" type="datetimeFigureOut">
               <a:rPr lang="en-US" smtClean="0"/>
-              <a:t>4/1/20</a:t>
+              <a:t>4/5/2020</a:t>
             </a:fld>
             <a:endParaRPr lang="en-US"/>
           </a:p>
@@ -2361,7 +2369,7 @@
           <a:p>
             <a:fld id="{3E52D604-0742-9243-810E-1096192DBA15}" type="datetimeFigureOut">
               <a:rPr lang="en-US" smtClean="0"/>
-              <a:t>4/1/20</a:t>
+              <a:t>4/5/2020</a:t>
             </a:fld>
             <a:endParaRPr lang="en-US"/>
           </a:p>
@@ -2502,7 +2510,7 @@
           <a:p>
             <a:fld id="{3E52D604-0742-9243-810E-1096192DBA15}" type="datetimeFigureOut">
               <a:rPr lang="en-US" smtClean="0"/>
-              <a:t>4/1/20</a:t>
+              <a:t>4/5/2020</a:t>
             </a:fld>
             <a:endParaRPr lang="en-US"/>
           </a:p>
@@ -2615,7 +2623,7 @@
           <a:p>
             <a:fld id="{3E52D604-0742-9243-810E-1096192DBA15}" type="datetimeFigureOut">
               <a:rPr lang="en-US" smtClean="0"/>
-              <a:t>4/1/20</a:t>
+              <a:t>4/5/2020</a:t>
             </a:fld>
             <a:endParaRPr lang="en-US"/>
           </a:p>
@@ -2926,7 +2934,7 @@
           <a:p>
             <a:fld id="{3E52D604-0742-9243-810E-1096192DBA15}" type="datetimeFigureOut">
               <a:rPr lang="en-US" smtClean="0"/>
-              <a:t>4/1/20</a:t>
+              <a:t>4/5/2020</a:t>
             </a:fld>
             <a:endParaRPr lang="en-US"/>
           </a:p>
@@ -3214,7 +3222,7 @@
           <a:p>
             <a:fld id="{3E52D604-0742-9243-810E-1096192DBA15}" type="datetimeFigureOut">
               <a:rPr lang="en-US" smtClean="0"/>
-              <a:t>4/1/20</a:t>
+              <a:t>4/5/2020</a:t>
             </a:fld>
             <a:endParaRPr lang="en-US"/>
           </a:p>
@@ -3455,7 +3463,7 @@
           <a:p>
             <a:fld id="{3E52D604-0742-9243-810E-1096192DBA15}" type="datetimeFigureOut">
               <a:rPr lang="en-US" smtClean="0"/>
-              <a:t>4/1/20</a:t>
+              <a:t>4/5/2020</a:t>
             </a:fld>
             <a:endParaRPr lang="en-US"/>
           </a:p>
@@ -4089,6 +4097,110 @@
 </p:sld>
 </file>
 
+<file path=ppt/slides/slide10.xml><?xml version="1.0" encoding="utf-8"?>
+<p:sld xmlns:a="http://schemas.openxmlformats.org/drawingml/2006/main" xmlns:r="http://schemas.openxmlformats.org/officeDocument/2006/relationships" xmlns:p="http://schemas.openxmlformats.org/presentationml/2006/main">
+  <p:cSld>
+    <p:spTree>
+      <p:nvGrpSpPr>
+        <p:cNvPr id="1" name=""/>
+        <p:cNvGrpSpPr/>
+        <p:nvPr/>
+      </p:nvGrpSpPr>
+      <p:grpSpPr>
+        <a:xfrm>
+          <a:off x="0" y="0"/>
+          <a:ext cx="0" cy="0"/>
+          <a:chOff x="0" y="0"/>
+          <a:chExt cx="0" cy="0"/>
+        </a:xfrm>
+      </p:grpSpPr>
+      <p:sp>
+        <p:nvSpPr>
+          <p:cNvPr id="2" name="Title 1">
+            <a:extLst>
+              <a:ext uri="{FF2B5EF4-FFF2-40B4-BE49-F238E27FC236}">
+                <a16:creationId xmlns:a16="http://schemas.microsoft.com/office/drawing/2014/main" id="{32F013EC-885D-48FC-97AF-EA861EA43DDB}"/>
+              </a:ext>
+            </a:extLst>
+          </p:cNvPr>
+          <p:cNvSpPr>
+            <a:spLocks noGrp="1"/>
+          </p:cNvSpPr>
+          <p:nvPr>
+            <p:ph type="title"/>
+          </p:nvPr>
+        </p:nvSpPr>
+        <p:spPr/>
+        <p:txBody>
+          <a:bodyPr/>
+          <a:lstStyle/>
+          <a:p>
+            <a:r>
+              <a:rPr lang="en-CA" dirty="0"/>
+              <a:t>Checklist</a:t>
+            </a:r>
+          </a:p>
+        </p:txBody>
+      </p:sp>
+      <p:sp>
+        <p:nvSpPr>
+          <p:cNvPr id="3" name="Content Placeholder 2">
+            <a:extLst>
+              <a:ext uri="{FF2B5EF4-FFF2-40B4-BE49-F238E27FC236}">
+                <a16:creationId xmlns:a16="http://schemas.microsoft.com/office/drawing/2014/main" id="{83895A00-7982-4E95-82C2-C49F273FBD45}"/>
+              </a:ext>
+            </a:extLst>
+          </p:cNvPr>
+          <p:cNvSpPr>
+            <a:spLocks noGrp="1"/>
+          </p:cNvSpPr>
+          <p:nvPr>
+            <p:ph idx="1"/>
+          </p:nvPr>
+        </p:nvSpPr>
+        <p:spPr/>
+        <p:txBody>
+          <a:bodyPr/>
+          <a:lstStyle/>
+          <a:p>
+            <a:r>
+              <a:rPr lang="en-CA" dirty="0"/>
+              <a:t>PDF file</a:t>
+            </a:r>
+          </a:p>
+          <a:p>
+            <a:r>
+              <a:rPr lang="en-CA" dirty="0"/>
+              <a:t>10 slides max</a:t>
+            </a:r>
+          </a:p>
+          <a:p>
+            <a:r>
+              <a:rPr lang="en-CA" dirty="0"/>
+              <a:t>2 slides of plots min</a:t>
+            </a:r>
+          </a:p>
+          <a:p>
+            <a:r>
+              <a:rPr lang="en-CA" dirty="0"/>
+              <a:t>Complete sentences</a:t>
+            </a:r>
+          </a:p>
+        </p:txBody>
+      </p:sp>
+    </p:spTree>
+    <p:extLst>
+      <p:ext uri="{BB962C8B-B14F-4D97-AF65-F5344CB8AC3E}">
+        <p14:creationId xmlns:p14="http://schemas.microsoft.com/office/powerpoint/2010/main" val="1894726509"/>
+      </p:ext>
+    </p:extLst>
+  </p:cSld>
+  <p:clrMapOvr>
+    <a:masterClrMapping/>
+  </p:clrMapOvr>
+</p:sld>
+</file>
+
 <file path=ppt/slides/slide2.xml><?xml version="1.0" encoding="utf-8"?>
 <p:sld xmlns:a="http://schemas.openxmlformats.org/drawingml/2006/main" xmlns:r="http://schemas.openxmlformats.org/officeDocument/2006/relationships" xmlns:p="http://schemas.openxmlformats.org/presentationml/2006/main">
   <p:cSld>
@@ -4155,7 +4267,16 @@
           <a:bodyPr/>
           <a:lstStyle/>
           <a:p>
-            <a:endParaRPr lang="en-US"/>
+            <a:r>
+              <a:rPr lang="en-US" dirty="0"/>
+              <a:t>Research question</a:t>
+            </a:r>
+          </a:p>
+          <a:p>
+            <a:r>
+              <a:rPr lang="en-US" dirty="0"/>
+              <a:t>Hypotheses</a:t>
+            </a:r>
           </a:p>
         </p:txBody>
       </p:sp>
@@ -4238,7 +4359,25 @@
           <a:bodyPr/>
           <a:lstStyle/>
           <a:p>
-            <a:endParaRPr lang="en-US"/>
+            <a:r>
+              <a:rPr lang="en-US" dirty="0"/>
+              <a:t>Data collection</a:t>
+            </a:r>
+          </a:p>
+          <a:p>
+            <a:r>
+              <a:rPr lang="en-US" dirty="0"/>
+              <a:t>Response variable</a:t>
+            </a:r>
+          </a:p>
+          <a:p>
+            <a:r>
+              <a:rPr lang="en-US" dirty="0"/>
+              <a:t>Explanatory variables</a:t>
+            </a:r>
+          </a:p>
+          <a:p>
+            <a:endParaRPr lang="en-US" dirty="0"/>
           </a:p>
         </p:txBody>
       </p:sp>
@@ -4277,7 +4416,7 @@
           <p:cNvPr id="2" name="Title 1">
             <a:extLst>
               <a:ext uri="{FF2B5EF4-FFF2-40B4-BE49-F238E27FC236}">
-                <a16:creationId xmlns:a16="http://schemas.microsoft.com/office/drawing/2014/main" id="{EEC0E0E7-F8E7-9B44-94E4-CF9B05CC2C9C}"/>
+                <a16:creationId xmlns:a16="http://schemas.microsoft.com/office/drawing/2014/main" id="{009AAB2C-76D9-5E41-96F9-AD241258A499}"/>
               </a:ext>
             </a:extLst>
           </p:cNvPr>
@@ -4295,7 +4434,7 @@
           <a:p>
             <a:r>
               <a:rPr lang="en-US" dirty="0"/>
-              <a:t>Statistical Methods</a:t>
+              <a:t>Description of Data</a:t>
             </a:r>
           </a:p>
         </p:txBody>
@@ -4305,7 +4444,7 @@
           <p:cNvPr id="3" name="Content Placeholder 2">
             <a:extLst>
               <a:ext uri="{FF2B5EF4-FFF2-40B4-BE49-F238E27FC236}">
-                <a16:creationId xmlns:a16="http://schemas.microsoft.com/office/drawing/2014/main" id="{90558E49-E018-6C42-863E-8CEB33A15802}"/>
+                <a16:creationId xmlns:a16="http://schemas.microsoft.com/office/drawing/2014/main" id="{ADAB7883-B5EF-3148-B8CF-B82BB0A4E499}"/>
               </a:ext>
             </a:extLst>
           </p:cNvPr>
@@ -4321,14 +4460,17 @@
           <a:bodyPr/>
           <a:lstStyle/>
           <a:p>
-            <a:endParaRPr lang="en-US"/>
+            <a:r>
+              <a:rPr lang="en-US" dirty="0"/>
+              <a:t>Plot “key features of dataset” using all data or a subset</a:t>
+            </a:r>
           </a:p>
         </p:txBody>
       </p:sp>
     </p:spTree>
     <p:extLst>
       <p:ext uri="{BB962C8B-B14F-4D97-AF65-F5344CB8AC3E}">
-        <p14:creationId xmlns:p14="http://schemas.microsoft.com/office/powerpoint/2010/main" val="4234275737"/>
+        <p14:creationId xmlns:p14="http://schemas.microsoft.com/office/powerpoint/2010/main" val="3857065462"/>
       </p:ext>
     </p:extLst>
   </p:cSld>
@@ -4360,7 +4502,7 @@
           <p:cNvPr id="2" name="Title 1">
             <a:extLst>
               <a:ext uri="{FF2B5EF4-FFF2-40B4-BE49-F238E27FC236}">
-                <a16:creationId xmlns:a16="http://schemas.microsoft.com/office/drawing/2014/main" id="{3AAFA8B7-F65A-4144-B8CA-2814837B984F}"/>
+                <a16:creationId xmlns:a16="http://schemas.microsoft.com/office/drawing/2014/main" id="{EEC0E0E7-F8E7-9B44-94E4-CF9B05CC2C9C}"/>
               </a:ext>
             </a:extLst>
           </p:cNvPr>
@@ -4378,7 +4520,7 @@
           <a:p>
             <a:r>
               <a:rPr lang="en-US" dirty="0"/>
-              <a:t>Results</a:t>
+              <a:t>Statistical Methods</a:t>
             </a:r>
           </a:p>
         </p:txBody>
@@ -4388,7 +4530,7 @@
           <p:cNvPr id="3" name="Content Placeholder 2">
             <a:extLst>
               <a:ext uri="{FF2B5EF4-FFF2-40B4-BE49-F238E27FC236}">
-                <a16:creationId xmlns:a16="http://schemas.microsoft.com/office/drawing/2014/main" id="{EF9DCC9C-FAF5-CB4C-830C-27537C7ECA6F}"/>
+                <a16:creationId xmlns:a16="http://schemas.microsoft.com/office/drawing/2014/main" id="{90558E49-E018-6C42-863E-8CEB33A15802}"/>
               </a:ext>
             </a:extLst>
           </p:cNvPr>
@@ -4404,14 +4546,35 @@
           <a:bodyPr/>
           <a:lstStyle/>
           <a:p>
-            <a:endParaRPr lang="en-US"/>
+            <a:r>
+              <a:rPr lang="en-US" dirty="0"/>
+              <a:t>What kind of model</a:t>
+            </a:r>
+          </a:p>
+          <a:p>
+            <a:r>
+              <a:rPr lang="en-US" dirty="0"/>
+              <a:t>Why</a:t>
+            </a:r>
+          </a:p>
+          <a:p>
+            <a:r>
+              <a:rPr lang="en-US" dirty="0"/>
+              <a:t>Probability distribution for response</a:t>
+            </a:r>
+          </a:p>
+          <a:p>
+            <a:r>
+              <a:rPr lang="en-US" dirty="0"/>
+              <a:t>Random effects and non-independence</a:t>
+            </a:r>
           </a:p>
         </p:txBody>
       </p:sp>
     </p:spTree>
     <p:extLst>
       <p:ext uri="{BB962C8B-B14F-4D97-AF65-F5344CB8AC3E}">
-        <p14:creationId xmlns:p14="http://schemas.microsoft.com/office/powerpoint/2010/main" val="1633210933"/>
+        <p14:creationId xmlns:p14="http://schemas.microsoft.com/office/powerpoint/2010/main" val="4234275737"/>
       </p:ext>
     </p:extLst>
   </p:cSld>
@@ -4443,6 +4606,178 @@
           <p:cNvPr id="2" name="Title 1">
             <a:extLst>
               <a:ext uri="{FF2B5EF4-FFF2-40B4-BE49-F238E27FC236}">
+                <a16:creationId xmlns:a16="http://schemas.microsoft.com/office/drawing/2014/main" id="{3AAFA8B7-F65A-4144-B8CA-2814837B984F}"/>
+              </a:ext>
+            </a:extLst>
+          </p:cNvPr>
+          <p:cNvSpPr>
+            <a:spLocks noGrp="1"/>
+          </p:cNvSpPr>
+          <p:nvPr>
+            <p:ph type="title"/>
+          </p:nvPr>
+        </p:nvSpPr>
+        <p:spPr/>
+        <p:txBody>
+          <a:bodyPr/>
+          <a:lstStyle/>
+          <a:p>
+            <a:r>
+              <a:rPr lang="en-US" dirty="0"/>
+              <a:t>Results</a:t>
+            </a:r>
+          </a:p>
+        </p:txBody>
+      </p:sp>
+      <p:sp>
+        <p:nvSpPr>
+          <p:cNvPr id="3" name="Content Placeholder 2">
+            <a:extLst>
+              <a:ext uri="{FF2B5EF4-FFF2-40B4-BE49-F238E27FC236}">
+                <a16:creationId xmlns:a16="http://schemas.microsoft.com/office/drawing/2014/main" id="{EF9DCC9C-FAF5-CB4C-830C-27537C7ECA6F}"/>
+              </a:ext>
+            </a:extLst>
+          </p:cNvPr>
+          <p:cNvSpPr>
+            <a:spLocks noGrp="1"/>
+          </p:cNvSpPr>
+          <p:nvPr>
+            <p:ph idx="1"/>
+          </p:nvPr>
+        </p:nvSpPr>
+        <p:spPr/>
+        <p:txBody>
+          <a:bodyPr/>
+          <a:lstStyle/>
+          <a:p>
+            <a:r>
+              <a:rPr lang="en-US" dirty="0"/>
+              <a:t>Plot “response relative to explanatory with model”</a:t>
+            </a:r>
+          </a:p>
+        </p:txBody>
+      </p:sp>
+    </p:spTree>
+    <p:extLst>
+      <p:ext uri="{BB962C8B-B14F-4D97-AF65-F5344CB8AC3E}">
+        <p14:creationId xmlns:p14="http://schemas.microsoft.com/office/powerpoint/2010/main" val="2154362521"/>
+      </p:ext>
+    </p:extLst>
+  </p:cSld>
+  <p:clrMapOvr>
+    <a:masterClrMapping/>
+  </p:clrMapOvr>
+</p:sld>
+</file>
+
+<file path=ppt/slides/slide7.xml><?xml version="1.0" encoding="utf-8"?>
+<p:sld xmlns:a="http://schemas.openxmlformats.org/drawingml/2006/main" xmlns:r="http://schemas.openxmlformats.org/officeDocument/2006/relationships" xmlns:p="http://schemas.openxmlformats.org/presentationml/2006/main">
+  <p:cSld>
+    <p:spTree>
+      <p:nvGrpSpPr>
+        <p:cNvPr id="1" name=""/>
+        <p:cNvGrpSpPr/>
+        <p:nvPr/>
+      </p:nvGrpSpPr>
+      <p:grpSpPr>
+        <a:xfrm>
+          <a:off x="0" y="0"/>
+          <a:ext cx="0" cy="0"/>
+          <a:chOff x="0" y="0"/>
+          <a:chExt cx="0" cy="0"/>
+        </a:xfrm>
+      </p:grpSpPr>
+      <p:sp>
+        <p:nvSpPr>
+          <p:cNvPr id="2" name="Title 1">
+            <a:extLst>
+              <a:ext uri="{FF2B5EF4-FFF2-40B4-BE49-F238E27FC236}">
+                <a16:creationId xmlns:a16="http://schemas.microsoft.com/office/drawing/2014/main" id="{3AAFA8B7-F65A-4144-B8CA-2814837B984F}"/>
+              </a:ext>
+            </a:extLst>
+          </p:cNvPr>
+          <p:cNvSpPr>
+            <a:spLocks noGrp="1"/>
+          </p:cNvSpPr>
+          <p:nvPr>
+            <p:ph type="title"/>
+          </p:nvPr>
+        </p:nvSpPr>
+        <p:spPr/>
+        <p:txBody>
+          <a:bodyPr/>
+          <a:lstStyle/>
+          <a:p>
+            <a:r>
+              <a:rPr lang="en-US" dirty="0"/>
+              <a:t>Results</a:t>
+            </a:r>
+          </a:p>
+        </p:txBody>
+      </p:sp>
+      <p:sp>
+        <p:nvSpPr>
+          <p:cNvPr id="3" name="Content Placeholder 2">
+            <a:extLst>
+              <a:ext uri="{FF2B5EF4-FFF2-40B4-BE49-F238E27FC236}">
+                <a16:creationId xmlns:a16="http://schemas.microsoft.com/office/drawing/2014/main" id="{EF9DCC9C-FAF5-CB4C-830C-27537C7ECA6F}"/>
+              </a:ext>
+            </a:extLst>
+          </p:cNvPr>
+          <p:cNvSpPr>
+            <a:spLocks noGrp="1"/>
+          </p:cNvSpPr>
+          <p:nvPr>
+            <p:ph idx="1"/>
+          </p:nvPr>
+        </p:nvSpPr>
+        <p:spPr/>
+        <p:txBody>
+          <a:bodyPr/>
+          <a:lstStyle/>
+          <a:p>
+            <a:r>
+              <a:rPr lang="en-US" dirty="0"/>
+              <a:t>In the context of results and hypotheses</a:t>
+            </a:r>
+          </a:p>
+        </p:txBody>
+      </p:sp>
+    </p:spTree>
+    <p:extLst>
+      <p:ext uri="{BB962C8B-B14F-4D97-AF65-F5344CB8AC3E}">
+        <p14:creationId xmlns:p14="http://schemas.microsoft.com/office/powerpoint/2010/main" val="1633210933"/>
+      </p:ext>
+    </p:extLst>
+  </p:cSld>
+  <p:clrMapOvr>
+    <a:masterClrMapping/>
+  </p:clrMapOvr>
+</p:sld>
+</file>
+
+<file path=ppt/slides/slide8.xml><?xml version="1.0" encoding="utf-8"?>
+<p:sld xmlns:a="http://schemas.openxmlformats.org/drawingml/2006/main" xmlns:r="http://schemas.openxmlformats.org/officeDocument/2006/relationships" xmlns:p="http://schemas.openxmlformats.org/presentationml/2006/main">
+  <p:cSld>
+    <p:spTree>
+      <p:nvGrpSpPr>
+        <p:cNvPr id="1" name=""/>
+        <p:cNvGrpSpPr/>
+        <p:nvPr/>
+      </p:nvGrpSpPr>
+      <p:grpSpPr>
+        <a:xfrm>
+          <a:off x="0" y="0"/>
+          <a:ext cx="0" cy="0"/>
+          <a:chOff x="0" y="0"/>
+          <a:chExt cx="0" cy="0"/>
+        </a:xfrm>
+      </p:grpSpPr>
+      <p:sp>
+        <p:nvSpPr>
+          <p:cNvPr id="2" name="Title 1">
+            <a:extLst>
+              <a:ext uri="{FF2B5EF4-FFF2-40B4-BE49-F238E27FC236}">
                 <a16:creationId xmlns:a16="http://schemas.microsoft.com/office/drawing/2014/main" id="{5486FC29-4DE0-2945-8D76-00CE391102A3}"/>
               </a:ext>
             </a:extLst>
@@ -4487,7 +4822,102 @@
           <a:bodyPr/>
           <a:lstStyle/>
           <a:p>
-            <a:endParaRPr lang="en-US"/>
+            <a:r>
+              <a:rPr lang="en-US" dirty="0"/>
+              <a:t>Limitations to data analysis approach</a:t>
+            </a:r>
+          </a:p>
+        </p:txBody>
+      </p:sp>
+    </p:spTree>
+    <p:extLst>
+      <p:ext uri="{BB962C8B-B14F-4D97-AF65-F5344CB8AC3E}">
+        <p14:creationId xmlns:p14="http://schemas.microsoft.com/office/powerpoint/2010/main" val="2666073596"/>
+      </p:ext>
+    </p:extLst>
+  </p:cSld>
+  <p:clrMapOvr>
+    <a:masterClrMapping/>
+  </p:clrMapOvr>
+</p:sld>
+</file>
+
+<file path=ppt/slides/slide9.xml><?xml version="1.0" encoding="utf-8"?>
+<p:sld xmlns:a="http://schemas.openxmlformats.org/drawingml/2006/main" xmlns:r="http://schemas.openxmlformats.org/officeDocument/2006/relationships" xmlns:p="http://schemas.openxmlformats.org/presentationml/2006/main">
+  <p:cSld>
+    <p:spTree>
+      <p:nvGrpSpPr>
+        <p:cNvPr id="1" name=""/>
+        <p:cNvGrpSpPr/>
+        <p:nvPr/>
+      </p:nvGrpSpPr>
+      <p:grpSpPr>
+        <a:xfrm>
+          <a:off x="0" y="0"/>
+          <a:ext cx="0" cy="0"/>
+          <a:chOff x="0" y="0"/>
+          <a:chExt cx="0" cy="0"/>
+        </a:xfrm>
+      </p:grpSpPr>
+      <p:sp>
+        <p:nvSpPr>
+          <p:cNvPr id="2" name="Title 1">
+            <a:extLst>
+              <a:ext uri="{FF2B5EF4-FFF2-40B4-BE49-F238E27FC236}">
+                <a16:creationId xmlns:a16="http://schemas.microsoft.com/office/drawing/2014/main" id="{5486FC29-4DE0-2945-8D76-00CE391102A3}"/>
+              </a:ext>
+            </a:extLst>
+          </p:cNvPr>
+          <p:cNvSpPr>
+            <a:spLocks noGrp="1"/>
+          </p:cNvSpPr>
+          <p:nvPr>
+            <p:ph type="title"/>
+          </p:nvPr>
+        </p:nvSpPr>
+        <p:spPr/>
+        <p:txBody>
+          <a:bodyPr/>
+          <a:lstStyle/>
+          <a:p>
+            <a:r>
+              <a:rPr lang="en-US" dirty="0"/>
+              <a:t>Discussion</a:t>
+            </a:r>
+          </a:p>
+        </p:txBody>
+      </p:sp>
+      <p:sp>
+        <p:nvSpPr>
+          <p:cNvPr id="3" name="Content Placeholder 2">
+            <a:extLst>
+              <a:ext uri="{FF2B5EF4-FFF2-40B4-BE49-F238E27FC236}">
+                <a16:creationId xmlns:a16="http://schemas.microsoft.com/office/drawing/2014/main" id="{E5C8EA41-AC53-CD4C-9EA9-0760B2BBB009}"/>
+              </a:ext>
+            </a:extLst>
+          </p:cNvPr>
+          <p:cNvSpPr>
+            <a:spLocks noGrp="1"/>
+          </p:cNvSpPr>
+          <p:nvPr>
+            <p:ph idx="1"/>
+          </p:nvPr>
+        </p:nvSpPr>
+        <p:spPr/>
+        <p:txBody>
+          <a:bodyPr/>
+          <a:lstStyle/>
+          <a:p>
+            <a:r>
+              <a:rPr lang="en-US" dirty="0"/>
+              <a:t>Results in context of existing knowledge</a:t>
+            </a:r>
+          </a:p>
+          <a:p>
+            <a:r>
+              <a:rPr lang="en-US" dirty="0"/>
+              <a:t>Future research questions</a:t>
+            </a:r>
           </a:p>
         </p:txBody>
       </p:sp>

</xml_diff>

<commit_message>
Powerpoint notes up to results.
</commit_message>
<xml_diff>
--- a/ES data project presentation_salmon diet.pptx
+++ b/ES data project presentation_salmon diet.pptx
@@ -5,19 +5,18 @@
     <p:sldMasterId id="2147483648" r:id="rId1"/>
   </p:sldMasterIdLst>
   <p:notesMasterIdLst>
-    <p:notesMasterId r:id="rId12"/>
+    <p:notesMasterId r:id="rId11"/>
   </p:notesMasterIdLst>
   <p:sldIdLst>
     <p:sldId id="256" r:id="rId2"/>
     <p:sldId id="257" r:id="rId3"/>
     <p:sldId id="258" r:id="rId4"/>
-    <p:sldId id="263" r:id="rId5"/>
-    <p:sldId id="259" r:id="rId6"/>
-    <p:sldId id="265" r:id="rId7"/>
-    <p:sldId id="260" r:id="rId8"/>
-    <p:sldId id="266" r:id="rId9"/>
-    <p:sldId id="261" r:id="rId10"/>
-    <p:sldId id="264" r:id="rId11"/>
+    <p:sldId id="259" r:id="rId5"/>
+    <p:sldId id="265" r:id="rId6"/>
+    <p:sldId id="260" r:id="rId7"/>
+    <p:sldId id="266" r:id="rId8"/>
+    <p:sldId id="261" r:id="rId9"/>
+    <p:sldId id="264" r:id="rId10"/>
   </p:sldIdLst>
   <p:sldSz cx="12192000" cy="6858000"/>
   <p:notesSz cx="6858000" cy="9144000"/>
@@ -124,7 +123,6 @@
             <p14:sldId id="256"/>
             <p14:sldId id="257"/>
             <p14:sldId id="258"/>
-            <p14:sldId id="263"/>
             <p14:sldId id="259"/>
             <p14:sldId id="265"/>
             <p14:sldId id="260"/>
@@ -235,7 +233,7 @@
           <a:p>
             <a:fld id="{EE49B232-0CCD-EA45-8373-748F71E32B73}" type="datetimeFigureOut">
               <a:rPr lang="en-US" smtClean="0"/>
-              <a:t>4/5/2020</a:t>
+              <a:t>4/6/20</a:t>
             </a:fld>
             <a:endParaRPr lang="en-US"/>
           </a:p>
@@ -565,7 +563,7 @@
             </a:pPr>
             <a:r>
               <a:rPr lang="en-US" dirty="0"/>
-              <a:t>We would like to acknowledge </a:t>
+              <a:t>First, we would like to acknowledge </a:t>
             </a:r>
             <a:r>
               <a:rPr lang="en-CA" dirty="0">
@@ -610,22 +608,176 @@
               <a:t>Juanes</a:t>
             </a:r>
             <a:r>
-              <a:rPr lang="en-US" dirty="0">
+              <a:rPr lang="en-CA" dirty="0">
                 <a:latin typeface="Calibri Light" panose="020F0302020204030204" pitchFamily="34" charset="0"/>
                 <a:cs typeface="Calibri Light" panose="020F0302020204030204" pitchFamily="34" charset="0"/>
               </a:rPr>
-              <a:t> for </a:t>
-            </a:r>
-            <a:r>
-              <a:rPr lang="en-US" dirty="0" err="1">
-                <a:latin typeface="Calibri Light" panose="020F0302020204030204" pitchFamily="34" charset="0"/>
-                <a:cs typeface="Calibri Light" panose="020F0302020204030204" pitchFamily="34" charset="0"/>
-              </a:rPr>
-              <a:t>oper</a:t>
-            </a:r>
+              <a:t> for spearheading and supporting the Adult Salmon Diet Program.</a:t>
+            </a:r>
+          </a:p>
+          <a:p>
+            <a:pPr marL="0" marR="0" lvl="0" indent="0" algn="l" defTabSz="914400" rtl="0" eaLnBrk="1" fontAlgn="auto" latinLnBrk="0" hangingPunct="1">
+              <a:lnSpc>
+                <a:spcPct val="100000"/>
+              </a:lnSpc>
+              <a:spcBef>
+                <a:spcPts val="0"/>
+              </a:spcBef>
+              <a:spcAft>
+                <a:spcPts val="0"/>
+              </a:spcAft>
+              <a:buClrTx/>
+              <a:buSzTx/>
+              <a:buFontTx/>
+              <a:buNone/>
+              <a:tabLst/>
+              <a:defRPr/>
+            </a:pPr>
             <a:endParaRPr lang="en-CA" dirty="0">
               <a:latin typeface="Calibri Light" panose="020F0302020204030204" pitchFamily="34" charset="0"/>
               <a:cs typeface="Calibri Light" panose="020F0302020204030204" pitchFamily="34" charset="0"/>
+            </a:endParaRPr>
+          </a:p>
+          <a:p>
+            <a:pPr marL="0" marR="0" lvl="0" indent="0" algn="l" defTabSz="914400" rtl="0" eaLnBrk="1" fontAlgn="auto" latinLnBrk="0" hangingPunct="1">
+              <a:lnSpc>
+                <a:spcPct val="100000"/>
+              </a:lnSpc>
+              <a:spcBef>
+                <a:spcPts val="0"/>
+              </a:spcBef>
+              <a:spcAft>
+                <a:spcPts val="0"/>
+              </a:spcAft>
+              <a:buClrTx/>
+              <a:buSzTx/>
+              <a:buFontTx/>
+              <a:buNone/>
+              <a:tabLst/>
+              <a:defRPr/>
+            </a:pPr>
+            <a:r>
+              <a:rPr lang="en-CA" sz="1200" kern="1200" dirty="0">
+                <a:solidFill>
+                  <a:schemeClr val="tx1"/>
+                </a:solidFill>
+                <a:effectLst/>
+                <a:latin typeface="+mn-lt"/>
+                <a:ea typeface="+mn-ea"/>
+                <a:cs typeface="+mn-cs"/>
+              </a:rPr>
+              <a:t>The adult Chinook and Coho Salmon Diet Program (</a:t>
+            </a:r>
+            <a:r>
+              <a:rPr lang="en-CA" sz="1200" kern="1200" dirty="0" err="1">
+                <a:solidFill>
+                  <a:schemeClr val="tx1"/>
+                </a:solidFill>
+                <a:effectLst/>
+                <a:latin typeface="+mn-lt"/>
+                <a:ea typeface="+mn-ea"/>
+                <a:cs typeface="+mn-cs"/>
+              </a:rPr>
+              <a:t>Juanes</a:t>
+            </a:r>
+            <a:r>
+              <a:rPr lang="en-CA" sz="1200" kern="1200" dirty="0">
+                <a:solidFill>
+                  <a:schemeClr val="tx1"/>
+                </a:solidFill>
+                <a:effectLst/>
+                <a:latin typeface="+mn-lt"/>
+                <a:ea typeface="+mn-ea"/>
+                <a:cs typeface="+mn-cs"/>
+              </a:rPr>
+              <a:t> Lab) seeks to address basic knowledge gaps in our understanding of what salmon eat in this region by sourcing stomach samples collected by the recreational fishing community.</a:t>
+            </a:r>
+          </a:p>
+          <a:p>
+            <a:pPr marL="0" marR="0" lvl="0" indent="0" algn="l" defTabSz="914400" rtl="0" eaLnBrk="1" fontAlgn="auto" latinLnBrk="0" hangingPunct="1">
+              <a:lnSpc>
+                <a:spcPct val="100000"/>
+              </a:lnSpc>
+              <a:spcBef>
+                <a:spcPts val="0"/>
+              </a:spcBef>
+              <a:spcAft>
+                <a:spcPts val="0"/>
+              </a:spcAft>
+              <a:buClrTx/>
+              <a:buSzTx/>
+              <a:buFontTx/>
+              <a:buNone/>
+              <a:tabLst/>
+              <a:defRPr/>
+            </a:pPr>
+            <a:endParaRPr lang="en-CA" sz="1200" kern="1200" dirty="0">
+              <a:solidFill>
+                <a:schemeClr val="tx1"/>
+              </a:solidFill>
+              <a:effectLst/>
+              <a:latin typeface="+mn-lt"/>
+              <a:ea typeface="+mn-ea"/>
+              <a:cs typeface="+mn-cs"/>
+            </a:endParaRPr>
+          </a:p>
+          <a:p>
+            <a:pPr marL="0" marR="0" lvl="0" indent="0" algn="l" defTabSz="914400" rtl="0" eaLnBrk="1" fontAlgn="auto" latinLnBrk="0" hangingPunct="1">
+              <a:lnSpc>
+                <a:spcPct val="100000"/>
+              </a:lnSpc>
+              <a:spcBef>
+                <a:spcPts val="0"/>
+              </a:spcBef>
+              <a:spcAft>
+                <a:spcPts val="0"/>
+              </a:spcAft>
+              <a:buClrTx/>
+              <a:buSzTx/>
+              <a:buFontTx/>
+              <a:buNone/>
+              <a:tabLst/>
+              <a:defRPr/>
+            </a:pPr>
+            <a:r>
+              <a:rPr lang="en-CA" sz="1200" kern="1200" dirty="0">
+                <a:solidFill>
+                  <a:schemeClr val="tx1"/>
+                </a:solidFill>
+                <a:effectLst/>
+                <a:latin typeface="+mn-lt"/>
+                <a:ea typeface="+mn-ea"/>
+                <a:cs typeface="+mn-cs"/>
+              </a:rPr>
+              <a:t>The goal is to gather regional, seasonal and interannual diet data to monitor ecosystem response to environmental change.</a:t>
+            </a:r>
+          </a:p>
+          <a:p>
+            <a:pPr marL="0" marR="0" lvl="0" indent="0" algn="l" defTabSz="914400" rtl="0" eaLnBrk="1" fontAlgn="auto" latinLnBrk="0" hangingPunct="1">
+              <a:lnSpc>
+                <a:spcPct val="100000"/>
+              </a:lnSpc>
+              <a:spcBef>
+                <a:spcPts val="0"/>
+              </a:spcBef>
+              <a:spcAft>
+                <a:spcPts val="0"/>
+              </a:spcAft>
+              <a:buClrTx/>
+              <a:buSzTx/>
+              <a:buFontTx/>
+              <a:buNone/>
+              <a:tabLst/>
+              <a:defRPr/>
+            </a:pPr>
+            <a:endParaRPr lang="en-CA" sz="1200" kern="1200" dirty="0">
+              <a:solidFill>
+                <a:schemeClr val="tx1"/>
+              </a:solidFill>
+              <a:effectLst/>
+              <a:latin typeface="+mn-lt"/>
+              <a:ea typeface="+mn-ea"/>
+              <a:cs typeface="+mn-cs"/>
             </a:endParaRPr>
           </a:p>
         </p:txBody>
@@ -657,6 +809,760 @@
     <p:extLst>
       <p:ext uri="{BB962C8B-B14F-4D97-AF65-F5344CB8AC3E}">
         <p14:creationId xmlns:p14="http://schemas.microsoft.com/office/powerpoint/2010/main" val="1869013899"/>
+      </p:ext>
+    </p:extLst>
+  </p:cSld>
+  <p:clrMapOvr>
+    <a:masterClrMapping/>
+  </p:clrMapOvr>
+</p:notes>
+</file>
+
+<file path=ppt/notesSlides/notesSlide2.xml><?xml version="1.0" encoding="utf-8"?>
+<p:notes xmlns:a="http://schemas.openxmlformats.org/drawingml/2006/main" xmlns:r="http://schemas.openxmlformats.org/officeDocument/2006/relationships" xmlns:p="http://schemas.openxmlformats.org/presentationml/2006/main">
+  <p:cSld>
+    <p:spTree>
+      <p:nvGrpSpPr>
+        <p:cNvPr id="1" name=""/>
+        <p:cNvGrpSpPr/>
+        <p:nvPr/>
+      </p:nvGrpSpPr>
+      <p:grpSpPr>
+        <a:xfrm>
+          <a:off x="0" y="0"/>
+          <a:ext cx="0" cy="0"/>
+          <a:chOff x="0" y="0"/>
+          <a:chExt cx="0" cy="0"/>
+        </a:xfrm>
+      </p:grpSpPr>
+      <p:sp>
+        <p:nvSpPr>
+          <p:cNvPr id="2" name="Slide Image Placeholder 1"/>
+          <p:cNvSpPr>
+            <a:spLocks noGrp="1" noRot="1" noChangeAspect="1"/>
+          </p:cNvSpPr>
+          <p:nvPr>
+            <p:ph type="sldImg"/>
+          </p:nvPr>
+        </p:nvSpPr>
+        <p:spPr/>
+      </p:sp>
+      <p:sp>
+        <p:nvSpPr>
+          <p:cNvPr id="3" name="Notes Placeholder 2"/>
+          <p:cNvSpPr>
+            <a:spLocks noGrp="1"/>
+          </p:cNvSpPr>
+          <p:nvPr>
+            <p:ph type="body" idx="1"/>
+          </p:nvPr>
+        </p:nvSpPr>
+        <p:spPr/>
+        <p:txBody>
+          <a:bodyPr/>
+          <a:lstStyle/>
+          <a:p>
+            <a:pPr marL="0" marR="0" lvl="0" indent="0" algn="l" defTabSz="914400" rtl="0" eaLnBrk="1" fontAlgn="auto" latinLnBrk="0" hangingPunct="1">
+              <a:lnSpc>
+                <a:spcPct val="100000"/>
+              </a:lnSpc>
+              <a:spcBef>
+                <a:spcPts val="0"/>
+              </a:spcBef>
+              <a:spcAft>
+                <a:spcPts val="0"/>
+              </a:spcAft>
+              <a:buClrTx/>
+              <a:buSzTx/>
+              <a:buFontTx/>
+              <a:buNone/>
+              <a:tabLst/>
+              <a:defRPr/>
+            </a:pPr>
+            <a:r>
+              <a:rPr lang="en-CA" dirty="0">
+                <a:latin typeface="Calibri Light" panose="020F0302020204030204" pitchFamily="34" charset="0"/>
+                <a:cs typeface="Calibri Light" panose="020F0302020204030204" pitchFamily="34" charset="0"/>
+              </a:rPr>
+              <a:t>Pacific Herring have been found to be the </a:t>
+            </a:r>
+            <a:r>
+              <a:rPr lang="en-CA" sz="1200" kern="1200" dirty="0">
+                <a:solidFill>
+                  <a:schemeClr val="tx1"/>
+                </a:solidFill>
+                <a:effectLst/>
+                <a:latin typeface="+mn-lt"/>
+                <a:ea typeface="+mn-ea"/>
+                <a:cs typeface="+mn-cs"/>
+              </a:rPr>
+              <a:t>dominant fish consumed by Chinook Salmon throughout regions of the Salish Sea, throughout the year.</a:t>
+            </a:r>
+          </a:p>
+          <a:p>
+            <a:pPr marL="0" marR="0" lvl="0" indent="0" algn="l" defTabSz="914400" rtl="0" eaLnBrk="1" fontAlgn="auto" latinLnBrk="0" hangingPunct="1">
+              <a:lnSpc>
+                <a:spcPct val="100000"/>
+              </a:lnSpc>
+              <a:spcBef>
+                <a:spcPts val="0"/>
+              </a:spcBef>
+              <a:spcAft>
+                <a:spcPts val="0"/>
+              </a:spcAft>
+              <a:buClrTx/>
+              <a:buSzTx/>
+              <a:buFontTx/>
+              <a:buNone/>
+              <a:tabLst/>
+              <a:defRPr/>
+            </a:pPr>
+            <a:endParaRPr lang="en-CA" sz="1200" kern="1200" dirty="0">
+              <a:solidFill>
+                <a:schemeClr val="tx1"/>
+              </a:solidFill>
+              <a:effectLst/>
+              <a:latin typeface="+mn-lt"/>
+              <a:ea typeface="+mn-ea"/>
+              <a:cs typeface="+mn-cs"/>
+            </a:endParaRPr>
+          </a:p>
+          <a:p>
+            <a:pPr marL="0" marR="0" lvl="0" indent="0" algn="l" defTabSz="914400" rtl="0" eaLnBrk="1" fontAlgn="auto" latinLnBrk="0" hangingPunct="1">
+              <a:lnSpc>
+                <a:spcPct val="100000"/>
+              </a:lnSpc>
+              <a:spcBef>
+                <a:spcPts val="0"/>
+              </a:spcBef>
+              <a:spcAft>
+                <a:spcPts val="0"/>
+              </a:spcAft>
+              <a:buClrTx/>
+              <a:buSzTx/>
+              <a:buFontTx/>
+              <a:buNone/>
+              <a:tabLst/>
+              <a:defRPr/>
+            </a:pPr>
+            <a:r>
+              <a:rPr lang="en-CA" sz="1200" kern="1200" dirty="0">
+                <a:solidFill>
+                  <a:schemeClr val="tx1"/>
+                </a:solidFill>
+                <a:effectLst/>
+                <a:latin typeface="+mn-lt"/>
+                <a:ea typeface="+mn-ea"/>
+                <a:cs typeface="+mn-cs"/>
+              </a:rPr>
+              <a:t>For this project we will investigate factors that may be important to the size of herring consumed by Chinook Salmon.</a:t>
+            </a:r>
+          </a:p>
+          <a:p>
+            <a:pPr marL="0" marR="0" lvl="0" indent="0" algn="l" defTabSz="914400" rtl="0" eaLnBrk="1" fontAlgn="auto" latinLnBrk="0" hangingPunct="1">
+              <a:lnSpc>
+                <a:spcPct val="100000"/>
+              </a:lnSpc>
+              <a:spcBef>
+                <a:spcPts val="0"/>
+              </a:spcBef>
+              <a:spcAft>
+                <a:spcPts val="0"/>
+              </a:spcAft>
+              <a:buClrTx/>
+              <a:buSzTx/>
+              <a:buFontTx/>
+              <a:buNone/>
+              <a:tabLst/>
+              <a:defRPr/>
+            </a:pPr>
+            <a:endParaRPr lang="en-CA" sz="1200" kern="1200" dirty="0">
+              <a:solidFill>
+                <a:schemeClr val="tx1"/>
+              </a:solidFill>
+              <a:effectLst/>
+              <a:latin typeface="+mn-lt"/>
+              <a:ea typeface="+mn-ea"/>
+              <a:cs typeface="+mn-cs"/>
+            </a:endParaRPr>
+          </a:p>
+          <a:p>
+            <a:pPr marL="0" marR="0" lvl="0" indent="0" algn="l" defTabSz="914400" rtl="0" eaLnBrk="1" fontAlgn="auto" latinLnBrk="0" hangingPunct="1">
+              <a:lnSpc>
+                <a:spcPct val="100000"/>
+              </a:lnSpc>
+              <a:spcBef>
+                <a:spcPts val="0"/>
+              </a:spcBef>
+              <a:spcAft>
+                <a:spcPts val="0"/>
+              </a:spcAft>
+              <a:buClrTx/>
+              <a:buSzTx/>
+              <a:buFontTx/>
+              <a:buNone/>
+              <a:tabLst/>
+              <a:defRPr/>
+            </a:pPr>
+            <a:r>
+              <a:rPr lang="en-CA" sz="1200" kern="1200" dirty="0">
+                <a:solidFill>
+                  <a:schemeClr val="tx1"/>
+                </a:solidFill>
+                <a:effectLst/>
+                <a:latin typeface="+mn-lt"/>
+                <a:ea typeface="+mn-ea"/>
+                <a:cs typeface="+mn-cs"/>
+              </a:rPr>
+              <a:t>We want to know how Chinook size, catch location and time of year in the Salish Sea affect the size of herring prey consumed by Chinook salmon.</a:t>
+            </a:r>
+          </a:p>
+          <a:p>
+            <a:pPr marL="0" marR="0" lvl="0" indent="0" algn="l" defTabSz="914400" rtl="0" eaLnBrk="1" fontAlgn="auto" latinLnBrk="0" hangingPunct="1">
+              <a:lnSpc>
+                <a:spcPct val="100000"/>
+              </a:lnSpc>
+              <a:spcBef>
+                <a:spcPts val="0"/>
+              </a:spcBef>
+              <a:spcAft>
+                <a:spcPts val="0"/>
+              </a:spcAft>
+              <a:buClrTx/>
+              <a:buSzTx/>
+              <a:buFontTx/>
+              <a:buNone/>
+              <a:tabLst/>
+              <a:defRPr/>
+            </a:pPr>
+            <a:endParaRPr lang="en-CA" sz="1200" kern="1200" dirty="0">
+              <a:solidFill>
+                <a:schemeClr val="tx1"/>
+              </a:solidFill>
+              <a:effectLst/>
+              <a:latin typeface="+mn-lt"/>
+              <a:ea typeface="+mn-ea"/>
+              <a:cs typeface="+mn-cs"/>
+            </a:endParaRPr>
+          </a:p>
+          <a:p>
+            <a:pPr marL="0" marR="0" lvl="0" indent="0" algn="l" defTabSz="914400" rtl="0" eaLnBrk="1" fontAlgn="auto" latinLnBrk="0" hangingPunct="1">
+              <a:lnSpc>
+                <a:spcPct val="100000"/>
+              </a:lnSpc>
+              <a:spcBef>
+                <a:spcPts val="0"/>
+              </a:spcBef>
+              <a:spcAft>
+                <a:spcPts val="0"/>
+              </a:spcAft>
+              <a:buClrTx/>
+              <a:buSzTx/>
+              <a:buFontTx/>
+              <a:buNone/>
+              <a:tabLst/>
+              <a:defRPr/>
+            </a:pPr>
+            <a:r>
+              <a:rPr lang="en-CA" sz="1200" kern="1200" dirty="0">
+                <a:solidFill>
+                  <a:schemeClr val="tx1"/>
+                </a:solidFill>
+                <a:effectLst/>
+                <a:latin typeface="+mn-lt"/>
+                <a:ea typeface="+mn-ea"/>
+                <a:cs typeface="+mn-cs"/>
+              </a:rPr>
+              <a:t>We hypothesize that herring size will be positively linear with salmon length, collection day of year and latitude. However, a negative linear relationship with longitude may occur because more herring are known to distribute along western Strait of Georgia. Alternatively, a non-linear relationship with longitude is possible if maximum herring size occurs in mid-channel waters.</a:t>
+            </a:r>
+          </a:p>
+          <a:p>
+            <a:pPr marL="0" marR="0" lvl="0" indent="0" algn="l" defTabSz="914400" rtl="0" eaLnBrk="1" fontAlgn="auto" latinLnBrk="0" hangingPunct="1">
+              <a:lnSpc>
+                <a:spcPct val="100000"/>
+              </a:lnSpc>
+              <a:spcBef>
+                <a:spcPts val="0"/>
+              </a:spcBef>
+              <a:spcAft>
+                <a:spcPts val="0"/>
+              </a:spcAft>
+              <a:buClrTx/>
+              <a:buSzTx/>
+              <a:buFontTx/>
+              <a:buNone/>
+              <a:tabLst/>
+              <a:defRPr/>
+            </a:pPr>
+            <a:endParaRPr lang="en-CA" sz="1200" kern="1200" dirty="0">
+              <a:solidFill>
+                <a:schemeClr val="tx1"/>
+              </a:solidFill>
+              <a:effectLst/>
+              <a:latin typeface="+mn-lt"/>
+              <a:ea typeface="+mn-ea"/>
+              <a:cs typeface="+mn-cs"/>
+            </a:endParaRPr>
+          </a:p>
+          <a:p>
+            <a:endParaRPr lang="en-CA" sz="1200" kern="1200" dirty="0">
+              <a:solidFill>
+                <a:schemeClr val="tx1"/>
+              </a:solidFill>
+              <a:effectLst/>
+              <a:latin typeface="+mn-lt"/>
+              <a:ea typeface="+mn-ea"/>
+              <a:cs typeface="+mn-cs"/>
+            </a:endParaRPr>
+          </a:p>
+        </p:txBody>
+      </p:sp>
+      <p:sp>
+        <p:nvSpPr>
+          <p:cNvPr id="4" name="Slide Number Placeholder 3"/>
+          <p:cNvSpPr>
+            <a:spLocks noGrp="1"/>
+          </p:cNvSpPr>
+          <p:nvPr>
+            <p:ph type="sldNum" sz="quarter" idx="5"/>
+          </p:nvPr>
+        </p:nvSpPr>
+        <p:spPr/>
+        <p:txBody>
+          <a:bodyPr/>
+          <a:lstStyle/>
+          <a:p>
+            <a:fld id="{0B1207EC-944A-E74D-8503-F6C3FC26F6F0}" type="slidenum">
+              <a:rPr lang="en-US" smtClean="0"/>
+              <a:t>2</a:t>
+            </a:fld>
+            <a:endParaRPr lang="en-US"/>
+          </a:p>
+        </p:txBody>
+      </p:sp>
+    </p:spTree>
+    <p:extLst>
+      <p:ext uri="{BB962C8B-B14F-4D97-AF65-F5344CB8AC3E}">
+        <p14:creationId xmlns:p14="http://schemas.microsoft.com/office/powerpoint/2010/main" val="811748277"/>
+      </p:ext>
+    </p:extLst>
+  </p:cSld>
+  <p:clrMapOvr>
+    <a:masterClrMapping/>
+  </p:clrMapOvr>
+</p:notes>
+</file>
+
+<file path=ppt/notesSlides/notesSlide3.xml><?xml version="1.0" encoding="utf-8"?>
+<p:notes xmlns:a="http://schemas.openxmlformats.org/drawingml/2006/main" xmlns:r="http://schemas.openxmlformats.org/officeDocument/2006/relationships" xmlns:p="http://schemas.openxmlformats.org/presentationml/2006/main">
+  <p:cSld>
+    <p:spTree>
+      <p:nvGrpSpPr>
+        <p:cNvPr id="1" name=""/>
+        <p:cNvGrpSpPr/>
+        <p:nvPr/>
+      </p:nvGrpSpPr>
+      <p:grpSpPr>
+        <a:xfrm>
+          <a:off x="0" y="0"/>
+          <a:ext cx="0" cy="0"/>
+          <a:chOff x="0" y="0"/>
+          <a:chExt cx="0" cy="0"/>
+        </a:xfrm>
+      </p:grpSpPr>
+      <p:sp>
+        <p:nvSpPr>
+          <p:cNvPr id="2" name="Slide Image Placeholder 1"/>
+          <p:cNvSpPr>
+            <a:spLocks noGrp="1" noRot="1" noChangeAspect="1"/>
+          </p:cNvSpPr>
+          <p:nvPr>
+            <p:ph type="sldImg"/>
+          </p:nvPr>
+        </p:nvSpPr>
+        <p:spPr/>
+      </p:sp>
+      <p:sp>
+        <p:nvSpPr>
+          <p:cNvPr id="3" name="Notes Placeholder 2"/>
+          <p:cNvSpPr>
+            <a:spLocks noGrp="1"/>
+          </p:cNvSpPr>
+          <p:nvPr>
+            <p:ph type="body" idx="1"/>
+          </p:nvPr>
+        </p:nvSpPr>
+        <p:spPr/>
+        <p:txBody>
+          <a:bodyPr/>
+          <a:lstStyle/>
+          <a:p>
+            <a:pPr marL="0" marR="0" lvl="0" indent="0" algn="l" defTabSz="914400" rtl="0" eaLnBrk="1" fontAlgn="auto" latinLnBrk="0" hangingPunct="1">
+              <a:lnSpc>
+                <a:spcPct val="100000"/>
+              </a:lnSpc>
+              <a:spcBef>
+                <a:spcPts val="0"/>
+              </a:spcBef>
+              <a:spcAft>
+                <a:spcPts val="0"/>
+              </a:spcAft>
+              <a:buClrTx/>
+              <a:buSzTx/>
+              <a:buFontTx/>
+              <a:buNone/>
+              <a:tabLst/>
+              <a:defRPr/>
+            </a:pPr>
+            <a:r>
+              <a:rPr lang="en-CA" sz="1200" kern="1200" dirty="0">
+                <a:solidFill>
+                  <a:schemeClr val="tx1"/>
+                </a:solidFill>
+                <a:effectLst/>
+                <a:latin typeface="+mn-lt"/>
+                <a:ea typeface="+mn-ea"/>
+                <a:cs typeface="+mn-cs"/>
+              </a:rPr>
+              <a:t>We will be assessing the relationship between herring size consumed by Chinook Salmon in the Salish Sea over the 2018 year.</a:t>
+            </a:r>
+          </a:p>
+          <a:p>
+            <a:pPr marL="0" marR="0" lvl="0" indent="0" algn="l" defTabSz="914400" rtl="0" eaLnBrk="1" fontAlgn="auto" latinLnBrk="0" hangingPunct="1">
+              <a:lnSpc>
+                <a:spcPct val="100000"/>
+              </a:lnSpc>
+              <a:spcBef>
+                <a:spcPts val="0"/>
+              </a:spcBef>
+              <a:spcAft>
+                <a:spcPts val="0"/>
+              </a:spcAft>
+              <a:buClrTx/>
+              <a:buSzTx/>
+              <a:buFontTx/>
+              <a:buNone/>
+              <a:tabLst/>
+              <a:defRPr/>
+            </a:pPr>
+            <a:endParaRPr lang="en-CA" sz="1200" kern="1200" dirty="0">
+              <a:solidFill>
+                <a:schemeClr val="tx1"/>
+              </a:solidFill>
+              <a:effectLst/>
+              <a:latin typeface="+mn-lt"/>
+              <a:ea typeface="+mn-ea"/>
+              <a:cs typeface="+mn-cs"/>
+            </a:endParaRPr>
+          </a:p>
+          <a:p>
+            <a:pPr marL="0" marR="0" lvl="0" indent="0" algn="l" defTabSz="914400" rtl="0" eaLnBrk="1" fontAlgn="auto" latinLnBrk="0" hangingPunct="1">
+              <a:lnSpc>
+                <a:spcPct val="100000"/>
+              </a:lnSpc>
+              <a:spcBef>
+                <a:spcPts val="0"/>
+              </a:spcBef>
+              <a:spcAft>
+                <a:spcPts val="0"/>
+              </a:spcAft>
+              <a:buClrTx/>
+              <a:buSzTx/>
+              <a:buFontTx/>
+              <a:buNone/>
+              <a:tabLst/>
+              <a:defRPr/>
+            </a:pPr>
+            <a:r>
+              <a:rPr lang="en-CA" sz="1200" kern="1200" dirty="0">
+                <a:solidFill>
+                  <a:schemeClr val="tx1"/>
+                </a:solidFill>
+                <a:effectLst/>
+                <a:latin typeface="+mn-lt"/>
+                <a:ea typeface="+mn-ea"/>
+                <a:cs typeface="+mn-cs"/>
+              </a:rPr>
+              <a:t>The size of herring is estimated using otolith width (mm) measurements. Otoliths are paired aragonitic structures that grow inside the cranium of most teleost fishes like the rings of a tree. They are commonly used by fisheries scientists to assess growth trajectories, age and even migration patterns of individual fish. Previous work in our lab has found a positive, linear relationship between otolith width (mm) and length (mm) of herring from this dataset, and therefore we will use averaged left and right otolith width (mm) measurements from individual herring as a proxy for herring size in this analysis.</a:t>
+            </a:r>
+          </a:p>
+          <a:p>
+            <a:pPr marL="0" marR="0" lvl="0" indent="0" algn="l" defTabSz="914400" rtl="0" eaLnBrk="1" fontAlgn="auto" latinLnBrk="0" hangingPunct="1">
+              <a:lnSpc>
+                <a:spcPct val="100000"/>
+              </a:lnSpc>
+              <a:spcBef>
+                <a:spcPts val="0"/>
+              </a:spcBef>
+              <a:spcAft>
+                <a:spcPts val="0"/>
+              </a:spcAft>
+              <a:buClrTx/>
+              <a:buSzTx/>
+              <a:buFontTx/>
+              <a:buNone/>
+              <a:tabLst/>
+              <a:defRPr/>
+            </a:pPr>
+            <a:endParaRPr lang="en-CA" sz="1200" kern="1200" dirty="0">
+              <a:solidFill>
+                <a:schemeClr val="tx1"/>
+              </a:solidFill>
+              <a:effectLst/>
+              <a:latin typeface="+mn-lt"/>
+              <a:ea typeface="+mn-ea"/>
+              <a:cs typeface="+mn-cs"/>
+            </a:endParaRPr>
+          </a:p>
+          <a:p>
+            <a:pPr marL="0" marR="0" lvl="0" indent="0" algn="l" defTabSz="914400" rtl="0" eaLnBrk="1" fontAlgn="auto" latinLnBrk="0" hangingPunct="1">
+              <a:lnSpc>
+                <a:spcPct val="100000"/>
+              </a:lnSpc>
+              <a:spcBef>
+                <a:spcPts val="0"/>
+              </a:spcBef>
+              <a:spcAft>
+                <a:spcPts val="0"/>
+              </a:spcAft>
+              <a:buClrTx/>
+              <a:buSzTx/>
+              <a:buFontTx/>
+              <a:buNone/>
+              <a:tabLst/>
+              <a:defRPr/>
+            </a:pPr>
+            <a:r>
+              <a:rPr lang="en-CA" sz="1200" kern="1200" dirty="0">
+                <a:solidFill>
+                  <a:schemeClr val="tx1"/>
+                </a:solidFill>
+                <a:effectLst/>
+                <a:latin typeface="+mn-lt"/>
+                <a:ea typeface="+mn-ea"/>
+                <a:cs typeface="+mn-cs"/>
+              </a:rPr>
+              <a:t>We will model the response of otolith width to associated salmon catch data recorded by each angler and linked to each stomach sample. These variables include salmon catch day in the 2018 year, salmon length, longitude and latitude.</a:t>
+            </a:r>
+          </a:p>
+          <a:p>
+            <a:endParaRPr lang="en-US" dirty="0"/>
+          </a:p>
+          <a:p>
+            <a:r>
+              <a:rPr lang="en-US" dirty="0"/>
+              <a:t>We will only look at Chinook Salmon collected in the Canadian Salish Sea during the 2018 year.</a:t>
+            </a:r>
+          </a:p>
+        </p:txBody>
+      </p:sp>
+      <p:sp>
+        <p:nvSpPr>
+          <p:cNvPr id="4" name="Slide Number Placeholder 3"/>
+          <p:cNvSpPr>
+            <a:spLocks noGrp="1"/>
+          </p:cNvSpPr>
+          <p:nvPr>
+            <p:ph type="sldNum" sz="quarter" idx="5"/>
+          </p:nvPr>
+        </p:nvSpPr>
+        <p:spPr/>
+        <p:txBody>
+          <a:bodyPr/>
+          <a:lstStyle/>
+          <a:p>
+            <a:fld id="{0B1207EC-944A-E74D-8503-F6C3FC26F6F0}" type="slidenum">
+              <a:rPr lang="en-US" smtClean="0"/>
+              <a:t>3</a:t>
+            </a:fld>
+            <a:endParaRPr lang="en-US"/>
+          </a:p>
+        </p:txBody>
+      </p:sp>
+    </p:spTree>
+    <p:extLst>
+      <p:ext uri="{BB962C8B-B14F-4D97-AF65-F5344CB8AC3E}">
+        <p14:creationId xmlns:p14="http://schemas.microsoft.com/office/powerpoint/2010/main" val="2441402378"/>
+      </p:ext>
+    </p:extLst>
+  </p:cSld>
+  <p:clrMapOvr>
+    <a:masterClrMapping/>
+  </p:clrMapOvr>
+</p:notes>
+</file>
+
+<file path=ppt/notesSlides/notesSlide4.xml><?xml version="1.0" encoding="utf-8"?>
+<p:notes xmlns:a="http://schemas.openxmlformats.org/drawingml/2006/main" xmlns:r="http://schemas.openxmlformats.org/officeDocument/2006/relationships" xmlns:p="http://schemas.openxmlformats.org/presentationml/2006/main">
+  <p:cSld>
+    <p:spTree>
+      <p:nvGrpSpPr>
+        <p:cNvPr id="1" name=""/>
+        <p:cNvGrpSpPr/>
+        <p:nvPr/>
+      </p:nvGrpSpPr>
+      <p:grpSpPr>
+        <a:xfrm>
+          <a:off x="0" y="0"/>
+          <a:ext cx="0" cy="0"/>
+          <a:chOff x="0" y="0"/>
+          <a:chExt cx="0" cy="0"/>
+        </a:xfrm>
+      </p:grpSpPr>
+      <p:sp>
+        <p:nvSpPr>
+          <p:cNvPr id="2" name="Slide Image Placeholder 1"/>
+          <p:cNvSpPr>
+            <a:spLocks noGrp="1" noRot="1" noChangeAspect="1"/>
+          </p:cNvSpPr>
+          <p:nvPr>
+            <p:ph type="sldImg"/>
+          </p:nvPr>
+        </p:nvSpPr>
+        <p:spPr/>
+      </p:sp>
+      <p:sp>
+        <p:nvSpPr>
+          <p:cNvPr id="3" name="Notes Placeholder 2"/>
+          <p:cNvSpPr>
+            <a:spLocks noGrp="1"/>
+          </p:cNvSpPr>
+          <p:nvPr>
+            <p:ph type="body" idx="1"/>
+          </p:nvPr>
+        </p:nvSpPr>
+        <p:spPr/>
+        <p:txBody>
+          <a:bodyPr/>
+          <a:lstStyle/>
+          <a:p>
+            <a:r>
+              <a:rPr lang="en-US" dirty="0"/>
+              <a:t>We used AIC to compare candidate linear mixed-effects models fit with maximum likelihood estimation.</a:t>
+            </a:r>
+          </a:p>
+          <a:p>
+            <a:endParaRPr lang="en-US" dirty="0"/>
+          </a:p>
+          <a:p>
+            <a:pPr marL="0" marR="0" lvl="0" indent="0" algn="l" defTabSz="914400" rtl="0" eaLnBrk="1" fontAlgn="auto" latinLnBrk="0" hangingPunct="1">
+              <a:lnSpc>
+                <a:spcPct val="100000"/>
+              </a:lnSpc>
+              <a:spcBef>
+                <a:spcPts val="0"/>
+              </a:spcBef>
+              <a:spcAft>
+                <a:spcPts val="0"/>
+              </a:spcAft>
+              <a:buClrTx/>
+              <a:buSzTx/>
+              <a:buFontTx/>
+              <a:buNone/>
+              <a:tabLst/>
+              <a:defRPr/>
+            </a:pPr>
+            <a:r>
+              <a:rPr lang="en-CA" dirty="0"/>
+              <a:t>We </a:t>
+            </a:r>
+            <a:r>
+              <a:rPr lang="en-CA" sz="1200" kern="1200" dirty="0">
+                <a:solidFill>
+                  <a:schemeClr val="tx1"/>
+                </a:solidFill>
+                <a:effectLst/>
+                <a:latin typeface="+mn-lt"/>
+                <a:ea typeface="+mn-ea"/>
+                <a:cs typeface="+mn-cs"/>
+              </a:rPr>
+              <a:t>included a random intercept corresponding to individual salmon (salmon id) to avoid autocorrelation from non-independence of multiple herring that may occur in a single salmon or experimental unit. It is likely that multiple herring in one stomach have similar sizes if they travel in the same school targeted by an individual salmon. Also, salmon id had greater than 10 levels suggested by </a:t>
+            </a:r>
+            <a:r>
+              <a:rPr lang="en-CA" sz="1200" kern="1200" dirty="0" err="1">
+                <a:solidFill>
+                  <a:schemeClr val="tx1"/>
+                </a:solidFill>
+                <a:effectLst/>
+                <a:latin typeface="+mn-lt"/>
+                <a:ea typeface="+mn-ea"/>
+                <a:cs typeface="+mn-cs"/>
+              </a:rPr>
+              <a:t>Zuur</a:t>
+            </a:r>
+            <a:r>
+              <a:rPr lang="en-CA" sz="1200" kern="1200" dirty="0">
+                <a:solidFill>
+                  <a:schemeClr val="tx1"/>
+                </a:solidFill>
+                <a:effectLst/>
+                <a:latin typeface="+mn-lt"/>
+                <a:ea typeface="+mn-ea"/>
+                <a:cs typeface="+mn-cs"/>
+              </a:rPr>
+              <a:t> et al. (2007) to be suitable characteristics of a random intercept.</a:t>
+            </a:r>
+          </a:p>
+          <a:p>
+            <a:endParaRPr lang="en-US" dirty="0"/>
+          </a:p>
+          <a:p>
+            <a:r>
+              <a:rPr lang="en-US" dirty="0"/>
+              <a:t>We used a linear mixed-effects model as our response variable, otolith width (mm), was normally distributed and explanatory variables show few missing values or outliers.</a:t>
+            </a:r>
+          </a:p>
+          <a:p>
+            <a:endParaRPr lang="en-US" dirty="0"/>
+          </a:p>
+          <a:p>
+            <a:r>
+              <a:rPr lang="en-US" dirty="0"/>
+              <a:t>We chose AIC </a:t>
+            </a:r>
+            <a:r>
+              <a:rPr lang="en-CA" sz="1200" kern="1200" dirty="0">
+                <a:solidFill>
+                  <a:schemeClr val="tx1"/>
+                </a:solidFill>
+                <a:effectLst/>
+                <a:latin typeface="+mn-lt"/>
+                <a:ea typeface="+mn-ea"/>
+                <a:cs typeface="+mn-cs"/>
+              </a:rPr>
+              <a:t>because it is flexible when comparing complex, non-nested models with parameters estimated from ecological field studies. AIC is also commonly used in ecosystem studies where parameter estimates are relatively imprecise. We accept that the optimal AIC model may be selected over the true model, given the current sample size and our ecological understanding of the system.</a:t>
+            </a:r>
+            <a:endParaRPr lang="en-US" dirty="0"/>
+          </a:p>
+        </p:txBody>
+      </p:sp>
+      <p:sp>
+        <p:nvSpPr>
+          <p:cNvPr id="4" name="Slide Number Placeholder 3"/>
+          <p:cNvSpPr>
+            <a:spLocks noGrp="1"/>
+          </p:cNvSpPr>
+          <p:nvPr>
+            <p:ph type="sldNum" sz="quarter" idx="5"/>
+          </p:nvPr>
+        </p:nvSpPr>
+        <p:spPr/>
+        <p:txBody>
+          <a:bodyPr/>
+          <a:lstStyle/>
+          <a:p>
+            <a:fld id="{0B1207EC-944A-E74D-8503-F6C3FC26F6F0}" type="slidenum">
+              <a:rPr lang="en-US" smtClean="0"/>
+              <a:t>4</a:t>
+            </a:fld>
+            <a:endParaRPr lang="en-US"/>
+          </a:p>
+        </p:txBody>
+      </p:sp>
+    </p:spTree>
+    <p:extLst>
+      <p:ext uri="{BB962C8B-B14F-4D97-AF65-F5344CB8AC3E}">
+        <p14:creationId xmlns:p14="http://schemas.microsoft.com/office/powerpoint/2010/main" val="340181587"/>
       </p:ext>
     </p:extLst>
   </p:cSld>
@@ -813,7 +1719,7 @@
           <a:p>
             <a:fld id="{3E52D604-0742-9243-810E-1096192DBA15}" type="datetimeFigureOut">
               <a:rPr lang="en-US" smtClean="0"/>
-              <a:t>4/5/2020</a:t>
+              <a:t>4/6/20</a:t>
             </a:fld>
             <a:endParaRPr lang="en-US"/>
           </a:p>
@@ -1011,7 +1917,7 @@
           <a:p>
             <a:fld id="{3E52D604-0742-9243-810E-1096192DBA15}" type="datetimeFigureOut">
               <a:rPr lang="en-US" smtClean="0"/>
-              <a:t>4/5/2020</a:t>
+              <a:t>4/6/20</a:t>
             </a:fld>
             <a:endParaRPr lang="en-US"/>
           </a:p>
@@ -1219,7 +2125,7 @@
           <a:p>
             <a:fld id="{3E52D604-0742-9243-810E-1096192DBA15}" type="datetimeFigureOut">
               <a:rPr lang="en-US" smtClean="0"/>
-              <a:t>4/5/2020</a:t>
+              <a:t>4/6/20</a:t>
             </a:fld>
             <a:endParaRPr lang="en-US"/>
           </a:p>
@@ -1417,7 +2323,7 @@
           <a:p>
             <a:fld id="{3E52D604-0742-9243-810E-1096192DBA15}" type="datetimeFigureOut">
               <a:rPr lang="en-US" smtClean="0"/>
-              <a:t>4/5/2020</a:t>
+              <a:t>4/6/20</a:t>
             </a:fld>
             <a:endParaRPr lang="en-US"/>
           </a:p>
@@ -1692,7 +2598,7 @@
           <a:p>
             <a:fld id="{3E52D604-0742-9243-810E-1096192DBA15}" type="datetimeFigureOut">
               <a:rPr lang="en-US" smtClean="0"/>
-              <a:t>4/5/2020</a:t>
+              <a:t>4/6/20</a:t>
             </a:fld>
             <a:endParaRPr lang="en-US"/>
           </a:p>
@@ -1957,7 +2863,7 @@
           <a:p>
             <a:fld id="{3E52D604-0742-9243-810E-1096192DBA15}" type="datetimeFigureOut">
               <a:rPr lang="en-US" smtClean="0"/>
-              <a:t>4/5/2020</a:t>
+              <a:t>4/6/20</a:t>
             </a:fld>
             <a:endParaRPr lang="en-US"/>
           </a:p>
@@ -2369,7 +3275,7 @@
           <a:p>
             <a:fld id="{3E52D604-0742-9243-810E-1096192DBA15}" type="datetimeFigureOut">
               <a:rPr lang="en-US" smtClean="0"/>
-              <a:t>4/5/2020</a:t>
+              <a:t>4/6/20</a:t>
             </a:fld>
             <a:endParaRPr lang="en-US"/>
           </a:p>
@@ -2510,7 +3416,7 @@
           <a:p>
             <a:fld id="{3E52D604-0742-9243-810E-1096192DBA15}" type="datetimeFigureOut">
               <a:rPr lang="en-US" smtClean="0"/>
-              <a:t>4/5/2020</a:t>
+              <a:t>4/6/20</a:t>
             </a:fld>
             <a:endParaRPr lang="en-US"/>
           </a:p>
@@ -2623,7 +3529,7 @@
           <a:p>
             <a:fld id="{3E52D604-0742-9243-810E-1096192DBA15}" type="datetimeFigureOut">
               <a:rPr lang="en-US" smtClean="0"/>
-              <a:t>4/5/2020</a:t>
+              <a:t>4/6/20</a:t>
             </a:fld>
             <a:endParaRPr lang="en-US"/>
           </a:p>
@@ -2934,7 +3840,7 @@
           <a:p>
             <a:fld id="{3E52D604-0742-9243-810E-1096192DBA15}" type="datetimeFigureOut">
               <a:rPr lang="en-US" smtClean="0"/>
-              <a:t>4/5/2020</a:t>
+              <a:t>4/6/20</a:t>
             </a:fld>
             <a:endParaRPr lang="en-US"/>
           </a:p>
@@ -3222,7 +4128,7 @@
           <a:p>
             <a:fld id="{3E52D604-0742-9243-810E-1096192DBA15}" type="datetimeFigureOut">
               <a:rPr lang="en-US" smtClean="0"/>
-              <a:t>4/5/2020</a:t>
+              <a:t>4/6/20</a:t>
             </a:fld>
             <a:endParaRPr lang="en-US"/>
           </a:p>
@@ -3463,7 +4369,7 @@
           <a:p>
             <a:fld id="{3E52D604-0742-9243-810E-1096192DBA15}" type="datetimeFigureOut">
               <a:rPr lang="en-US" smtClean="0"/>
-              <a:t>4/5/2020</a:t>
+              <a:t>4/6/20</a:t>
             </a:fld>
             <a:endParaRPr lang="en-US"/>
           </a:p>
@@ -4097,110 +5003,6 @@
 </p:sld>
 </file>
 
-<file path=ppt/slides/slide10.xml><?xml version="1.0" encoding="utf-8"?>
-<p:sld xmlns:a="http://schemas.openxmlformats.org/drawingml/2006/main" xmlns:r="http://schemas.openxmlformats.org/officeDocument/2006/relationships" xmlns:p="http://schemas.openxmlformats.org/presentationml/2006/main">
-  <p:cSld>
-    <p:spTree>
-      <p:nvGrpSpPr>
-        <p:cNvPr id="1" name=""/>
-        <p:cNvGrpSpPr/>
-        <p:nvPr/>
-      </p:nvGrpSpPr>
-      <p:grpSpPr>
-        <a:xfrm>
-          <a:off x="0" y="0"/>
-          <a:ext cx="0" cy="0"/>
-          <a:chOff x="0" y="0"/>
-          <a:chExt cx="0" cy="0"/>
-        </a:xfrm>
-      </p:grpSpPr>
-      <p:sp>
-        <p:nvSpPr>
-          <p:cNvPr id="2" name="Title 1">
-            <a:extLst>
-              <a:ext uri="{FF2B5EF4-FFF2-40B4-BE49-F238E27FC236}">
-                <a16:creationId xmlns:a16="http://schemas.microsoft.com/office/drawing/2014/main" id="{32F013EC-885D-48FC-97AF-EA861EA43DDB}"/>
-              </a:ext>
-            </a:extLst>
-          </p:cNvPr>
-          <p:cNvSpPr>
-            <a:spLocks noGrp="1"/>
-          </p:cNvSpPr>
-          <p:nvPr>
-            <p:ph type="title"/>
-          </p:nvPr>
-        </p:nvSpPr>
-        <p:spPr/>
-        <p:txBody>
-          <a:bodyPr/>
-          <a:lstStyle/>
-          <a:p>
-            <a:r>
-              <a:rPr lang="en-CA" dirty="0"/>
-              <a:t>Checklist</a:t>
-            </a:r>
-          </a:p>
-        </p:txBody>
-      </p:sp>
-      <p:sp>
-        <p:nvSpPr>
-          <p:cNvPr id="3" name="Content Placeholder 2">
-            <a:extLst>
-              <a:ext uri="{FF2B5EF4-FFF2-40B4-BE49-F238E27FC236}">
-                <a16:creationId xmlns:a16="http://schemas.microsoft.com/office/drawing/2014/main" id="{83895A00-7982-4E95-82C2-C49F273FBD45}"/>
-              </a:ext>
-            </a:extLst>
-          </p:cNvPr>
-          <p:cNvSpPr>
-            <a:spLocks noGrp="1"/>
-          </p:cNvSpPr>
-          <p:nvPr>
-            <p:ph idx="1"/>
-          </p:nvPr>
-        </p:nvSpPr>
-        <p:spPr/>
-        <p:txBody>
-          <a:bodyPr/>
-          <a:lstStyle/>
-          <a:p>
-            <a:r>
-              <a:rPr lang="en-CA" dirty="0"/>
-              <a:t>PDF file</a:t>
-            </a:r>
-          </a:p>
-          <a:p>
-            <a:r>
-              <a:rPr lang="en-CA" dirty="0"/>
-              <a:t>10 slides max</a:t>
-            </a:r>
-          </a:p>
-          <a:p>
-            <a:r>
-              <a:rPr lang="en-CA" dirty="0"/>
-              <a:t>2 slides of plots min</a:t>
-            </a:r>
-          </a:p>
-          <a:p>
-            <a:r>
-              <a:rPr lang="en-CA" dirty="0"/>
-              <a:t>Complete sentences</a:t>
-            </a:r>
-          </a:p>
-        </p:txBody>
-      </p:sp>
-    </p:spTree>
-    <p:extLst>
-      <p:ext uri="{BB962C8B-B14F-4D97-AF65-F5344CB8AC3E}">
-        <p14:creationId xmlns:p14="http://schemas.microsoft.com/office/powerpoint/2010/main" val="1894726509"/>
-      </p:ext>
-    </p:extLst>
-  </p:cSld>
-  <p:clrMapOvr>
-    <a:masterClrMapping/>
-  </p:clrMapOvr>
-</p:sld>
-</file>
-
 <file path=ppt/slides/slide2.xml><?xml version="1.0" encoding="utf-8"?>
 <p:sld xmlns:a="http://schemas.openxmlformats.org/drawingml/2006/main" xmlns:r="http://schemas.openxmlformats.org/officeDocument/2006/relationships" xmlns:p="http://schemas.openxmlformats.org/presentationml/2006/main">
   <p:cSld>
@@ -4416,7 +5218,7 @@
           <p:cNvPr id="2" name="Title 1">
             <a:extLst>
               <a:ext uri="{FF2B5EF4-FFF2-40B4-BE49-F238E27FC236}">
-                <a16:creationId xmlns:a16="http://schemas.microsoft.com/office/drawing/2014/main" id="{009AAB2C-76D9-5E41-96F9-AD241258A499}"/>
+                <a16:creationId xmlns:a16="http://schemas.microsoft.com/office/drawing/2014/main" id="{EEC0E0E7-F8E7-9B44-94E4-CF9B05CC2C9C}"/>
               </a:ext>
             </a:extLst>
           </p:cNvPr>
@@ -4434,7 +5236,7 @@
           <a:p>
             <a:r>
               <a:rPr lang="en-US" dirty="0"/>
-              <a:t>Description of Data</a:t>
+              <a:t>Statistical Methods</a:t>
             </a:r>
           </a:p>
         </p:txBody>
@@ -4444,7 +5246,7 @@
           <p:cNvPr id="3" name="Content Placeholder 2">
             <a:extLst>
               <a:ext uri="{FF2B5EF4-FFF2-40B4-BE49-F238E27FC236}">
-                <a16:creationId xmlns:a16="http://schemas.microsoft.com/office/drawing/2014/main" id="{ADAB7883-B5EF-3148-B8CF-B82BB0A4E499}"/>
+                <a16:creationId xmlns:a16="http://schemas.microsoft.com/office/drawing/2014/main" id="{90558E49-E018-6C42-863E-8CEB33A15802}"/>
               </a:ext>
             </a:extLst>
           </p:cNvPr>
@@ -4462,7 +5264,25 @@
           <a:p>
             <a:r>
               <a:rPr lang="en-US" dirty="0"/>
-              <a:t>Plot “key features of dataset” using all data or a subset</a:t>
+              <a:t>What kind of model</a:t>
+            </a:r>
+          </a:p>
+          <a:p>
+            <a:r>
+              <a:rPr lang="en-US" dirty="0"/>
+              <a:t>Why</a:t>
+            </a:r>
+          </a:p>
+          <a:p>
+            <a:r>
+              <a:rPr lang="en-US" dirty="0"/>
+              <a:t>Probability distribution for response</a:t>
+            </a:r>
+          </a:p>
+          <a:p>
+            <a:r>
+              <a:rPr lang="en-US" dirty="0"/>
+              <a:t>Random effects and non-independence</a:t>
             </a:r>
           </a:p>
         </p:txBody>
@@ -4470,7 +5290,7 @@
     </p:spTree>
     <p:extLst>
       <p:ext uri="{BB962C8B-B14F-4D97-AF65-F5344CB8AC3E}">
-        <p14:creationId xmlns:p14="http://schemas.microsoft.com/office/powerpoint/2010/main" val="3857065462"/>
+        <p14:creationId xmlns:p14="http://schemas.microsoft.com/office/powerpoint/2010/main" val="4234275737"/>
       </p:ext>
     </p:extLst>
   </p:cSld>
@@ -4502,7 +5322,7 @@
           <p:cNvPr id="2" name="Title 1">
             <a:extLst>
               <a:ext uri="{FF2B5EF4-FFF2-40B4-BE49-F238E27FC236}">
-                <a16:creationId xmlns:a16="http://schemas.microsoft.com/office/drawing/2014/main" id="{EEC0E0E7-F8E7-9B44-94E4-CF9B05CC2C9C}"/>
+                <a16:creationId xmlns:a16="http://schemas.microsoft.com/office/drawing/2014/main" id="{3AAFA8B7-F65A-4144-B8CA-2814837B984F}"/>
               </a:ext>
             </a:extLst>
           </p:cNvPr>
@@ -4520,7 +5340,7 @@
           <a:p>
             <a:r>
               <a:rPr lang="en-US" dirty="0"/>
-              <a:t>Statistical Methods</a:t>
+              <a:t>Results</a:t>
             </a:r>
           </a:p>
         </p:txBody>
@@ -4530,7 +5350,7 @@
           <p:cNvPr id="3" name="Content Placeholder 2">
             <a:extLst>
               <a:ext uri="{FF2B5EF4-FFF2-40B4-BE49-F238E27FC236}">
-                <a16:creationId xmlns:a16="http://schemas.microsoft.com/office/drawing/2014/main" id="{90558E49-E018-6C42-863E-8CEB33A15802}"/>
+                <a16:creationId xmlns:a16="http://schemas.microsoft.com/office/drawing/2014/main" id="{EF9DCC9C-FAF5-CB4C-830C-27537C7ECA6F}"/>
               </a:ext>
             </a:extLst>
           </p:cNvPr>
@@ -4548,25 +5368,7 @@
           <a:p>
             <a:r>
               <a:rPr lang="en-US" dirty="0"/>
-              <a:t>What kind of model</a:t>
-            </a:r>
-          </a:p>
-          <a:p>
-            <a:r>
-              <a:rPr lang="en-US" dirty="0"/>
-              <a:t>Why</a:t>
-            </a:r>
-          </a:p>
-          <a:p>
-            <a:r>
-              <a:rPr lang="en-US" dirty="0"/>
-              <a:t>Probability distribution for response</a:t>
-            </a:r>
-          </a:p>
-          <a:p>
-            <a:r>
-              <a:rPr lang="en-US" dirty="0"/>
-              <a:t>Random effects and non-independence</a:t>
+              <a:t>Plot “response relative to explanatory with model”</a:t>
             </a:r>
           </a:p>
         </p:txBody>
@@ -4574,7 +5376,7 @@
     </p:spTree>
     <p:extLst>
       <p:ext uri="{BB962C8B-B14F-4D97-AF65-F5344CB8AC3E}">
-        <p14:creationId xmlns:p14="http://schemas.microsoft.com/office/powerpoint/2010/main" val="4234275737"/>
+        <p14:creationId xmlns:p14="http://schemas.microsoft.com/office/powerpoint/2010/main" val="2154362521"/>
       </p:ext>
     </p:extLst>
   </p:cSld>
@@ -4652,7 +5454,7 @@
           <a:p>
             <a:r>
               <a:rPr lang="en-US" dirty="0"/>
-              <a:t>Plot “response relative to explanatory with model”</a:t>
+              <a:t>In the context of results and hypotheses</a:t>
             </a:r>
           </a:p>
         </p:txBody>
@@ -4660,7 +5462,7 @@
     </p:spTree>
     <p:extLst>
       <p:ext uri="{BB962C8B-B14F-4D97-AF65-F5344CB8AC3E}">
-        <p14:creationId xmlns:p14="http://schemas.microsoft.com/office/powerpoint/2010/main" val="2154362521"/>
+        <p14:creationId xmlns:p14="http://schemas.microsoft.com/office/powerpoint/2010/main" val="1633210933"/>
       </p:ext>
     </p:extLst>
   </p:cSld>
@@ -4692,7 +5494,7 @@
           <p:cNvPr id="2" name="Title 1">
             <a:extLst>
               <a:ext uri="{FF2B5EF4-FFF2-40B4-BE49-F238E27FC236}">
-                <a16:creationId xmlns:a16="http://schemas.microsoft.com/office/drawing/2014/main" id="{3AAFA8B7-F65A-4144-B8CA-2814837B984F}"/>
+                <a16:creationId xmlns:a16="http://schemas.microsoft.com/office/drawing/2014/main" id="{5486FC29-4DE0-2945-8D76-00CE391102A3}"/>
               </a:ext>
             </a:extLst>
           </p:cNvPr>
@@ -4710,7 +5512,7 @@
           <a:p>
             <a:r>
               <a:rPr lang="en-US" dirty="0"/>
-              <a:t>Results</a:t>
+              <a:t>Discussion</a:t>
             </a:r>
           </a:p>
         </p:txBody>
@@ -4720,7 +5522,7 @@
           <p:cNvPr id="3" name="Content Placeholder 2">
             <a:extLst>
               <a:ext uri="{FF2B5EF4-FFF2-40B4-BE49-F238E27FC236}">
-                <a16:creationId xmlns:a16="http://schemas.microsoft.com/office/drawing/2014/main" id="{EF9DCC9C-FAF5-CB4C-830C-27537C7ECA6F}"/>
+                <a16:creationId xmlns:a16="http://schemas.microsoft.com/office/drawing/2014/main" id="{E5C8EA41-AC53-CD4C-9EA9-0760B2BBB009}"/>
               </a:ext>
             </a:extLst>
           </p:cNvPr>
@@ -4738,7 +5540,7 @@
           <a:p>
             <a:r>
               <a:rPr lang="en-US" dirty="0"/>
-              <a:t>In the context of results and hypotheses</a:t>
+              <a:t>Limitations to data analysis approach</a:t>
             </a:r>
           </a:p>
         </p:txBody>
@@ -4746,7 +5548,7 @@
     </p:spTree>
     <p:extLst>
       <p:ext uri="{BB962C8B-B14F-4D97-AF65-F5344CB8AC3E}">
-        <p14:creationId xmlns:p14="http://schemas.microsoft.com/office/powerpoint/2010/main" val="1633210933"/>
+        <p14:creationId xmlns:p14="http://schemas.microsoft.com/office/powerpoint/2010/main" val="2666073596"/>
       </p:ext>
     </p:extLst>
   </p:cSld>
@@ -4824,7 +5626,13 @@
           <a:p>
             <a:r>
               <a:rPr lang="en-US" dirty="0"/>
-              <a:t>Limitations to data analysis approach</a:t>
+              <a:t>Results in context of existing knowledge</a:t>
+            </a:r>
+          </a:p>
+          <a:p>
+            <a:r>
+              <a:rPr lang="en-US" dirty="0"/>
+              <a:t>Future research questions</a:t>
             </a:r>
           </a:p>
         </p:txBody>
@@ -4832,7 +5640,7 @@
     </p:spTree>
     <p:extLst>
       <p:ext uri="{BB962C8B-B14F-4D97-AF65-F5344CB8AC3E}">
-        <p14:creationId xmlns:p14="http://schemas.microsoft.com/office/powerpoint/2010/main" val="2666073596"/>
+        <p14:creationId xmlns:p14="http://schemas.microsoft.com/office/powerpoint/2010/main" val="3638490725"/>
       </p:ext>
     </p:extLst>
   </p:cSld>
@@ -4864,7 +5672,7 @@
           <p:cNvPr id="2" name="Title 1">
             <a:extLst>
               <a:ext uri="{FF2B5EF4-FFF2-40B4-BE49-F238E27FC236}">
-                <a16:creationId xmlns:a16="http://schemas.microsoft.com/office/drawing/2014/main" id="{5486FC29-4DE0-2945-8D76-00CE391102A3}"/>
+                <a16:creationId xmlns:a16="http://schemas.microsoft.com/office/drawing/2014/main" id="{32F013EC-885D-48FC-97AF-EA861EA43DDB}"/>
               </a:ext>
             </a:extLst>
           </p:cNvPr>
@@ -4881,8 +5689,8 @@
           <a:lstStyle/>
           <a:p>
             <a:r>
-              <a:rPr lang="en-US" dirty="0"/>
-              <a:t>Discussion</a:t>
+              <a:rPr lang="en-CA" dirty="0"/>
+              <a:t>Checklist</a:t>
             </a:r>
           </a:p>
         </p:txBody>
@@ -4892,7 +5700,7 @@
           <p:cNvPr id="3" name="Content Placeholder 2">
             <a:extLst>
               <a:ext uri="{FF2B5EF4-FFF2-40B4-BE49-F238E27FC236}">
-                <a16:creationId xmlns:a16="http://schemas.microsoft.com/office/drawing/2014/main" id="{E5C8EA41-AC53-CD4C-9EA9-0760B2BBB009}"/>
+                <a16:creationId xmlns:a16="http://schemas.microsoft.com/office/drawing/2014/main" id="{83895A00-7982-4E95-82C2-C49F273FBD45}"/>
               </a:ext>
             </a:extLst>
           </p:cNvPr>
@@ -4909,14 +5717,26 @@
           <a:lstStyle/>
           <a:p>
             <a:r>
-              <a:rPr lang="en-US" dirty="0"/>
-              <a:t>Results in context of existing knowledge</a:t>
-            </a:r>
-          </a:p>
-          <a:p>
-            <a:r>
-              <a:rPr lang="en-US" dirty="0"/>
-              <a:t>Future research questions</a:t>
+              <a:rPr lang="en-CA" dirty="0"/>
+              <a:t>PDF file</a:t>
+            </a:r>
+          </a:p>
+          <a:p>
+            <a:r>
+              <a:rPr lang="en-CA" dirty="0"/>
+              <a:t>10 slides max</a:t>
+            </a:r>
+          </a:p>
+          <a:p>
+            <a:r>
+              <a:rPr lang="en-CA" dirty="0"/>
+              <a:t>2 slides of plots min</a:t>
+            </a:r>
+          </a:p>
+          <a:p>
+            <a:r>
+              <a:rPr lang="en-CA" dirty="0"/>
+              <a:t>Complete sentences</a:t>
             </a:r>
           </a:p>
         </p:txBody>
@@ -4924,7 +5744,7 @@
     </p:spTree>
     <p:extLst>
       <p:ext uri="{BB962C8B-B14F-4D97-AF65-F5344CB8AC3E}">
-        <p14:creationId xmlns:p14="http://schemas.microsoft.com/office/powerpoint/2010/main" val="3638490725"/>
+        <p14:creationId xmlns:p14="http://schemas.microsoft.com/office/powerpoint/2010/main" val="1894726509"/>
       </p:ext>
     </p:extLst>
   </p:cSld>

</xml_diff>

<commit_message>
Finished notes and bullet points in slides.
</commit_message>
<xml_diff>
--- a/ES data project presentation_salmon diet.pptx
+++ b/ES data project presentation_salmon diet.pptx
@@ -952,7 +952,7 @@
                 <a:ea typeface="+mn-ea"/>
                 <a:cs typeface="+mn-cs"/>
               </a:rPr>
-              <a:t>Herring abundance is reported to be highest along east coast Vancouver Island with large, mature herring concentrated near Hornby/Denman Island during peak spawning in mid-March (</a:t>
+              <a:t>Herring abundance is reported to be highest along east coast Vancouver Island and near Hornby/Denman Island during peak spawning in mid-March (</a:t>
             </a:r>
             <a:r>
               <a:rPr lang="en-CA" sz="1200" kern="1200" dirty="0" err="1">
@@ -1035,7 +1035,7 @@
                 <a:ea typeface="+mn-ea"/>
                 <a:cs typeface="+mn-cs"/>
               </a:rPr>
-              <a:t>Furthermore, a greater contribution of large herring consumed in western regions followed by the appearance of small herring larvae entering diets, post-hatching in June may be driving the observed trends with longitude and day of year.</a:t>
+              <a:t>Furthermore, a greater contribution of large herring consumed in western regions followed by the appearance of small juvenile herring entering diets, post-hatching in June may be driving the observed trends with longitude and day of year.</a:t>
             </a:r>
           </a:p>
           <a:p>
@@ -2041,7 +2041,7 @@
                 <a:ea typeface="+mn-ea"/>
                 <a:cs typeface="+mn-cs"/>
               </a:rPr>
-              <a:t>AIC shows that model 11 and 6 are close and only differ in salmon length.</a:t>
+              <a:t>AIC shows that model 11 and 6 best explain variation in otolith width/herring size. Although, the first X models have similar delta AIC values and weights.</a:t>
             </a:r>
           </a:p>
           <a:p>
@@ -2062,7 +2062,7 @@
               <a:tabLst/>
               <a:defRPr/>
             </a:pPr>
-            <a:endParaRPr lang="en-CA" sz="1200" kern="1200">
+            <a:endParaRPr lang="en-CA" sz="1200" kern="1200" dirty="0">
               <a:solidFill>
                 <a:schemeClr val="tx1"/>
               </a:solidFill>
@@ -2071,6 +2071,96 @@
               <a:ea typeface="+mn-ea"/>
               <a:cs typeface="+mn-cs"/>
             </a:endParaRPr>
+          </a:p>
+          <a:p>
+            <a:pPr marL="0" marR="0" lvl="0" indent="0" algn="l" defTabSz="914400" rtl="0" eaLnBrk="1" fontAlgn="auto" latinLnBrk="0" hangingPunct="1">
+              <a:lnSpc>
+                <a:spcPct val="100000"/>
+              </a:lnSpc>
+              <a:spcBef>
+                <a:spcPts val="0"/>
+              </a:spcBef>
+              <a:spcAft>
+                <a:spcPts val="0"/>
+              </a:spcAft>
+              <a:buClrTx/>
+              <a:buSzTx/>
+              <a:buFontTx/>
+              <a:buNone/>
+              <a:tabLst/>
+              <a:defRPr/>
+            </a:pPr>
+            <a:r>
+              <a:rPr lang="en-CA" sz="1200" kern="1200" dirty="0">
+                <a:solidFill>
+                  <a:schemeClr val="tx1"/>
+                </a:solidFill>
+                <a:effectLst/>
+                <a:latin typeface="+mn-lt"/>
+                <a:ea typeface="+mn-ea"/>
+                <a:cs typeface="+mn-cs"/>
+              </a:rPr>
+              <a:t>One thing to note is that model 11 and 6 are very similar in structure and include collection day of year and longitude. The only difference being that model 11 also includes salmon length.</a:t>
+            </a:r>
+          </a:p>
+          <a:p>
+            <a:pPr marL="0" marR="0" lvl="0" indent="0" algn="l" defTabSz="914400" rtl="0" eaLnBrk="1" fontAlgn="auto" latinLnBrk="0" hangingPunct="1">
+              <a:lnSpc>
+                <a:spcPct val="100000"/>
+              </a:lnSpc>
+              <a:spcBef>
+                <a:spcPts val="0"/>
+              </a:spcBef>
+              <a:spcAft>
+                <a:spcPts val="0"/>
+              </a:spcAft>
+              <a:buClrTx/>
+              <a:buSzTx/>
+              <a:buFontTx/>
+              <a:buNone/>
+              <a:tabLst/>
+              <a:defRPr/>
+            </a:pPr>
+            <a:endParaRPr lang="en-CA" sz="1200" kern="1200" dirty="0">
+              <a:solidFill>
+                <a:schemeClr val="tx1"/>
+              </a:solidFill>
+              <a:effectLst/>
+              <a:latin typeface="+mn-lt"/>
+              <a:ea typeface="+mn-ea"/>
+              <a:cs typeface="+mn-cs"/>
+            </a:endParaRPr>
+          </a:p>
+          <a:p>
+            <a:pPr marL="0" marR="0" lvl="0" indent="0" algn="l" defTabSz="914400" rtl="0" eaLnBrk="1" fontAlgn="auto" latinLnBrk="0" hangingPunct="1">
+              <a:lnSpc>
+                <a:spcPct val="100000"/>
+              </a:lnSpc>
+              <a:spcBef>
+                <a:spcPts val="0"/>
+              </a:spcBef>
+              <a:spcAft>
+                <a:spcPts val="0"/>
+              </a:spcAft>
+              <a:buClrTx/>
+              <a:buSzTx/>
+              <a:buFontTx/>
+              <a:buNone/>
+              <a:tabLst/>
+              <a:defRPr/>
+            </a:pPr>
+            <a:r>
+              <a:rPr lang="en-CA" sz="1200" kern="1200" dirty="0">
+                <a:solidFill>
+                  <a:schemeClr val="tx1"/>
+                </a:solidFill>
+                <a:effectLst/>
+                <a:latin typeface="+mn-lt"/>
+                <a:ea typeface="+mn-ea"/>
+                <a:cs typeface="+mn-cs"/>
+              </a:rPr>
+              <a:t>One thing to consider is that these AIC results only pick the simplest model out of the set of candidate models that we decided to compare based on our understanding of the ecosystem.</a:t>
+            </a:r>
           </a:p>
           <a:p>
             <a:pPr marL="0" marR="0" lvl="0" indent="0" algn="l" defTabSz="914400" rtl="0" eaLnBrk="1" fontAlgn="auto" latinLnBrk="0" hangingPunct="1">
@@ -2212,7 +2302,7 @@
                 <a:ea typeface="+mn-ea"/>
                 <a:cs typeface="+mn-cs"/>
               </a:rPr>
-              <a:t>Model 11 and 6 coefficient plots show that longitude and day of year have a small, negative relationship with otolith and they are useful predictors because the confidence intervals do not overlap with zero.</a:t>
+              <a:t>Model 11 and 6 coefficient plots show that longitude and day of year have a small, negative relationship with otolith and therefore are useful predictors since the confidence intervals do not overlap with zero.</a:t>
             </a:r>
           </a:p>
           <a:p>
@@ -2271,7 +2361,7 @@
                 <a:ea typeface="+mn-ea"/>
                 <a:cs typeface="+mn-cs"/>
               </a:rPr>
-              <a:t>However, salmon length is not a useful predictor as the confidence interval overlaps with zero. Although, salmon length has a small positive relationship with otolith width.</a:t>
+              <a:t>However, salmon length is not a useful predictor as the confidence interval overlaps with zero. Although, salmon length does have a small positive relationship with otolith width.</a:t>
             </a:r>
           </a:p>
           <a:p>
@@ -3235,7 +3325,7 @@
                 <a:ea typeface="+mn-ea"/>
                 <a:cs typeface="+mn-cs"/>
               </a:rPr>
-              <a:t>A third limitation is that otolith width versus salmon length shows few salmon below 62cm in addition to  model overprediction in this range. This could be due to gape limitation or size restrictions &gt;62cm for recreational catch.</a:t>
+              <a:t>A third limitation is that otolith width versus salmon length shows few salmon below 62cm in addition to model overprediction in this range. This could be due to gape limitation or size restrictions &gt;62cm for recreational catch.</a:t>
             </a:r>
           </a:p>
           <a:p>
@@ -6804,19 +6894,93 @@
         </p:nvSpPr>
         <p:spPr/>
         <p:txBody>
-          <a:bodyPr/>
-          <a:lstStyle/>
-          <a:p>
+          <a:bodyPr>
+            <a:normAutofit fontScale="85000" lnSpcReduction="10000"/>
+          </a:bodyPr>
+          <a:lstStyle/>
+          <a:p>
+            <a:pPr marL="0" indent="0">
+              <a:buNone/>
+            </a:pPr>
             <a:r>
               <a:rPr lang="en-US" dirty="0"/>
-              <a:t>Results in context of existing knowledge</a:t>
-            </a:r>
-          </a:p>
-          <a:p>
+              <a:t>The importance longitude and day of year for explaining variation in herring size may reflect:</a:t>
+            </a:r>
+          </a:p>
+          <a:p>
+            <a:endParaRPr lang="en-US" dirty="0"/>
+          </a:p>
+          <a:p>
+            <a:pPr marL="514350" indent="-514350">
+              <a:buAutoNum type="arabicPeriod"/>
+            </a:pPr>
             <a:r>
               <a:rPr lang="en-US" dirty="0"/>
-              <a:t>Future research questions</a:t>
-            </a:r>
+              <a:t>High herring abundance observed along east coast Vancouver Island</a:t>
+            </a:r>
+          </a:p>
+          <a:p>
+            <a:pPr marL="514350" indent="-514350">
+              <a:buAutoNum type="arabicPeriod"/>
+            </a:pPr>
+            <a:r>
+              <a:rPr lang="en-US" dirty="0"/>
+              <a:t>High abundance of large herring near Hornby/Denman Island during spring spawning</a:t>
+            </a:r>
+          </a:p>
+          <a:p>
+            <a:pPr marL="514350" indent="-514350">
+              <a:buAutoNum type="arabicPeriod"/>
+            </a:pPr>
+            <a:r>
+              <a:rPr lang="en-US" dirty="0"/>
+              <a:t>Small, young-of-the-year juvenile herring in June diets</a:t>
+            </a:r>
+          </a:p>
+          <a:p>
+            <a:pPr marL="514350" indent="-514350">
+              <a:buAutoNum type="arabicPeriod"/>
+            </a:pPr>
+            <a:endParaRPr lang="en-US" dirty="0"/>
+          </a:p>
+          <a:p>
+            <a:pPr marL="0" indent="0">
+              <a:buNone/>
+            </a:pPr>
+            <a:r>
+              <a:rPr lang="en-US" dirty="0"/>
+              <a:t>Salmon length?</a:t>
+            </a:r>
+          </a:p>
+          <a:p>
+            <a:pPr marL="0" indent="0">
+              <a:buNone/>
+            </a:pPr>
+            <a:r>
+              <a:rPr lang="en-US" dirty="0"/>
+              <a:t>Not important predictor but…</a:t>
+            </a:r>
+          </a:p>
+          <a:p>
+            <a:pPr marL="0" indent="0">
+              <a:buNone/>
+            </a:pPr>
+            <a:r>
+              <a:rPr lang="en-US" dirty="0"/>
+              <a:t>Increasing prey size with increasing predator size consistent with other studies</a:t>
+            </a:r>
+          </a:p>
+          <a:p>
+            <a:pPr marL="514350" indent="-514350">
+              <a:buAutoNum type="arabicPeriod"/>
+            </a:pPr>
+            <a:endParaRPr lang="en-US" dirty="0"/>
+          </a:p>
+          <a:p>
+            <a:pPr marL="514350" indent="-514350">
+              <a:buAutoNum type="arabicPeriod"/>
+            </a:pPr>
+            <a:endParaRPr lang="en-US" dirty="0"/>
           </a:p>
         </p:txBody>
       </p:sp>
@@ -7592,8 +7756,39 @@
             </a:pPr>
             <a:r>
               <a:rPr lang="en-US" dirty="0"/>
-              <a:t>Model 11 - </a:t>
-            </a:r>
+              <a:t>Model 11 &lt;- </a:t>
+            </a:r>
+            <a:r>
+              <a:rPr lang="en-US" dirty="0" err="1"/>
+              <a:t>oto.width</a:t>
+            </a:r>
+            <a:r>
+              <a:rPr lang="en-US" dirty="0"/>
+              <a:t> ~ day of year + longitude + salmon length + random effect (salmon ID)</a:t>
+            </a:r>
+          </a:p>
+          <a:p>
+            <a:pPr marL="0" indent="0">
+              <a:buNone/>
+            </a:pPr>
+            <a:r>
+              <a:rPr lang="en-US" dirty="0"/>
+              <a:t>Model 6 &lt;- </a:t>
+            </a:r>
+            <a:r>
+              <a:rPr lang="en-US" dirty="0" err="1"/>
+              <a:t>oto.width</a:t>
+            </a:r>
+            <a:r>
+              <a:rPr lang="en-US" dirty="0"/>
+              <a:t> ~ day of year + longitude + random effect (salmon ID)</a:t>
+            </a:r>
+          </a:p>
+          <a:p>
+            <a:pPr marL="0" indent="0">
+              <a:buNone/>
+            </a:pPr>
+            <a:endParaRPr lang="en-US" dirty="0"/>
           </a:p>
         </p:txBody>
       </p:sp>
@@ -7768,10 +7963,110 @@
           <a:bodyPr/>
           <a:lstStyle/>
           <a:p>
+            <a:pPr marL="0" lvl="0" indent="0">
+              <a:lnSpc>
+                <a:spcPct val="100000"/>
+              </a:lnSpc>
+              <a:spcBef>
+                <a:spcPts val="0"/>
+              </a:spcBef>
+              <a:buNone/>
+              <a:defRPr/>
+            </a:pPr>
             <a:r>
               <a:rPr lang="en-US" dirty="0"/>
-              <a:t>In the context of results and hypotheses</a:t>
-            </a:r>
+              <a:t>Herring size vs. salmon length – positive, linear (yes)</a:t>
+            </a:r>
+          </a:p>
+          <a:p>
+            <a:pPr marL="0" lvl="0" indent="0">
+              <a:lnSpc>
+                <a:spcPct val="100000"/>
+              </a:lnSpc>
+              <a:spcBef>
+                <a:spcPts val="0"/>
+              </a:spcBef>
+              <a:buNone/>
+              <a:defRPr/>
+            </a:pPr>
+            <a:r>
+              <a:rPr lang="en-US" dirty="0"/>
+              <a:t>Herring size vs. longitude – negative, linear relationship (or nonlinear) (yes)</a:t>
+            </a:r>
+          </a:p>
+          <a:p>
+            <a:pPr marL="0" indent="0">
+              <a:lnSpc>
+                <a:spcPct val="100000"/>
+              </a:lnSpc>
+              <a:spcBef>
+                <a:spcPts val="0"/>
+              </a:spcBef>
+              <a:buNone/>
+              <a:defRPr/>
+            </a:pPr>
+            <a:r>
+              <a:rPr lang="en-US" dirty="0"/>
+              <a:t>Herring size vs. collection day of year – positive, linear (no)</a:t>
+            </a:r>
+          </a:p>
+          <a:p>
+            <a:pPr marL="0" indent="0">
+              <a:lnSpc>
+                <a:spcPct val="100000"/>
+              </a:lnSpc>
+              <a:spcBef>
+                <a:spcPts val="0"/>
+              </a:spcBef>
+              <a:buNone/>
+              <a:defRPr/>
+            </a:pPr>
+            <a:endParaRPr lang="en-US" dirty="0"/>
+          </a:p>
+          <a:p>
+            <a:pPr marL="0" indent="0">
+              <a:lnSpc>
+                <a:spcPct val="100000"/>
+              </a:lnSpc>
+              <a:spcBef>
+                <a:spcPts val="0"/>
+              </a:spcBef>
+              <a:buNone/>
+              <a:defRPr/>
+            </a:pPr>
+            <a:r>
+              <a:rPr lang="en-US" dirty="0"/>
+              <a:t>Longitude</a:t>
+            </a:r>
+          </a:p>
+          <a:p>
+            <a:pPr marL="0" indent="0">
+              <a:lnSpc>
+                <a:spcPct val="100000"/>
+              </a:lnSpc>
+              <a:spcBef>
+                <a:spcPts val="0"/>
+              </a:spcBef>
+              <a:buNone/>
+              <a:defRPr/>
+            </a:pPr>
+            <a:r>
+              <a:rPr lang="en-US" dirty="0"/>
+              <a:t>Collection day of year</a:t>
+            </a:r>
+          </a:p>
+          <a:p>
+            <a:pPr marL="0" lvl="0" indent="0">
+              <a:lnSpc>
+                <a:spcPct val="100000"/>
+              </a:lnSpc>
+              <a:spcBef>
+                <a:spcPts val="0"/>
+              </a:spcBef>
+              <a:buNone/>
+              <a:defRPr/>
+            </a:pPr>
+            <a:endParaRPr lang="en-US" dirty="0"/>
           </a:p>
         </p:txBody>
       </p:sp>
@@ -7854,7 +8149,7 @@
           <a:bodyPr/>
           <a:lstStyle/>
           <a:p>
-            <a:endParaRPr lang="en-US"/>
+            <a:endParaRPr lang="en-US" dirty="0"/>
           </a:p>
         </p:txBody>
       </p:sp>
@@ -7911,7 +8206,7 @@
           <a:p>
             <a:r>
               <a:rPr lang="en-US" dirty="0"/>
-              <a:t>Discussion</a:t>
+              <a:t>Limitations</a:t>
             </a:r>
           </a:p>
         </p:txBody>
@@ -7934,13 +8229,67 @@
         </p:nvSpPr>
         <p:spPr/>
         <p:txBody>
-          <a:bodyPr/>
-          <a:lstStyle/>
-          <a:p>
+          <a:bodyPr>
+            <a:normAutofit/>
+          </a:bodyPr>
+          <a:lstStyle/>
+          <a:p>
+            <a:pPr marL="0" indent="0">
+              <a:buNone/>
+            </a:pPr>
             <a:r>
               <a:rPr lang="en-US" dirty="0"/>
-              <a:t>Limitations to data analysis approach</a:t>
-            </a:r>
+              <a:t>1. Longitude – reflects spatial size distribution of herring in Salish Sea</a:t>
+            </a:r>
+          </a:p>
+          <a:p>
+            <a:pPr marL="0" indent="0">
+              <a:buNone/>
+            </a:pPr>
+            <a:r>
+              <a:rPr lang="en-US" dirty="0"/>
+              <a:t>	Solution: model capture location as a categorical variable</a:t>
+            </a:r>
+          </a:p>
+          <a:p>
+            <a:pPr marL="0" indent="0">
+              <a:buNone/>
+            </a:pPr>
+            <a:r>
+              <a:rPr lang="en-US" dirty="0"/>
+              <a:t>2. Day of Year – reflects two or more herring age classes</a:t>
+            </a:r>
+          </a:p>
+          <a:p>
+            <a:pPr marL="0" indent="0">
+              <a:buNone/>
+            </a:pPr>
+            <a:r>
+              <a:rPr lang="en-US" dirty="0"/>
+              <a:t>	Solution : model age classes separately</a:t>
+            </a:r>
+          </a:p>
+          <a:p>
+            <a:pPr marL="0" indent="0">
+              <a:buNone/>
+            </a:pPr>
+            <a:r>
+              <a:rPr lang="en-US" dirty="0"/>
+              <a:t>3. Salmon length – few salmon below &lt;62cm + overprediction due to size restrictions or gap limitation</a:t>
+            </a:r>
+          </a:p>
+          <a:p>
+            <a:pPr marL="0" indent="0">
+              <a:buNone/>
+            </a:pPr>
+            <a:r>
+              <a:rPr lang="en-US" dirty="0"/>
+              <a:t>	Solution : model with and without fish &lt; 62cm</a:t>
+            </a:r>
+          </a:p>
+          <a:p>
+            <a:pPr lvl="1"/>
+            <a:endParaRPr lang="en-US" dirty="0"/>
           </a:p>
         </p:txBody>
       </p:sp>

</xml_diff>

<commit_message>
Changed results slide and removed "linear" - linear model not supported.
</commit_message>
<xml_diff>
--- a/ES data project presentation_salmon diet.pptx
+++ b/ES data project presentation_salmon diet.pptx
@@ -12018,7 +12018,7 @@
           <a:p>
             <a:r>
               <a:rPr lang="en-US" dirty="0"/>
-              <a:t>We used a linear mixed-effects model as our response variable, otolith width (mm), was normally distributed and explanatory variables show few missing values or outliers.</a:t>
+              <a:t>We used a linear mixed-effects model as we assumed a normal probability distribution of our response variable, otolith width (mm) and explanatory variables show few missing values or outliers.</a:t>
             </a:r>
           </a:p>
           <a:p>
@@ -18083,7 +18083,7 @@
           <a:lstStyle/>
           <a:p>
             <a:r>
-              <a:rPr lang="en-US"/>
+              <a:rPr lang="en-US" dirty="0"/>
               <a:t>Description of Data</a:t>
             </a:r>
           </a:p>
@@ -18922,7 +18922,7 @@
           <p:nvPr>
             <p:extLst>
               <p:ext uri="{D42A27DB-BD31-4B8C-83A1-F6EECF244321}">
-                <p14:modId xmlns:p14="http://schemas.microsoft.com/office/powerpoint/2010/main" val="2032574833"/>
+                <p14:modId xmlns:p14="http://schemas.microsoft.com/office/powerpoint/2010/main" val="463043509"/>
               </p:ext>
             </p:extLst>
           </p:nvPr>
@@ -19212,7 +19212,7 @@
                       </a:pPr>
                       <a:r>
                         <a:rPr lang="en-US" sz="2000" dirty="0"/>
-                        <a:t>positive, linear</a:t>
+                        <a:t>positive</a:t>
                       </a:r>
                     </a:p>
                   </a:txBody>
@@ -19360,8 +19360,8 @@
                         <a:defRPr/>
                       </a:pPr>
                       <a:r>
-                        <a:rPr lang="en-US" sz="2000"/>
-                        <a:t>negative, linear</a:t>
+                        <a:rPr lang="en-US" sz="2000" dirty="0"/>
+                        <a:t>negative</a:t>
                       </a:r>
                     </a:p>
                   </a:txBody>
@@ -19527,28 +19527,8 @@
                       </a:pPr>
                       <a:r>
                         <a:rPr lang="en-US" sz="2000" dirty="0"/>
-                        <a:t>negative, linear </a:t>
+                        <a:t>negative</a:t>
                       </a:r>
-                    </a:p>
-                    <a:p>
-                      <a:pPr marL="0" marR="0" lvl="0" indent="0" algn="l" defTabSz="914400" rtl="0" eaLnBrk="1" fontAlgn="auto" latinLnBrk="0" hangingPunct="1">
-                        <a:lnSpc>
-                          <a:spcPct val="100000"/>
-                        </a:lnSpc>
-                        <a:spcBef>
-                          <a:spcPts val="0"/>
-                        </a:spcBef>
-                        <a:spcAft>
-                          <a:spcPts val="0"/>
-                        </a:spcAft>
-                        <a:buClrTx/>
-                        <a:buSzTx/>
-                        <a:buFontTx/>
-                        <a:buNone/>
-                        <a:tabLst/>
-                        <a:defRPr/>
-                      </a:pPr>
-                      <a:endParaRPr lang="en-US" sz="2000" dirty="0"/>
                     </a:p>
                   </a:txBody>
                   <a:tcPr marL="86003" marR="86003" marT="43001" marB="43001">

</xml_diff>

<commit_message>
Saving new ggplot figures, and adding to power point
</commit_message>
<xml_diff>
--- a/ES data project presentation_salmon diet.pptx
+++ b/ES data project presentation_salmon diet.pptx
@@ -11,9 +11,9 @@
     <p:sldId id="256" r:id="rId2"/>
     <p:sldId id="257" r:id="rId3"/>
     <p:sldId id="258" r:id="rId4"/>
-    <p:sldId id="259" r:id="rId5"/>
-    <p:sldId id="268" r:id="rId6"/>
-    <p:sldId id="265" r:id="rId7"/>
+    <p:sldId id="265" r:id="rId5"/>
+    <p:sldId id="259" r:id="rId6"/>
+    <p:sldId id="268" r:id="rId7"/>
     <p:sldId id="260" r:id="rId8"/>
     <p:sldId id="267" r:id="rId9"/>
     <p:sldId id="266" r:id="rId10"/>
@@ -125,9 +125,9 @@
             <p14:sldId id="256"/>
             <p14:sldId id="257"/>
             <p14:sldId id="258"/>
+            <p14:sldId id="265"/>
             <p14:sldId id="259"/>
             <p14:sldId id="268"/>
-            <p14:sldId id="265"/>
             <p14:sldId id="260"/>
             <p14:sldId id="267"/>
             <p14:sldId id="266"/>
@@ -3235,11 +3235,11 @@
   </dgm:ptLst>
   <dgm:cxnLst>
     <dgm:cxn modelId="{198E4900-501C-2A46-9FE3-CE4FC21FF13F}" type="presOf" srcId="{8B5945AF-6974-4C42-85DE-6FE5B77CAAD0}" destId="{1B419109-793A-C548-906A-3E4EC6136ECF}" srcOrd="0" destOrd="0" presId="urn:microsoft.com/office/officeart/2016/7/layout/VerticalSolidActionList"/>
-    <dgm:cxn modelId="{29628A50-01D9-4346-8D80-F434D85AC7A9}" srcId="{297A0520-2764-4C8F-9AE0-DB732A67FFED}" destId="{D0560927-EC29-4DAE-A6B8-DB41B3BE44A1}" srcOrd="2" destOrd="0" parTransId="{E9959DDF-DD7E-4CA3-BCBF-624AB268D8CC}" sibTransId="{2D3DF4F7-04B1-4F56-9E9E-0A6B2E1B9B54}"/>
-    <dgm:cxn modelId="{484DF257-622D-8F49-A9E1-5C53BBD6989F}" type="presOf" srcId="{8B3E616F-C7D6-4D3D-8241-73AF0A807405}" destId="{8A7AFA50-C14A-A443-8EA4-D394A74BFAC9}" srcOrd="0" destOrd="0" presId="urn:microsoft.com/office/officeart/2016/7/layout/VerticalSolidActionList"/>
     <dgm:cxn modelId="{10DE1866-6007-4F52-914D-F4842E3BB28B}" srcId="{297A0520-2764-4C8F-9AE0-DB732A67FFED}" destId="{8B5945AF-6974-4C42-85DE-6FE5B77CAAD0}" srcOrd="0" destOrd="0" parTransId="{B1E30F8F-A431-4AC2-9AC6-64ABBF0D16B1}" sibTransId="{145EB648-2E3B-44D3-A0E9-770EA0C1B91C}"/>
     <dgm:cxn modelId="{C7BE2867-9893-3248-B435-5974809AB438}" type="presOf" srcId="{42C608DF-D208-47D0-A4A5-0318AEAA01B3}" destId="{79C994EE-5A2E-8D44-91DC-12CD97F62F4A}" srcOrd="0" destOrd="1" presId="urn:microsoft.com/office/officeart/2016/7/layout/VerticalSolidActionList"/>
     <dgm:cxn modelId="{0916DD6E-0B82-9C49-9EFE-03B57969AC2B}" type="presOf" srcId="{9D259188-6A99-40D5-8EA9-0C64AEB35365}" destId="{BECE8E23-732B-9B45-8B64-11217D7FC135}" srcOrd="0" destOrd="0" presId="urn:microsoft.com/office/officeart/2016/7/layout/VerticalSolidActionList"/>
+    <dgm:cxn modelId="{29628A50-01D9-4346-8D80-F434D85AC7A9}" srcId="{297A0520-2764-4C8F-9AE0-DB732A67FFED}" destId="{D0560927-EC29-4DAE-A6B8-DB41B3BE44A1}" srcOrd="2" destOrd="0" parTransId="{E9959DDF-DD7E-4CA3-BCBF-624AB268D8CC}" sibTransId="{2D3DF4F7-04B1-4F56-9E9E-0A6B2E1B9B54}"/>
+    <dgm:cxn modelId="{484DF257-622D-8F49-A9E1-5C53BBD6989F}" type="presOf" srcId="{8B3E616F-C7D6-4D3D-8241-73AF0A807405}" destId="{8A7AFA50-C14A-A443-8EA4-D394A74BFAC9}" srcOrd="0" destOrd="0" presId="urn:microsoft.com/office/officeart/2016/7/layout/VerticalSolidActionList"/>
     <dgm:cxn modelId="{9DAB7478-DE8F-6E4D-A7E5-F8D2154272C6}" type="presOf" srcId="{09682588-D3C6-4778-981A-D5364B733FD9}" destId="{79C994EE-5A2E-8D44-91DC-12CD97F62F4A}" srcOrd="0" destOrd="0" presId="urn:microsoft.com/office/officeart/2016/7/layout/VerticalSolidActionList"/>
     <dgm:cxn modelId="{EA2AA387-761C-704E-8050-F9E3E79A063F}" type="presOf" srcId="{21DB5743-0C4C-431C-898D-AFE203F0CB13}" destId="{79C994EE-5A2E-8D44-91DC-12CD97F62F4A}" srcOrd="0" destOrd="2" presId="urn:microsoft.com/office/officeart/2016/7/layout/VerticalSolidActionList"/>
     <dgm:cxn modelId="{8FABFF88-744C-4971-BCEF-ACF423B3D9E1}" srcId="{D0560927-EC29-4DAE-A6B8-DB41B3BE44A1}" destId="{09682588-D3C6-4778-981A-D5364B733FD9}" srcOrd="0" destOrd="0" parTransId="{98C43AD8-9C76-4F23-BC62-8D9211286AE1}" sibTransId="{04F41029-6065-4CF6-820A-27500A26B0B5}"/>
@@ -3711,11 +3711,11 @@
     <dgm:cxn modelId="{69AC8839-3401-7545-9C8B-5AD3D7B58070}" type="presOf" srcId="{0A2BFB30-5821-4D71-A0E1-D750127A9613}" destId="{92F8E101-6E38-BE46-94D1-06250D0D8A1A}" srcOrd="1" destOrd="0" presId="urn:microsoft.com/office/officeart/2005/8/layout/hierarchy2"/>
     <dgm:cxn modelId="{38C38D3D-462D-4C53-88D0-DB64F7734256}" srcId="{50CCE8C1-96AF-4331-9A36-5000DBE83E63}" destId="{AD116BD0-3C86-4D3B-A2F8-35B8385FD208}" srcOrd="0" destOrd="0" parTransId="{793DF6B1-4B98-46C5-B892-00F3D730B4E7}" sibTransId="{2807683D-DAD6-47B8-800F-EE6975C69FED}"/>
     <dgm:cxn modelId="{D8A02140-2206-4FAE-9B03-E178B696FB74}" srcId="{0C95A4E1-262D-4E19-ACB7-A38805AED670}" destId="{4DBB116F-3746-43D2-B665-E776645284DF}" srcOrd="1" destOrd="0" parTransId="{91DB206D-EBD3-4F7A-8590-3EC9DF056653}" sibTransId="{22AAB314-9420-49F1-BA8D-35682DEE5FDD}"/>
-    <dgm:cxn modelId="{46CA9D4F-75CC-CB4B-A601-78AB2C844B00}" type="presOf" srcId="{0A2BFB30-5821-4D71-A0E1-D750127A9613}" destId="{DC799E38-EA97-494A-A050-73455285DEEA}" srcOrd="0" destOrd="0" presId="urn:microsoft.com/office/officeart/2005/8/layout/hierarchy2"/>
     <dgm:cxn modelId="{C696AC63-EED7-4A64-8765-6DDCB7B8534B}" srcId="{0C95A4E1-262D-4E19-ACB7-A38805AED670}" destId="{963E4C02-2D06-4D55-828F-964C83EE32E4}" srcOrd="0" destOrd="0" parTransId="{0A2BFB30-5821-4D71-A0E1-D750127A9613}" sibTransId="{E5666B12-3AEC-40EB-8D7B-A1FF7179D77C}"/>
     <dgm:cxn modelId="{AF3B0368-6692-5E49-8FC2-1F1F274A05E7}" type="presOf" srcId="{91DB206D-EBD3-4F7A-8590-3EC9DF056653}" destId="{4FF8A282-69A3-B045-84FF-808D94DCB60E}" srcOrd="0" destOrd="0" presId="urn:microsoft.com/office/officeart/2005/8/layout/hierarchy2"/>
     <dgm:cxn modelId="{CCBBEC6C-D1A5-486D-84BC-78E74D572399}" srcId="{0C95A4E1-262D-4E19-ACB7-A38805AED670}" destId="{D96713FE-930C-4C89-96C9-796B5EDC58FF}" srcOrd="2" destOrd="0" parTransId="{136DADE0-F75D-43AE-A2F9-D3EFE3FFFA6B}" sibTransId="{1795F154-CAB8-4D7C-9A7D-B63A586BFBC8}"/>
     <dgm:cxn modelId="{75F5FE6D-5157-C948-BC23-A3F85FF493B3}" type="presOf" srcId="{D96713FE-930C-4C89-96C9-796B5EDC58FF}" destId="{F1859255-EE4F-D144-9DF4-36F37160FF74}" srcOrd="0" destOrd="0" presId="urn:microsoft.com/office/officeart/2005/8/layout/hierarchy2"/>
+    <dgm:cxn modelId="{46CA9D4F-75CC-CB4B-A601-78AB2C844B00}" type="presOf" srcId="{0A2BFB30-5821-4D71-A0E1-D750127A9613}" destId="{DC799E38-EA97-494A-A050-73455285DEEA}" srcOrd="0" destOrd="0" presId="urn:microsoft.com/office/officeart/2005/8/layout/hierarchy2"/>
     <dgm:cxn modelId="{D4CD3C78-7DB0-CA46-9B8A-9D6517DBEB39}" type="presOf" srcId="{4DBB116F-3746-43D2-B665-E776645284DF}" destId="{1265E470-36B3-2344-B164-D7838CBF6E18}" srcOrd="0" destOrd="0" presId="urn:microsoft.com/office/officeart/2005/8/layout/hierarchy2"/>
     <dgm:cxn modelId="{5ECA1879-6866-C242-A3E2-149452A30613}" type="presOf" srcId="{50CCE8C1-96AF-4331-9A36-5000DBE83E63}" destId="{DA635CDC-CEAB-8D4B-B350-871DE3032519}" srcOrd="0" destOrd="0" presId="urn:microsoft.com/office/officeart/2005/8/layout/hierarchy2"/>
     <dgm:cxn modelId="{F57E878A-5C4F-8A40-8A35-98C190A03B78}" type="presOf" srcId="{136DADE0-F75D-43AE-A2F9-D3EFE3FFFA6B}" destId="{52261F02-7788-4444-B4A2-BCE3A9F71FA1}" srcOrd="0" destOrd="0" presId="urn:microsoft.com/office/officeart/2005/8/layout/hierarchy2"/>
@@ -10348,7 +10348,7 @@
           <a:p>
             <a:fld id="{EE49B232-0CCD-EA45-8373-748F71E32B73}" type="datetimeFigureOut">
               <a:rPr lang="en-US" smtClean="0"/>
-              <a:t>4/6/20</a:t>
+              <a:t>4/6/2020</a:t>
             </a:fld>
             <a:endParaRPr lang="en-US"/>
           </a:p>
@@ -11945,6 +11945,205 @@
           <a:bodyPr/>
           <a:lstStyle/>
           <a:p>
+            <a:pPr marL="0" marR="0" lvl="0" indent="0" algn="l" defTabSz="914400" rtl="0" eaLnBrk="1" fontAlgn="auto" latinLnBrk="0" hangingPunct="1">
+              <a:lnSpc>
+                <a:spcPct val="100000"/>
+              </a:lnSpc>
+              <a:spcBef>
+                <a:spcPts val="0"/>
+              </a:spcBef>
+              <a:spcAft>
+                <a:spcPts val="0"/>
+              </a:spcAft>
+              <a:buClrTx/>
+              <a:buSzTx/>
+              <a:buFontTx/>
+              <a:buNone/>
+              <a:tabLst/>
+              <a:defRPr/>
+            </a:pPr>
+            <a:r>
+              <a:rPr lang="en-CA" sz="1200" kern="1200" dirty="0">
+                <a:solidFill>
+                  <a:schemeClr val="tx1"/>
+                </a:solidFill>
+                <a:effectLst/>
+                <a:latin typeface="+mn-lt"/>
+                <a:ea typeface="+mn-ea"/>
+                <a:cs typeface="+mn-cs"/>
+              </a:rPr>
+              <a:t>Model 11 and 6 coefficient plots show that longitude and day of year have a small, negative relationship with otolith and therefore are useful predictors since the confidence intervals do not overlap with zero.</a:t>
+            </a:r>
+          </a:p>
+          <a:p>
+            <a:pPr marL="0" marR="0" lvl="0" indent="0" algn="l" defTabSz="914400" rtl="0" eaLnBrk="1" fontAlgn="auto" latinLnBrk="0" hangingPunct="1">
+              <a:lnSpc>
+                <a:spcPct val="100000"/>
+              </a:lnSpc>
+              <a:spcBef>
+                <a:spcPts val="0"/>
+              </a:spcBef>
+              <a:spcAft>
+                <a:spcPts val="0"/>
+              </a:spcAft>
+              <a:buClrTx/>
+              <a:buSzTx/>
+              <a:buFontTx/>
+              <a:buNone/>
+              <a:tabLst/>
+              <a:defRPr/>
+            </a:pPr>
+            <a:endParaRPr lang="en-CA" sz="1200" kern="1200" dirty="0">
+              <a:solidFill>
+                <a:schemeClr val="tx1"/>
+              </a:solidFill>
+              <a:effectLst/>
+              <a:latin typeface="+mn-lt"/>
+              <a:ea typeface="+mn-ea"/>
+              <a:cs typeface="+mn-cs"/>
+            </a:endParaRPr>
+          </a:p>
+          <a:p>
+            <a:pPr marL="0" marR="0" lvl="0" indent="0" algn="l" defTabSz="914400" rtl="0" eaLnBrk="1" fontAlgn="auto" latinLnBrk="0" hangingPunct="1">
+              <a:lnSpc>
+                <a:spcPct val="100000"/>
+              </a:lnSpc>
+              <a:spcBef>
+                <a:spcPts val="0"/>
+              </a:spcBef>
+              <a:spcAft>
+                <a:spcPts val="0"/>
+              </a:spcAft>
+              <a:buClrTx/>
+              <a:buSzTx/>
+              <a:buFontTx/>
+              <a:buNone/>
+              <a:tabLst/>
+              <a:defRPr/>
+            </a:pPr>
+            <a:r>
+              <a:rPr lang="en-CA" sz="1200" kern="1200" dirty="0">
+                <a:solidFill>
+                  <a:schemeClr val="tx1"/>
+                </a:solidFill>
+                <a:effectLst/>
+                <a:latin typeface="+mn-lt"/>
+                <a:ea typeface="+mn-ea"/>
+                <a:cs typeface="+mn-cs"/>
+              </a:rPr>
+              <a:t>However, salmon length is not a useful predictor as the confidence interval overlaps with zero. Although, salmon length does have a small positive relationship with otolith width.</a:t>
+            </a:r>
+          </a:p>
+          <a:p>
+            <a:pPr marL="0" marR="0" lvl="0" indent="0" algn="l" defTabSz="914400" rtl="0" eaLnBrk="1" fontAlgn="auto" latinLnBrk="0" hangingPunct="1">
+              <a:lnSpc>
+                <a:spcPct val="100000"/>
+              </a:lnSpc>
+              <a:spcBef>
+                <a:spcPts val="0"/>
+              </a:spcBef>
+              <a:spcAft>
+                <a:spcPts val="0"/>
+              </a:spcAft>
+              <a:buClrTx/>
+              <a:buSzTx/>
+              <a:buFontTx/>
+              <a:buNone/>
+              <a:tabLst/>
+              <a:defRPr/>
+            </a:pPr>
+            <a:endParaRPr lang="en-CA" sz="1200" kern="1200" dirty="0">
+              <a:solidFill>
+                <a:schemeClr val="tx1"/>
+              </a:solidFill>
+              <a:effectLst/>
+              <a:latin typeface="+mn-lt"/>
+              <a:ea typeface="+mn-ea"/>
+              <a:cs typeface="+mn-cs"/>
+            </a:endParaRPr>
+          </a:p>
+        </p:txBody>
+      </p:sp>
+      <p:sp>
+        <p:nvSpPr>
+          <p:cNvPr id="4" name="Slide Number Placeholder 3"/>
+          <p:cNvSpPr>
+            <a:spLocks noGrp="1"/>
+          </p:cNvSpPr>
+          <p:nvPr>
+            <p:ph type="sldNum" sz="quarter" idx="5"/>
+          </p:nvPr>
+        </p:nvSpPr>
+        <p:spPr/>
+        <p:txBody>
+          <a:bodyPr/>
+          <a:lstStyle/>
+          <a:p>
+            <a:fld id="{0B1207EC-944A-E74D-8503-F6C3FC26F6F0}" type="slidenum">
+              <a:rPr lang="en-US" smtClean="0"/>
+              <a:t>4</a:t>
+            </a:fld>
+            <a:endParaRPr lang="en-US"/>
+          </a:p>
+        </p:txBody>
+      </p:sp>
+    </p:spTree>
+    <p:extLst>
+      <p:ext uri="{BB962C8B-B14F-4D97-AF65-F5344CB8AC3E}">
+        <p14:creationId xmlns:p14="http://schemas.microsoft.com/office/powerpoint/2010/main" val="3738067965"/>
+      </p:ext>
+    </p:extLst>
+  </p:cSld>
+  <p:clrMapOvr>
+    <a:masterClrMapping/>
+  </p:clrMapOvr>
+</p:notes>
+</file>
+
+<file path=ppt/notesSlides/notesSlide5.xml><?xml version="1.0" encoding="utf-8"?>
+<p:notes xmlns:a="http://schemas.openxmlformats.org/drawingml/2006/main" xmlns:r="http://schemas.openxmlformats.org/officeDocument/2006/relationships" xmlns:p="http://schemas.openxmlformats.org/presentationml/2006/main">
+  <p:cSld>
+    <p:spTree>
+      <p:nvGrpSpPr>
+        <p:cNvPr id="1" name=""/>
+        <p:cNvGrpSpPr/>
+        <p:nvPr/>
+      </p:nvGrpSpPr>
+      <p:grpSpPr>
+        <a:xfrm>
+          <a:off x="0" y="0"/>
+          <a:ext cx="0" cy="0"/>
+          <a:chOff x="0" y="0"/>
+          <a:chExt cx="0" cy="0"/>
+        </a:xfrm>
+      </p:grpSpPr>
+      <p:sp>
+        <p:nvSpPr>
+          <p:cNvPr id="2" name="Slide Image Placeholder 1"/>
+          <p:cNvSpPr>
+            <a:spLocks noGrp="1" noRot="1" noChangeAspect="1"/>
+          </p:cNvSpPr>
+          <p:nvPr>
+            <p:ph type="sldImg"/>
+          </p:nvPr>
+        </p:nvSpPr>
+        <p:spPr/>
+      </p:sp>
+      <p:sp>
+        <p:nvSpPr>
+          <p:cNvPr id="3" name="Notes Placeholder 2"/>
+          <p:cNvSpPr>
+            <a:spLocks noGrp="1"/>
+          </p:cNvSpPr>
+          <p:nvPr>
+            <p:ph type="body" idx="1"/>
+          </p:nvPr>
+        </p:nvSpPr>
+        <p:spPr/>
+        <p:txBody>
+          <a:bodyPr/>
+          <a:lstStyle/>
+          <a:p>
             <a:r>
               <a:rPr lang="en-US" dirty="0"/>
               <a:t>We used AIC to compare candidate linear mixed-effects models fit with maximum likelihood estimation.</a:t>
@@ -12062,7 +12261,7 @@
           <a:p>
             <a:fld id="{0B1207EC-944A-E74D-8503-F6C3FC26F6F0}" type="slidenum">
               <a:rPr lang="en-US" smtClean="0"/>
-              <a:t>4</a:t>
+              <a:t>5</a:t>
             </a:fld>
             <a:endParaRPr lang="en-US"/>
           </a:p>
@@ -12072,267 +12271,6 @@
     <p:extLst>
       <p:ext uri="{BB962C8B-B14F-4D97-AF65-F5344CB8AC3E}">
         <p14:creationId xmlns:p14="http://schemas.microsoft.com/office/powerpoint/2010/main" val="340181587"/>
-      </p:ext>
-    </p:extLst>
-  </p:cSld>
-  <p:clrMapOvr>
-    <a:masterClrMapping/>
-  </p:clrMapOvr>
-</p:notes>
-</file>
-
-<file path=ppt/notesSlides/notesSlide5.xml><?xml version="1.0" encoding="utf-8"?>
-<p:notes xmlns:a="http://schemas.openxmlformats.org/drawingml/2006/main" xmlns:r="http://schemas.openxmlformats.org/officeDocument/2006/relationships" xmlns:p="http://schemas.openxmlformats.org/presentationml/2006/main">
-  <p:cSld>
-    <p:spTree>
-      <p:nvGrpSpPr>
-        <p:cNvPr id="1" name=""/>
-        <p:cNvGrpSpPr/>
-        <p:nvPr/>
-      </p:nvGrpSpPr>
-      <p:grpSpPr>
-        <a:xfrm>
-          <a:off x="0" y="0"/>
-          <a:ext cx="0" cy="0"/>
-          <a:chOff x="0" y="0"/>
-          <a:chExt cx="0" cy="0"/>
-        </a:xfrm>
-      </p:grpSpPr>
-      <p:sp>
-        <p:nvSpPr>
-          <p:cNvPr id="2" name="Slide Image Placeholder 1"/>
-          <p:cNvSpPr>
-            <a:spLocks noGrp="1" noRot="1" noChangeAspect="1"/>
-          </p:cNvSpPr>
-          <p:nvPr>
-            <p:ph type="sldImg"/>
-          </p:nvPr>
-        </p:nvSpPr>
-        <p:spPr/>
-      </p:sp>
-      <p:sp>
-        <p:nvSpPr>
-          <p:cNvPr id="3" name="Notes Placeholder 2"/>
-          <p:cNvSpPr>
-            <a:spLocks noGrp="1"/>
-          </p:cNvSpPr>
-          <p:nvPr>
-            <p:ph type="body" idx="1"/>
-          </p:nvPr>
-        </p:nvSpPr>
-        <p:spPr/>
-        <p:txBody>
-          <a:bodyPr/>
-          <a:lstStyle/>
-          <a:p>
-            <a:pPr marL="0" marR="0" lvl="0" indent="0" algn="l" defTabSz="914400" rtl="0" eaLnBrk="1" fontAlgn="auto" latinLnBrk="0" hangingPunct="1">
-              <a:lnSpc>
-                <a:spcPct val="100000"/>
-              </a:lnSpc>
-              <a:spcBef>
-                <a:spcPts val="0"/>
-              </a:spcBef>
-              <a:spcAft>
-                <a:spcPts val="0"/>
-              </a:spcAft>
-              <a:buClrTx/>
-              <a:buSzTx/>
-              <a:buFontTx/>
-              <a:buNone/>
-              <a:tabLst/>
-              <a:defRPr/>
-            </a:pPr>
-            <a:r>
-              <a:rPr lang="en-CA" sz="1200" kern="1200" dirty="0">
-                <a:solidFill>
-                  <a:schemeClr val="tx1"/>
-                </a:solidFill>
-                <a:effectLst/>
-                <a:latin typeface="+mn-lt"/>
-                <a:ea typeface="+mn-ea"/>
-                <a:cs typeface="+mn-cs"/>
-              </a:rPr>
-              <a:t>AIC shows that model 11 and 6 best explain variation in otolith width/herring size. Although, the first X models have similar delta AIC values and weights.</a:t>
-            </a:r>
-          </a:p>
-          <a:p>
-            <a:pPr marL="0" marR="0" lvl="0" indent="0" algn="l" defTabSz="914400" rtl="0" eaLnBrk="1" fontAlgn="auto" latinLnBrk="0" hangingPunct="1">
-              <a:lnSpc>
-                <a:spcPct val="100000"/>
-              </a:lnSpc>
-              <a:spcBef>
-                <a:spcPts val="0"/>
-              </a:spcBef>
-              <a:spcAft>
-                <a:spcPts val="0"/>
-              </a:spcAft>
-              <a:buClrTx/>
-              <a:buSzTx/>
-              <a:buFontTx/>
-              <a:buNone/>
-              <a:tabLst/>
-              <a:defRPr/>
-            </a:pPr>
-            <a:endParaRPr lang="en-CA" sz="1200" kern="1200" dirty="0">
-              <a:solidFill>
-                <a:schemeClr val="tx1"/>
-              </a:solidFill>
-              <a:effectLst/>
-              <a:latin typeface="+mn-lt"/>
-              <a:ea typeface="+mn-ea"/>
-              <a:cs typeface="+mn-cs"/>
-            </a:endParaRPr>
-          </a:p>
-          <a:p>
-            <a:pPr marL="0" marR="0" lvl="0" indent="0" algn="l" defTabSz="914400" rtl="0" eaLnBrk="1" fontAlgn="auto" latinLnBrk="0" hangingPunct="1">
-              <a:lnSpc>
-                <a:spcPct val="100000"/>
-              </a:lnSpc>
-              <a:spcBef>
-                <a:spcPts val="0"/>
-              </a:spcBef>
-              <a:spcAft>
-                <a:spcPts val="0"/>
-              </a:spcAft>
-              <a:buClrTx/>
-              <a:buSzTx/>
-              <a:buFontTx/>
-              <a:buNone/>
-              <a:tabLst/>
-              <a:defRPr/>
-            </a:pPr>
-            <a:r>
-              <a:rPr lang="en-CA" sz="1200" kern="1200" dirty="0">
-                <a:solidFill>
-                  <a:schemeClr val="tx1"/>
-                </a:solidFill>
-                <a:effectLst/>
-                <a:latin typeface="+mn-lt"/>
-                <a:ea typeface="+mn-ea"/>
-                <a:cs typeface="+mn-cs"/>
-              </a:rPr>
-              <a:t>One thing to note is that model 11 and 6 are very similar in structure and include collection day of year and longitude. The only difference being that model 11 also includes salmon length.</a:t>
-            </a:r>
-          </a:p>
-          <a:p>
-            <a:pPr marL="0" marR="0" lvl="0" indent="0" algn="l" defTabSz="914400" rtl="0" eaLnBrk="1" fontAlgn="auto" latinLnBrk="0" hangingPunct="1">
-              <a:lnSpc>
-                <a:spcPct val="100000"/>
-              </a:lnSpc>
-              <a:spcBef>
-                <a:spcPts val="0"/>
-              </a:spcBef>
-              <a:spcAft>
-                <a:spcPts val="0"/>
-              </a:spcAft>
-              <a:buClrTx/>
-              <a:buSzTx/>
-              <a:buFontTx/>
-              <a:buNone/>
-              <a:tabLst/>
-              <a:defRPr/>
-            </a:pPr>
-            <a:endParaRPr lang="en-CA" sz="1200" kern="1200" dirty="0">
-              <a:solidFill>
-                <a:schemeClr val="tx1"/>
-              </a:solidFill>
-              <a:effectLst/>
-              <a:latin typeface="+mn-lt"/>
-              <a:ea typeface="+mn-ea"/>
-              <a:cs typeface="+mn-cs"/>
-            </a:endParaRPr>
-          </a:p>
-          <a:p>
-            <a:pPr marL="0" marR="0" lvl="0" indent="0" algn="l" defTabSz="914400" rtl="0" eaLnBrk="1" fontAlgn="auto" latinLnBrk="0" hangingPunct="1">
-              <a:lnSpc>
-                <a:spcPct val="100000"/>
-              </a:lnSpc>
-              <a:spcBef>
-                <a:spcPts val="0"/>
-              </a:spcBef>
-              <a:spcAft>
-                <a:spcPts val="0"/>
-              </a:spcAft>
-              <a:buClrTx/>
-              <a:buSzTx/>
-              <a:buFontTx/>
-              <a:buNone/>
-              <a:tabLst/>
-              <a:defRPr/>
-            </a:pPr>
-            <a:r>
-              <a:rPr lang="en-CA" sz="1200" kern="1200" dirty="0">
-                <a:solidFill>
-                  <a:schemeClr val="tx1"/>
-                </a:solidFill>
-                <a:effectLst/>
-                <a:latin typeface="+mn-lt"/>
-                <a:ea typeface="+mn-ea"/>
-                <a:cs typeface="+mn-cs"/>
-              </a:rPr>
-              <a:t>One thing to consider is that these AIC results only pick the simplest model out of the set of candidate models that we decided to compare based on our understanding of the ecosystem.</a:t>
-            </a:r>
-          </a:p>
-          <a:p>
-            <a:pPr marL="0" marR="0" lvl="0" indent="0" algn="l" defTabSz="914400" rtl="0" eaLnBrk="1" fontAlgn="auto" latinLnBrk="0" hangingPunct="1">
-              <a:lnSpc>
-                <a:spcPct val="100000"/>
-              </a:lnSpc>
-              <a:spcBef>
-                <a:spcPts val="0"/>
-              </a:spcBef>
-              <a:spcAft>
-                <a:spcPts val="0"/>
-              </a:spcAft>
-              <a:buClrTx/>
-              <a:buSzTx/>
-              <a:buFontTx/>
-              <a:buNone/>
-              <a:tabLst/>
-              <a:defRPr/>
-            </a:pPr>
-            <a:endParaRPr lang="en-CA" sz="1200" kern="1200" dirty="0">
-              <a:solidFill>
-                <a:schemeClr val="tx1"/>
-              </a:solidFill>
-              <a:effectLst/>
-              <a:latin typeface="+mn-lt"/>
-              <a:ea typeface="+mn-ea"/>
-              <a:cs typeface="+mn-cs"/>
-            </a:endParaRPr>
-          </a:p>
-          <a:p>
-            <a:endParaRPr lang="en-US" dirty="0"/>
-          </a:p>
-        </p:txBody>
-      </p:sp>
-      <p:sp>
-        <p:nvSpPr>
-          <p:cNvPr id="4" name="Slide Number Placeholder 3"/>
-          <p:cNvSpPr>
-            <a:spLocks noGrp="1"/>
-          </p:cNvSpPr>
-          <p:nvPr>
-            <p:ph type="sldNum" sz="quarter" idx="5"/>
-          </p:nvPr>
-        </p:nvSpPr>
-        <p:spPr/>
-        <p:txBody>
-          <a:bodyPr/>
-          <a:lstStyle/>
-          <a:p>
-            <a:fld id="{0B1207EC-944A-E74D-8503-F6C3FC26F6F0}" type="slidenum">
-              <a:rPr lang="en-US" smtClean="0"/>
-              <a:t>5</a:t>
-            </a:fld>
-            <a:endParaRPr lang="en-US"/>
-          </a:p>
-        </p:txBody>
-      </p:sp>
-    </p:spTree>
-    <p:extLst>
-      <p:ext uri="{BB962C8B-B14F-4D97-AF65-F5344CB8AC3E}">
-        <p14:creationId xmlns:p14="http://schemas.microsoft.com/office/powerpoint/2010/main" val="3860927967"/>
       </p:ext>
     </p:extLst>
   </p:cSld>
@@ -12413,7 +12351,7 @@
                 <a:ea typeface="+mn-ea"/>
                 <a:cs typeface="+mn-cs"/>
               </a:rPr>
-              <a:t>Model 11 and 6 coefficient plots show that longitude and day of year have a small, negative relationship with otolith and therefore are useful predictors since the confidence intervals do not overlap with zero.</a:t>
+              <a:t>AIC shows that model 11 and 6 best explain variation in otolith width/herring size. Although, the first X models have similar delta AIC values and weights.</a:t>
             </a:r>
           </a:p>
           <a:p>
@@ -12472,7 +12410,7 @@
                 <a:ea typeface="+mn-ea"/>
                 <a:cs typeface="+mn-cs"/>
               </a:rPr>
-              <a:t>However, salmon length is not a useful predictor as the confidence interval overlaps with zero. Although, salmon length does have a small positive relationship with otolith width.</a:t>
+              <a:t>One thing to note is that model 11 and 6 are very similar in structure and include collection day of year and longitude. The only difference being that model 11 also includes salmon length.</a:t>
             </a:r>
           </a:p>
           <a:p>
@@ -12503,6 +12441,68 @@
               <a:cs typeface="+mn-cs"/>
             </a:endParaRPr>
           </a:p>
+          <a:p>
+            <a:pPr marL="0" marR="0" lvl="0" indent="0" algn="l" defTabSz="914400" rtl="0" eaLnBrk="1" fontAlgn="auto" latinLnBrk="0" hangingPunct="1">
+              <a:lnSpc>
+                <a:spcPct val="100000"/>
+              </a:lnSpc>
+              <a:spcBef>
+                <a:spcPts val="0"/>
+              </a:spcBef>
+              <a:spcAft>
+                <a:spcPts val="0"/>
+              </a:spcAft>
+              <a:buClrTx/>
+              <a:buSzTx/>
+              <a:buFontTx/>
+              <a:buNone/>
+              <a:tabLst/>
+              <a:defRPr/>
+            </a:pPr>
+            <a:r>
+              <a:rPr lang="en-CA" sz="1200" kern="1200" dirty="0">
+                <a:solidFill>
+                  <a:schemeClr val="tx1"/>
+                </a:solidFill>
+                <a:effectLst/>
+                <a:latin typeface="+mn-lt"/>
+                <a:ea typeface="+mn-ea"/>
+                <a:cs typeface="+mn-cs"/>
+              </a:rPr>
+              <a:t>One thing to consider is that these AIC results only pick the simplest model out of the set of candidate models that we decided to compare based on our understanding of the ecosystem.</a:t>
+            </a:r>
+          </a:p>
+          <a:p>
+            <a:pPr marL="0" marR="0" lvl="0" indent="0" algn="l" defTabSz="914400" rtl="0" eaLnBrk="1" fontAlgn="auto" latinLnBrk="0" hangingPunct="1">
+              <a:lnSpc>
+                <a:spcPct val="100000"/>
+              </a:lnSpc>
+              <a:spcBef>
+                <a:spcPts val="0"/>
+              </a:spcBef>
+              <a:spcAft>
+                <a:spcPts val="0"/>
+              </a:spcAft>
+              <a:buClrTx/>
+              <a:buSzTx/>
+              <a:buFontTx/>
+              <a:buNone/>
+              <a:tabLst/>
+              <a:defRPr/>
+            </a:pPr>
+            <a:endParaRPr lang="en-CA" sz="1200" kern="1200" dirty="0">
+              <a:solidFill>
+                <a:schemeClr val="tx1"/>
+              </a:solidFill>
+              <a:effectLst/>
+              <a:latin typeface="+mn-lt"/>
+              <a:ea typeface="+mn-ea"/>
+              <a:cs typeface="+mn-cs"/>
+            </a:endParaRPr>
+          </a:p>
+          <a:p>
+            <a:endParaRPr lang="en-US" dirty="0"/>
+          </a:p>
         </p:txBody>
       </p:sp>
       <p:sp>
@@ -12531,7 +12531,7 @@
     </p:spTree>
     <p:extLst>
       <p:ext uri="{BB962C8B-B14F-4D97-AF65-F5344CB8AC3E}">
-        <p14:creationId xmlns:p14="http://schemas.microsoft.com/office/powerpoint/2010/main" val="3738067965"/>
+        <p14:creationId xmlns:p14="http://schemas.microsoft.com/office/powerpoint/2010/main" val="3860927967"/>
       </p:ext>
     </p:extLst>
   </p:cSld>
@@ -12672,6 +12672,65 @@
                 <a:cs typeface="+mn-cs"/>
               </a:rPr>
               <a:t>However, the negative relationship between otolith width and collection day contradict our hypothesis of a positive relationship between these variables.</a:t>
+            </a:r>
+          </a:p>
+          <a:p>
+            <a:pPr marL="0" marR="0" lvl="0" indent="0" algn="l" defTabSz="914400" rtl="0" eaLnBrk="1" fontAlgn="auto" latinLnBrk="0" hangingPunct="1">
+              <a:lnSpc>
+                <a:spcPct val="100000"/>
+              </a:lnSpc>
+              <a:spcBef>
+                <a:spcPts val="0"/>
+              </a:spcBef>
+              <a:spcAft>
+                <a:spcPts val="0"/>
+              </a:spcAft>
+              <a:buClrTx/>
+              <a:buSzTx/>
+              <a:buFontTx/>
+              <a:buNone/>
+              <a:tabLst/>
+              <a:defRPr/>
+            </a:pPr>
+            <a:endParaRPr lang="en-CA" sz="1200" kern="1200" dirty="0">
+              <a:solidFill>
+                <a:schemeClr val="tx1"/>
+              </a:solidFill>
+              <a:effectLst/>
+              <a:latin typeface="+mn-lt"/>
+              <a:ea typeface="+mn-ea"/>
+              <a:cs typeface="+mn-cs"/>
+            </a:endParaRPr>
+          </a:p>
+          <a:p>
+            <a:pPr marL="0" marR="0" lvl="0" indent="0" algn="l" defTabSz="914400" rtl="0" eaLnBrk="1" fontAlgn="auto" latinLnBrk="0" hangingPunct="1">
+              <a:lnSpc>
+                <a:spcPct val="100000"/>
+              </a:lnSpc>
+              <a:spcBef>
+                <a:spcPts val="0"/>
+              </a:spcBef>
+              <a:spcAft>
+                <a:spcPts val="0"/>
+              </a:spcAft>
+              <a:buClrTx/>
+              <a:buSzTx/>
+              <a:buFontTx/>
+              <a:buNone/>
+              <a:tabLst/>
+              <a:defRPr/>
+            </a:pPr>
+            <a:r>
+              <a:rPr lang="en-CA" sz="1200" kern="1200" dirty="0">
+                <a:solidFill>
+                  <a:schemeClr val="tx1"/>
+                </a:solidFill>
+                <a:effectLst/>
+                <a:latin typeface="+mn-lt"/>
+                <a:ea typeface="+mn-ea"/>
+                <a:cs typeface="+mn-cs"/>
+              </a:rPr>
+              <a:t>None of these relationships appeared to be linear.</a:t>
             </a:r>
           </a:p>
           <a:p>
@@ -13642,7 +13701,7 @@
           <a:p>
             <a:fld id="{3E52D604-0742-9243-810E-1096192DBA15}" type="datetimeFigureOut">
               <a:rPr lang="en-US" smtClean="0"/>
-              <a:t>4/6/20</a:t>
+              <a:t>4/6/2020</a:t>
             </a:fld>
             <a:endParaRPr lang="en-US"/>
           </a:p>
@@ -13812,7 +13871,7 @@
           <a:p>
             <a:fld id="{3E52D604-0742-9243-810E-1096192DBA15}" type="datetimeFigureOut">
               <a:rPr lang="en-US" smtClean="0"/>
-              <a:t>4/6/20</a:t>
+              <a:t>4/6/2020</a:t>
             </a:fld>
             <a:endParaRPr lang="en-US"/>
           </a:p>
@@ -13992,7 +14051,7 @@
           <a:p>
             <a:fld id="{3E52D604-0742-9243-810E-1096192DBA15}" type="datetimeFigureOut">
               <a:rPr lang="en-US" smtClean="0"/>
-              <a:t>4/6/20</a:t>
+              <a:t>4/6/2020</a:t>
             </a:fld>
             <a:endParaRPr lang="en-US"/>
           </a:p>
@@ -14162,7 +14221,7 @@
           <a:p>
             <a:fld id="{3E52D604-0742-9243-810E-1096192DBA15}" type="datetimeFigureOut">
               <a:rPr lang="en-US" smtClean="0"/>
-              <a:t>4/6/20</a:t>
+              <a:t>4/6/2020</a:t>
             </a:fld>
             <a:endParaRPr lang="en-US"/>
           </a:p>
@@ -14408,7 +14467,7 @@
           <a:p>
             <a:fld id="{3E52D604-0742-9243-810E-1096192DBA15}" type="datetimeFigureOut">
               <a:rPr lang="en-US" smtClean="0"/>
-              <a:t>4/6/20</a:t>
+              <a:t>4/6/2020</a:t>
             </a:fld>
             <a:endParaRPr lang="en-US"/>
           </a:p>
@@ -14640,7 +14699,7 @@
           <a:p>
             <a:fld id="{3E52D604-0742-9243-810E-1096192DBA15}" type="datetimeFigureOut">
               <a:rPr lang="en-US" smtClean="0"/>
-              <a:t>4/6/20</a:t>
+              <a:t>4/6/2020</a:t>
             </a:fld>
             <a:endParaRPr lang="en-US"/>
           </a:p>
@@ -15007,7 +15066,7 @@
           <a:p>
             <a:fld id="{3E52D604-0742-9243-810E-1096192DBA15}" type="datetimeFigureOut">
               <a:rPr lang="en-US" smtClean="0"/>
-              <a:t>4/6/20</a:t>
+              <a:t>4/6/2020</a:t>
             </a:fld>
             <a:endParaRPr lang="en-US"/>
           </a:p>
@@ -15125,7 +15184,7 @@
           <a:p>
             <a:fld id="{3E52D604-0742-9243-810E-1096192DBA15}" type="datetimeFigureOut">
               <a:rPr lang="en-US" smtClean="0"/>
-              <a:t>4/6/20</a:t>
+              <a:t>4/6/2020</a:t>
             </a:fld>
             <a:endParaRPr lang="en-US"/>
           </a:p>
@@ -15220,7 +15279,7 @@
           <a:p>
             <a:fld id="{3E52D604-0742-9243-810E-1096192DBA15}" type="datetimeFigureOut">
               <a:rPr lang="en-US" smtClean="0"/>
-              <a:t>4/6/20</a:t>
+              <a:t>4/6/2020</a:t>
             </a:fld>
             <a:endParaRPr lang="en-US"/>
           </a:p>
@@ -15497,7 +15556,7 @@
           <a:p>
             <a:fld id="{3E52D604-0742-9243-810E-1096192DBA15}" type="datetimeFigureOut">
               <a:rPr lang="en-US" smtClean="0"/>
-              <a:t>4/6/20</a:t>
+              <a:t>4/6/2020</a:t>
             </a:fld>
             <a:endParaRPr lang="en-US"/>
           </a:p>
@@ -15754,7 +15813,7 @@
           <a:p>
             <a:fld id="{3E52D604-0742-9243-810E-1096192DBA15}" type="datetimeFigureOut">
               <a:rPr lang="en-US" smtClean="0"/>
-              <a:t>4/6/20</a:t>
+              <a:t>4/6/2020</a:t>
             </a:fld>
             <a:endParaRPr lang="en-US"/>
           </a:p>
@@ -15967,7 +16026,7 @@
           <a:p>
             <a:fld id="{3E52D604-0742-9243-810E-1096192DBA15}" type="datetimeFigureOut">
               <a:rPr lang="en-US" smtClean="0"/>
-              <a:t>4/6/20</a:t>
+              <a:t>4/6/2020</a:t>
             </a:fld>
             <a:endParaRPr lang="en-US"/>
           </a:p>
@@ -18136,6 +18195,203 @@
 <file path=ppt/slides/slide4.xml><?xml version="1.0" encoding="utf-8"?>
 <p:sld xmlns:a="http://schemas.openxmlformats.org/drawingml/2006/main" xmlns:r="http://schemas.openxmlformats.org/officeDocument/2006/relationships" xmlns:p="http://schemas.openxmlformats.org/presentationml/2006/main">
   <p:cSld>
+    <p:spTree>
+      <p:nvGrpSpPr>
+        <p:cNvPr id="1" name=""/>
+        <p:cNvGrpSpPr/>
+        <p:nvPr/>
+      </p:nvGrpSpPr>
+      <p:grpSpPr>
+        <a:xfrm>
+          <a:off x="0" y="0"/>
+          <a:ext cx="0" cy="0"/>
+          <a:chOff x="0" y="0"/>
+          <a:chExt cx="0" cy="0"/>
+        </a:xfrm>
+      </p:grpSpPr>
+      <p:sp>
+        <p:nvSpPr>
+          <p:cNvPr id="2" name="Title 1">
+            <a:extLst>
+              <a:ext uri="{FF2B5EF4-FFF2-40B4-BE49-F238E27FC236}">
+                <a16:creationId xmlns:a16="http://schemas.microsoft.com/office/drawing/2014/main" id="{3AAFA8B7-F65A-4144-B8CA-2814837B984F}"/>
+              </a:ext>
+            </a:extLst>
+          </p:cNvPr>
+          <p:cNvSpPr>
+            <a:spLocks noGrp="1"/>
+          </p:cNvSpPr>
+          <p:nvPr>
+            <p:ph type="title"/>
+          </p:nvPr>
+        </p:nvSpPr>
+        <p:spPr/>
+        <p:txBody>
+          <a:bodyPr/>
+          <a:lstStyle/>
+          <a:p>
+            <a:r>
+              <a:rPr lang="en-US" dirty="0"/>
+              <a:t>Describing the data</a:t>
+            </a:r>
+          </a:p>
+        </p:txBody>
+      </p:sp>
+      <p:pic>
+        <p:nvPicPr>
+          <p:cNvPr id="23" name="Content Placeholder 22">
+            <a:extLst>
+              <a:ext uri="{FF2B5EF4-FFF2-40B4-BE49-F238E27FC236}">
+                <a16:creationId xmlns:a16="http://schemas.microsoft.com/office/drawing/2014/main" id="{FAA3E23F-58FE-4E91-8F16-9FE74AA196B4}"/>
+              </a:ext>
+            </a:extLst>
+          </p:cNvPr>
+          <p:cNvPicPr>
+            <a:picLocks noGrp="1" noChangeAspect="1"/>
+          </p:cNvPicPr>
+          <p:nvPr>
+            <p:ph idx="1"/>
+          </p:nvPr>
+        </p:nvPicPr>
+        <p:blipFill>
+          <a:blip r:embed="rId3"/>
+          <a:stretch>
+            <a:fillRect/>
+          </a:stretch>
+        </p:blipFill>
+        <p:spPr>
+          <a:xfrm>
+            <a:off x="5992500" y="1452146"/>
+            <a:ext cx="5040001" cy="2520000"/>
+          </a:xfrm>
+          <a:ln w="28575">
+            <a:solidFill>
+              <a:schemeClr val="accent2"/>
+            </a:solidFill>
+          </a:ln>
+        </p:spPr>
+      </p:pic>
+      <p:pic>
+        <p:nvPicPr>
+          <p:cNvPr id="25" name="Picture 24">
+            <a:extLst>
+              <a:ext uri="{FF2B5EF4-FFF2-40B4-BE49-F238E27FC236}">
+                <a16:creationId xmlns:a16="http://schemas.microsoft.com/office/drawing/2014/main" id="{CA093F6E-65ED-45B6-83B9-8B02975B45A5}"/>
+              </a:ext>
+            </a:extLst>
+          </p:cNvPr>
+          <p:cNvPicPr>
+            <a:picLocks noChangeAspect="1"/>
+          </p:cNvPicPr>
+          <p:nvPr/>
+        </p:nvPicPr>
+        <p:blipFill>
+          <a:blip r:embed="rId4"/>
+          <a:stretch>
+            <a:fillRect/>
+          </a:stretch>
+        </p:blipFill>
+        <p:spPr>
+          <a:xfrm>
+            <a:off x="5992500" y="4069192"/>
+            <a:ext cx="5040001" cy="2520000"/>
+          </a:xfrm>
+          <a:prstGeom prst="rect">
+            <a:avLst/>
+          </a:prstGeom>
+          <a:ln w="28575">
+            <a:solidFill>
+              <a:schemeClr val="accent2"/>
+            </a:solidFill>
+          </a:ln>
+        </p:spPr>
+      </p:pic>
+      <p:pic>
+        <p:nvPicPr>
+          <p:cNvPr id="27" name="Picture 26">
+            <a:extLst>
+              <a:ext uri="{FF2B5EF4-FFF2-40B4-BE49-F238E27FC236}">
+                <a16:creationId xmlns:a16="http://schemas.microsoft.com/office/drawing/2014/main" id="{168E52BD-0874-4D1A-85FB-18103AAFBB34}"/>
+              </a:ext>
+            </a:extLst>
+          </p:cNvPr>
+          <p:cNvPicPr>
+            <a:picLocks noChangeAspect="1"/>
+          </p:cNvPicPr>
+          <p:nvPr/>
+        </p:nvPicPr>
+        <p:blipFill>
+          <a:blip r:embed="rId5"/>
+          <a:stretch>
+            <a:fillRect/>
+          </a:stretch>
+        </p:blipFill>
+        <p:spPr>
+          <a:xfrm>
+            <a:off x="838200" y="4069192"/>
+            <a:ext cx="5040001" cy="2520000"/>
+          </a:xfrm>
+          <a:prstGeom prst="rect">
+            <a:avLst/>
+          </a:prstGeom>
+          <a:ln w="28575">
+            <a:solidFill>
+              <a:schemeClr val="accent2"/>
+            </a:solidFill>
+          </a:ln>
+        </p:spPr>
+      </p:pic>
+      <p:pic>
+        <p:nvPicPr>
+          <p:cNvPr id="29" name="Picture 28">
+            <a:extLst>
+              <a:ext uri="{FF2B5EF4-FFF2-40B4-BE49-F238E27FC236}">
+                <a16:creationId xmlns:a16="http://schemas.microsoft.com/office/drawing/2014/main" id="{81388BC4-7696-4EE5-8A07-863C5D70F037}"/>
+              </a:ext>
+            </a:extLst>
+          </p:cNvPr>
+          <p:cNvPicPr>
+            <a:picLocks noChangeAspect="1"/>
+          </p:cNvPicPr>
+          <p:nvPr/>
+        </p:nvPicPr>
+        <p:blipFill>
+          <a:blip r:embed="rId6"/>
+          <a:stretch>
+            <a:fillRect/>
+          </a:stretch>
+        </p:blipFill>
+        <p:spPr>
+          <a:xfrm>
+            <a:off x="838200" y="1452146"/>
+            <a:ext cx="5040001" cy="2520000"/>
+          </a:xfrm>
+          <a:prstGeom prst="rect">
+            <a:avLst/>
+          </a:prstGeom>
+          <a:ln w="28575">
+            <a:solidFill>
+              <a:schemeClr val="accent2"/>
+            </a:solidFill>
+          </a:ln>
+        </p:spPr>
+      </p:pic>
+    </p:spTree>
+    <p:extLst>
+      <p:ext uri="{BB962C8B-B14F-4D97-AF65-F5344CB8AC3E}">
+        <p14:creationId xmlns:p14="http://schemas.microsoft.com/office/powerpoint/2010/main" val="2154362521"/>
+      </p:ext>
+    </p:extLst>
+  </p:cSld>
+  <p:clrMapOvr>
+    <a:masterClrMapping/>
+  </p:clrMapOvr>
+</p:sld>
+</file>
+
+<file path=ppt/slides/slide5.xml><?xml version="1.0" encoding="utf-8"?>
+<p:sld xmlns:a="http://schemas.openxmlformats.org/drawingml/2006/main" xmlns:r="http://schemas.openxmlformats.org/officeDocument/2006/relationships" xmlns:p="http://schemas.openxmlformats.org/presentationml/2006/main">
+  <p:cSld>
     <p:bg>
       <p:bgPr>
         <a:solidFill>
@@ -18233,7 +18489,7 @@
 </p:sld>
 </file>
 
-<file path=ppt/slides/slide5.xml><?xml version="1.0" encoding="utf-8"?>
+<file path=ppt/slides/slide6.xml><?xml version="1.0" encoding="utf-8"?>
 <p:sld xmlns:a="http://schemas.openxmlformats.org/drawingml/2006/main" xmlns:r="http://schemas.openxmlformats.org/officeDocument/2006/relationships" xmlns:p="http://schemas.openxmlformats.org/presentationml/2006/main">
   <p:cSld>
     <p:spTree>
@@ -18273,8 +18529,52 @@
           <a:p>
             <a:r>
               <a:rPr lang="en-US" dirty="0"/>
-              <a:t>AIC results</a:t>
+              <a:t>Results</a:t>
             </a:r>
+          </a:p>
+        </p:txBody>
+      </p:sp>
+      <p:sp>
+        <p:nvSpPr>
+          <p:cNvPr id="10" name="Rectangle 9">
+            <a:extLst>
+              <a:ext uri="{FF2B5EF4-FFF2-40B4-BE49-F238E27FC236}">
+                <a16:creationId xmlns:a16="http://schemas.microsoft.com/office/drawing/2014/main" id="{4F302CCA-1770-4D48-9088-8749DA40875D}"/>
+              </a:ext>
+            </a:extLst>
+          </p:cNvPr>
+          <p:cNvSpPr/>
+          <p:nvPr/>
+        </p:nvSpPr>
+        <p:spPr>
+          <a:xfrm>
+            <a:off x="838200" y="1433253"/>
+            <a:ext cx="10515600" cy="444373"/>
+          </a:xfrm>
+          <a:prstGeom prst="rect">
+            <a:avLst/>
+          </a:prstGeom>
+        </p:spPr>
+        <p:style>
+          <a:lnRef idx="0">
+            <a:schemeClr val="accent2"/>
+          </a:lnRef>
+          <a:fillRef idx="3">
+            <a:schemeClr val="accent2"/>
+          </a:fillRef>
+          <a:effectRef idx="3">
+            <a:schemeClr val="accent2"/>
+          </a:effectRef>
+          <a:fontRef idx="minor">
+            <a:schemeClr val="lt1"/>
+          </a:fontRef>
+        </p:style>
+        <p:txBody>
+          <a:bodyPr rtlCol="0" anchor="ctr"/>
+          <a:lstStyle/>
+          <a:p>
+            <a:pPr algn="ctr"/>
+            <a:endParaRPr lang="en-CA"/>
           </a:p>
         </p:txBody>
       </p:sp>
@@ -18294,46 +18594,548 @@
             <p:ph idx="1"/>
           </p:nvPr>
         </p:nvSpPr>
-        <p:spPr/>
+        <p:spPr>
+          <a:xfrm>
+            <a:off x="838200" y="1433253"/>
+            <a:ext cx="10515600" cy="532026"/>
+          </a:xfrm>
+        </p:spPr>
         <p:txBody>
-          <a:bodyPr/>
+          <a:bodyPr>
+            <a:normAutofit/>
+          </a:bodyPr>
           <a:lstStyle/>
           <a:p>
             <a:pPr marL="0" indent="0">
               <a:buNone/>
             </a:pPr>
             <a:r>
-              <a:rPr lang="en-US" dirty="0"/>
+              <a:rPr lang="en-US" u="sng" dirty="0"/>
+              <a:t>AIC test</a:t>
+            </a:r>
+          </a:p>
+          <a:p>
+            <a:pPr marL="0" indent="0">
+              <a:buNone/>
+            </a:pPr>
+            <a:endParaRPr lang="en-US" dirty="0"/>
+          </a:p>
+        </p:txBody>
+      </p:sp>
+      <p:pic>
+        <p:nvPicPr>
+          <p:cNvPr id="7" name="Picture 6">
+            <a:extLst>
+              <a:ext uri="{FF2B5EF4-FFF2-40B4-BE49-F238E27FC236}">
+                <a16:creationId xmlns:a16="http://schemas.microsoft.com/office/drawing/2014/main" id="{7F4697FF-9A79-48ED-B635-3BE411F897F6}"/>
+              </a:ext>
+            </a:extLst>
+          </p:cNvPr>
+          <p:cNvPicPr>
+            <a:picLocks noChangeAspect="1"/>
+          </p:cNvPicPr>
+          <p:nvPr/>
+        </p:nvPicPr>
+        <p:blipFill>
+          <a:blip r:embed="rId3"/>
+          <a:stretch>
+            <a:fillRect/>
+          </a:stretch>
+        </p:blipFill>
+        <p:spPr>
+          <a:xfrm>
+            <a:off x="2994546" y="3633846"/>
+            <a:ext cx="5718057" cy="2859029"/>
+          </a:xfrm>
+          <a:prstGeom prst="rect">
+            <a:avLst/>
+          </a:prstGeom>
+        </p:spPr>
+      </p:pic>
+      <p:sp>
+        <p:nvSpPr>
+          <p:cNvPr id="11" name="Rectangle 10">
+            <a:extLst>
+              <a:ext uri="{FF2B5EF4-FFF2-40B4-BE49-F238E27FC236}">
+                <a16:creationId xmlns:a16="http://schemas.microsoft.com/office/drawing/2014/main" id="{5588F75F-83C4-437D-88FE-119675221DAA}"/>
+              </a:ext>
+            </a:extLst>
+          </p:cNvPr>
+          <p:cNvSpPr/>
+          <p:nvPr/>
+        </p:nvSpPr>
+        <p:spPr>
+          <a:xfrm>
+            <a:off x="838200" y="2979629"/>
+            <a:ext cx="10515600" cy="444373"/>
+          </a:xfrm>
+          <a:prstGeom prst="rect">
+            <a:avLst/>
+          </a:prstGeom>
+        </p:spPr>
+        <p:style>
+          <a:lnRef idx="0">
+            <a:schemeClr val="accent2"/>
+          </a:lnRef>
+          <a:fillRef idx="3">
+            <a:schemeClr val="accent2"/>
+          </a:fillRef>
+          <a:effectRef idx="3">
+            <a:schemeClr val="accent2"/>
+          </a:effectRef>
+          <a:fontRef idx="minor">
+            <a:schemeClr val="lt1"/>
+          </a:fontRef>
+        </p:style>
+        <p:txBody>
+          <a:bodyPr rtlCol="0" anchor="ctr"/>
+          <a:lstStyle/>
+          <a:p>
+            <a:pPr algn="ctr"/>
+            <a:endParaRPr lang="en-CA"/>
+          </a:p>
+        </p:txBody>
+      </p:sp>
+      <p:sp>
+        <p:nvSpPr>
+          <p:cNvPr id="8" name="Content Placeholder 2">
+            <a:extLst>
+              <a:ext uri="{FF2B5EF4-FFF2-40B4-BE49-F238E27FC236}">
+                <a16:creationId xmlns:a16="http://schemas.microsoft.com/office/drawing/2014/main" id="{01D0B02D-6174-4F44-8854-858D97D8A108}"/>
+              </a:ext>
+            </a:extLst>
+          </p:cNvPr>
+          <p:cNvSpPr txBox="1">
+            <a:spLocks/>
+          </p:cNvSpPr>
+          <p:nvPr/>
+        </p:nvSpPr>
+        <p:spPr>
+          <a:xfrm>
+            <a:off x="838200" y="2016380"/>
+            <a:ext cx="10515600" cy="1071860"/>
+          </a:xfrm>
+          <a:prstGeom prst="rect">
+            <a:avLst/>
+          </a:prstGeom>
+        </p:spPr>
+        <p:txBody>
+          <a:bodyPr vert="horz" lIns="91440" tIns="45720" rIns="91440" bIns="45720" rtlCol="0">
+            <a:normAutofit/>
+          </a:bodyPr>
+          <a:lstStyle>
+            <a:lvl1pPr marL="228600" indent="-228600" algn="l" defTabSz="914400" rtl="0" eaLnBrk="1" latinLnBrk="0" hangingPunct="1">
+              <a:lnSpc>
+                <a:spcPct val="90000"/>
+              </a:lnSpc>
+              <a:spcBef>
+                <a:spcPts val="1000"/>
+              </a:spcBef>
+              <a:buFont typeface="Arial" panose="020B0604020202020204" pitchFamily="34" charset="0"/>
+              <a:buChar char="•"/>
+              <a:defRPr sz="2800" kern="1200">
+                <a:solidFill>
+                  <a:schemeClr val="tx1"/>
+                </a:solidFill>
+                <a:latin typeface="+mn-lt"/>
+                <a:ea typeface="+mn-ea"/>
+                <a:cs typeface="+mn-cs"/>
+              </a:defRPr>
+            </a:lvl1pPr>
+            <a:lvl2pPr marL="685800" indent="-228600" algn="l" defTabSz="914400" rtl="0" eaLnBrk="1" latinLnBrk="0" hangingPunct="1">
+              <a:lnSpc>
+                <a:spcPct val="90000"/>
+              </a:lnSpc>
+              <a:spcBef>
+                <a:spcPts val="500"/>
+              </a:spcBef>
+              <a:buFont typeface="Arial" panose="020B0604020202020204" pitchFamily="34" charset="0"/>
+              <a:buChar char="•"/>
+              <a:defRPr sz="2400" kern="1200">
+                <a:solidFill>
+                  <a:schemeClr val="tx1"/>
+                </a:solidFill>
+                <a:latin typeface="+mn-lt"/>
+                <a:ea typeface="+mn-ea"/>
+                <a:cs typeface="+mn-cs"/>
+              </a:defRPr>
+            </a:lvl2pPr>
+            <a:lvl3pPr marL="1143000" indent="-228600" algn="l" defTabSz="914400" rtl="0" eaLnBrk="1" latinLnBrk="0" hangingPunct="1">
+              <a:lnSpc>
+                <a:spcPct val="90000"/>
+              </a:lnSpc>
+              <a:spcBef>
+                <a:spcPts val="500"/>
+              </a:spcBef>
+              <a:buFont typeface="Arial" panose="020B0604020202020204" pitchFamily="34" charset="0"/>
+              <a:buChar char="•"/>
+              <a:defRPr sz="2000" kern="1200">
+                <a:solidFill>
+                  <a:schemeClr val="tx1"/>
+                </a:solidFill>
+                <a:latin typeface="+mn-lt"/>
+                <a:ea typeface="+mn-ea"/>
+                <a:cs typeface="+mn-cs"/>
+              </a:defRPr>
+            </a:lvl3pPr>
+            <a:lvl4pPr marL="1600200" indent="-228600" algn="l" defTabSz="914400" rtl="0" eaLnBrk="1" latinLnBrk="0" hangingPunct="1">
+              <a:lnSpc>
+                <a:spcPct val="90000"/>
+              </a:lnSpc>
+              <a:spcBef>
+                <a:spcPts val="500"/>
+              </a:spcBef>
+              <a:buFont typeface="Arial" panose="020B0604020202020204" pitchFamily="34" charset="0"/>
+              <a:buChar char="•"/>
+              <a:defRPr sz="1800" kern="1200">
+                <a:solidFill>
+                  <a:schemeClr val="tx1"/>
+                </a:solidFill>
+                <a:latin typeface="+mn-lt"/>
+                <a:ea typeface="+mn-ea"/>
+                <a:cs typeface="+mn-cs"/>
+              </a:defRPr>
+            </a:lvl4pPr>
+            <a:lvl5pPr marL="2057400" indent="-228600" algn="l" defTabSz="914400" rtl="0" eaLnBrk="1" latinLnBrk="0" hangingPunct="1">
+              <a:lnSpc>
+                <a:spcPct val="90000"/>
+              </a:lnSpc>
+              <a:spcBef>
+                <a:spcPts val="500"/>
+              </a:spcBef>
+              <a:buFont typeface="Arial" panose="020B0604020202020204" pitchFamily="34" charset="0"/>
+              <a:buChar char="•"/>
+              <a:defRPr sz="1800" kern="1200">
+                <a:solidFill>
+                  <a:schemeClr val="tx1"/>
+                </a:solidFill>
+                <a:latin typeface="+mn-lt"/>
+                <a:ea typeface="+mn-ea"/>
+                <a:cs typeface="+mn-cs"/>
+              </a:defRPr>
+            </a:lvl5pPr>
+            <a:lvl6pPr marL="2514600" indent="-228600" algn="l" defTabSz="914400" rtl="0" eaLnBrk="1" latinLnBrk="0" hangingPunct="1">
+              <a:lnSpc>
+                <a:spcPct val="90000"/>
+              </a:lnSpc>
+              <a:spcBef>
+                <a:spcPts val="500"/>
+              </a:spcBef>
+              <a:buFont typeface="Arial" panose="020B0604020202020204" pitchFamily="34" charset="0"/>
+              <a:buChar char="•"/>
+              <a:defRPr sz="1800" kern="1200">
+                <a:solidFill>
+                  <a:schemeClr val="tx1"/>
+                </a:solidFill>
+                <a:latin typeface="+mn-lt"/>
+                <a:ea typeface="+mn-ea"/>
+                <a:cs typeface="+mn-cs"/>
+              </a:defRPr>
+            </a:lvl6pPr>
+            <a:lvl7pPr marL="2971800" indent="-228600" algn="l" defTabSz="914400" rtl="0" eaLnBrk="1" latinLnBrk="0" hangingPunct="1">
+              <a:lnSpc>
+                <a:spcPct val="90000"/>
+              </a:lnSpc>
+              <a:spcBef>
+                <a:spcPts val="500"/>
+              </a:spcBef>
+              <a:buFont typeface="Arial" panose="020B0604020202020204" pitchFamily="34" charset="0"/>
+              <a:buChar char="•"/>
+              <a:defRPr sz="1800" kern="1200">
+                <a:solidFill>
+                  <a:schemeClr val="tx1"/>
+                </a:solidFill>
+                <a:latin typeface="+mn-lt"/>
+                <a:ea typeface="+mn-ea"/>
+                <a:cs typeface="+mn-cs"/>
+              </a:defRPr>
+            </a:lvl7pPr>
+            <a:lvl8pPr marL="3429000" indent="-228600" algn="l" defTabSz="914400" rtl="0" eaLnBrk="1" latinLnBrk="0" hangingPunct="1">
+              <a:lnSpc>
+                <a:spcPct val="90000"/>
+              </a:lnSpc>
+              <a:spcBef>
+                <a:spcPts val="500"/>
+              </a:spcBef>
+              <a:buFont typeface="Arial" panose="020B0604020202020204" pitchFamily="34" charset="0"/>
+              <a:buChar char="•"/>
+              <a:defRPr sz="1800" kern="1200">
+                <a:solidFill>
+                  <a:schemeClr val="tx1"/>
+                </a:solidFill>
+                <a:latin typeface="+mn-lt"/>
+                <a:ea typeface="+mn-ea"/>
+                <a:cs typeface="+mn-cs"/>
+              </a:defRPr>
+            </a:lvl8pPr>
+            <a:lvl9pPr marL="3886200" indent="-228600" algn="l" defTabSz="914400" rtl="0" eaLnBrk="1" latinLnBrk="0" hangingPunct="1">
+              <a:lnSpc>
+                <a:spcPct val="90000"/>
+              </a:lnSpc>
+              <a:spcBef>
+                <a:spcPts val="500"/>
+              </a:spcBef>
+              <a:buFont typeface="Arial" panose="020B0604020202020204" pitchFamily="34" charset="0"/>
+              <a:buChar char="•"/>
+              <a:defRPr sz="1800" kern="1200">
+                <a:solidFill>
+                  <a:schemeClr val="tx1"/>
+                </a:solidFill>
+                <a:latin typeface="+mn-lt"/>
+                <a:ea typeface="+mn-ea"/>
+                <a:cs typeface="+mn-cs"/>
+              </a:defRPr>
+            </a:lvl9pPr>
+          </a:lstStyle>
+          <a:p>
+            <a:pPr marL="0" indent="0">
+              <a:buFont typeface="Arial" panose="020B0604020202020204" pitchFamily="34" charset="0"/>
+              <a:buNone/>
+            </a:pPr>
+            <a:r>
+              <a:rPr lang="en-US" sz="2000" dirty="0"/>
               <a:t>Model 11 &lt;- </a:t>
             </a:r>
             <a:r>
-              <a:rPr lang="en-US" dirty="0" err="1"/>
+              <a:rPr lang="en-US" sz="2000" dirty="0" err="1"/>
               <a:t>oto.width</a:t>
             </a:r>
             <a:r>
-              <a:rPr lang="en-US" dirty="0"/>
+              <a:rPr lang="en-US" sz="2000" dirty="0"/>
               <a:t> ~ day of year + longitude + salmon length + random effect (salmon ID)</a:t>
             </a:r>
           </a:p>
           <a:p>
             <a:pPr marL="0" indent="0">
+              <a:buFont typeface="Arial" panose="020B0604020202020204" pitchFamily="34" charset="0"/>
               <a:buNone/>
             </a:pPr>
             <a:r>
-              <a:rPr lang="en-US" dirty="0"/>
+              <a:rPr lang="en-US" sz="2000" dirty="0"/>
               <a:t>Model 6 &lt;- </a:t>
             </a:r>
             <a:r>
-              <a:rPr lang="en-US" dirty="0" err="1"/>
+              <a:rPr lang="en-US" sz="2000" dirty="0" err="1"/>
               <a:t>oto.width</a:t>
             </a:r>
             <a:r>
-              <a:rPr lang="en-US" dirty="0"/>
+              <a:rPr lang="en-US" sz="2000" dirty="0"/>
               <a:t> ~ day of year + longitude + random effect (salmon ID)</a:t>
             </a:r>
           </a:p>
           <a:p>
             <a:pPr marL="0" indent="0">
+              <a:buFont typeface="Arial" panose="020B0604020202020204" pitchFamily="34" charset="0"/>
+              <a:buNone/>
+            </a:pPr>
+            <a:endParaRPr lang="en-US" dirty="0"/>
+          </a:p>
+        </p:txBody>
+      </p:sp>
+      <p:sp>
+        <p:nvSpPr>
+          <p:cNvPr id="9" name="Content Placeholder 2">
+            <a:extLst>
+              <a:ext uri="{FF2B5EF4-FFF2-40B4-BE49-F238E27FC236}">
+                <a16:creationId xmlns:a16="http://schemas.microsoft.com/office/drawing/2014/main" id="{B1622831-ED3F-441C-AE79-B38D5FC8483D}"/>
+              </a:ext>
+            </a:extLst>
+          </p:cNvPr>
+          <p:cNvSpPr txBox="1">
+            <a:spLocks/>
+          </p:cNvSpPr>
+          <p:nvPr/>
+        </p:nvSpPr>
+        <p:spPr>
+          <a:xfrm>
+            <a:off x="838200" y="2914882"/>
+            <a:ext cx="10515600" cy="532026"/>
+          </a:xfrm>
+          <a:prstGeom prst="rect">
+            <a:avLst/>
+          </a:prstGeom>
+        </p:spPr>
+        <p:txBody>
+          <a:bodyPr vert="horz" lIns="91440" tIns="45720" rIns="91440" bIns="45720" rtlCol="0">
+            <a:normAutofit/>
+          </a:bodyPr>
+          <a:lstStyle>
+            <a:lvl1pPr marL="228600" indent="-228600" algn="l" defTabSz="914400" rtl="0" eaLnBrk="1" latinLnBrk="0" hangingPunct="1">
+              <a:lnSpc>
+                <a:spcPct val="90000"/>
+              </a:lnSpc>
+              <a:spcBef>
+                <a:spcPts val="1000"/>
+              </a:spcBef>
+              <a:buFont typeface="Arial" panose="020B0604020202020204" pitchFamily="34" charset="0"/>
+              <a:buChar char="•"/>
+              <a:defRPr sz="2800" kern="1200">
+                <a:solidFill>
+                  <a:schemeClr val="tx1"/>
+                </a:solidFill>
+                <a:latin typeface="+mn-lt"/>
+                <a:ea typeface="+mn-ea"/>
+                <a:cs typeface="+mn-cs"/>
+              </a:defRPr>
+            </a:lvl1pPr>
+            <a:lvl2pPr marL="685800" indent="-228600" algn="l" defTabSz="914400" rtl="0" eaLnBrk="1" latinLnBrk="0" hangingPunct="1">
+              <a:lnSpc>
+                <a:spcPct val="90000"/>
+              </a:lnSpc>
+              <a:spcBef>
+                <a:spcPts val="500"/>
+              </a:spcBef>
+              <a:buFont typeface="Arial" panose="020B0604020202020204" pitchFamily="34" charset="0"/>
+              <a:buChar char="•"/>
+              <a:defRPr sz="2400" kern="1200">
+                <a:solidFill>
+                  <a:schemeClr val="tx1"/>
+                </a:solidFill>
+                <a:latin typeface="+mn-lt"/>
+                <a:ea typeface="+mn-ea"/>
+                <a:cs typeface="+mn-cs"/>
+              </a:defRPr>
+            </a:lvl2pPr>
+            <a:lvl3pPr marL="1143000" indent="-228600" algn="l" defTabSz="914400" rtl="0" eaLnBrk="1" latinLnBrk="0" hangingPunct="1">
+              <a:lnSpc>
+                <a:spcPct val="90000"/>
+              </a:lnSpc>
+              <a:spcBef>
+                <a:spcPts val="500"/>
+              </a:spcBef>
+              <a:buFont typeface="Arial" panose="020B0604020202020204" pitchFamily="34" charset="0"/>
+              <a:buChar char="•"/>
+              <a:defRPr sz="2000" kern="1200">
+                <a:solidFill>
+                  <a:schemeClr val="tx1"/>
+                </a:solidFill>
+                <a:latin typeface="+mn-lt"/>
+                <a:ea typeface="+mn-ea"/>
+                <a:cs typeface="+mn-cs"/>
+              </a:defRPr>
+            </a:lvl3pPr>
+            <a:lvl4pPr marL="1600200" indent="-228600" algn="l" defTabSz="914400" rtl="0" eaLnBrk="1" latinLnBrk="0" hangingPunct="1">
+              <a:lnSpc>
+                <a:spcPct val="90000"/>
+              </a:lnSpc>
+              <a:spcBef>
+                <a:spcPts val="500"/>
+              </a:spcBef>
+              <a:buFont typeface="Arial" panose="020B0604020202020204" pitchFamily="34" charset="0"/>
+              <a:buChar char="•"/>
+              <a:defRPr sz="1800" kern="1200">
+                <a:solidFill>
+                  <a:schemeClr val="tx1"/>
+                </a:solidFill>
+                <a:latin typeface="+mn-lt"/>
+                <a:ea typeface="+mn-ea"/>
+                <a:cs typeface="+mn-cs"/>
+              </a:defRPr>
+            </a:lvl4pPr>
+            <a:lvl5pPr marL="2057400" indent="-228600" algn="l" defTabSz="914400" rtl="0" eaLnBrk="1" latinLnBrk="0" hangingPunct="1">
+              <a:lnSpc>
+                <a:spcPct val="90000"/>
+              </a:lnSpc>
+              <a:spcBef>
+                <a:spcPts val="500"/>
+              </a:spcBef>
+              <a:buFont typeface="Arial" panose="020B0604020202020204" pitchFamily="34" charset="0"/>
+              <a:buChar char="•"/>
+              <a:defRPr sz="1800" kern="1200">
+                <a:solidFill>
+                  <a:schemeClr val="tx1"/>
+                </a:solidFill>
+                <a:latin typeface="+mn-lt"/>
+                <a:ea typeface="+mn-ea"/>
+                <a:cs typeface="+mn-cs"/>
+              </a:defRPr>
+            </a:lvl5pPr>
+            <a:lvl6pPr marL="2514600" indent="-228600" algn="l" defTabSz="914400" rtl="0" eaLnBrk="1" latinLnBrk="0" hangingPunct="1">
+              <a:lnSpc>
+                <a:spcPct val="90000"/>
+              </a:lnSpc>
+              <a:spcBef>
+                <a:spcPts val="500"/>
+              </a:spcBef>
+              <a:buFont typeface="Arial" panose="020B0604020202020204" pitchFamily="34" charset="0"/>
+              <a:buChar char="•"/>
+              <a:defRPr sz="1800" kern="1200">
+                <a:solidFill>
+                  <a:schemeClr val="tx1"/>
+                </a:solidFill>
+                <a:latin typeface="+mn-lt"/>
+                <a:ea typeface="+mn-ea"/>
+                <a:cs typeface="+mn-cs"/>
+              </a:defRPr>
+            </a:lvl6pPr>
+            <a:lvl7pPr marL="2971800" indent="-228600" algn="l" defTabSz="914400" rtl="0" eaLnBrk="1" latinLnBrk="0" hangingPunct="1">
+              <a:lnSpc>
+                <a:spcPct val="90000"/>
+              </a:lnSpc>
+              <a:spcBef>
+                <a:spcPts val="500"/>
+              </a:spcBef>
+              <a:buFont typeface="Arial" panose="020B0604020202020204" pitchFamily="34" charset="0"/>
+              <a:buChar char="•"/>
+              <a:defRPr sz="1800" kern="1200">
+                <a:solidFill>
+                  <a:schemeClr val="tx1"/>
+                </a:solidFill>
+                <a:latin typeface="+mn-lt"/>
+                <a:ea typeface="+mn-ea"/>
+                <a:cs typeface="+mn-cs"/>
+              </a:defRPr>
+            </a:lvl7pPr>
+            <a:lvl8pPr marL="3429000" indent="-228600" algn="l" defTabSz="914400" rtl="0" eaLnBrk="1" latinLnBrk="0" hangingPunct="1">
+              <a:lnSpc>
+                <a:spcPct val="90000"/>
+              </a:lnSpc>
+              <a:spcBef>
+                <a:spcPts val="500"/>
+              </a:spcBef>
+              <a:buFont typeface="Arial" panose="020B0604020202020204" pitchFamily="34" charset="0"/>
+              <a:buChar char="•"/>
+              <a:defRPr sz="1800" kern="1200">
+                <a:solidFill>
+                  <a:schemeClr val="tx1"/>
+                </a:solidFill>
+                <a:latin typeface="+mn-lt"/>
+                <a:ea typeface="+mn-ea"/>
+                <a:cs typeface="+mn-cs"/>
+              </a:defRPr>
+            </a:lvl8pPr>
+            <a:lvl9pPr marL="3886200" indent="-228600" algn="l" defTabSz="914400" rtl="0" eaLnBrk="1" latinLnBrk="0" hangingPunct="1">
+              <a:lnSpc>
+                <a:spcPct val="90000"/>
+              </a:lnSpc>
+              <a:spcBef>
+                <a:spcPts val="500"/>
+              </a:spcBef>
+              <a:buFont typeface="Arial" panose="020B0604020202020204" pitchFamily="34" charset="0"/>
+              <a:buChar char="•"/>
+              <a:defRPr sz="1800" kern="1200">
+                <a:solidFill>
+                  <a:schemeClr val="tx1"/>
+                </a:solidFill>
+                <a:latin typeface="+mn-lt"/>
+                <a:ea typeface="+mn-ea"/>
+                <a:cs typeface="+mn-cs"/>
+              </a:defRPr>
+            </a:lvl9pPr>
+          </a:lstStyle>
+          <a:p>
+            <a:pPr marL="0" indent="0">
+              <a:buFont typeface="Arial" panose="020B0604020202020204" pitchFamily="34" charset="0"/>
+              <a:buNone/>
+            </a:pPr>
+            <a:r>
+              <a:rPr lang="en-US" u="sng" dirty="0"/>
+              <a:t>Coefficient estimates of model: Model 11</a:t>
+            </a:r>
+          </a:p>
+          <a:p>
+            <a:pPr marL="0" indent="0">
+              <a:buFont typeface="Arial" panose="020B0604020202020204" pitchFamily="34" charset="0"/>
               <a:buNone/>
             </a:pPr>
             <a:endParaRPr lang="en-US" dirty="0"/>
@@ -18344,98 +19146,6 @@
     <p:extLst>
       <p:ext uri="{BB962C8B-B14F-4D97-AF65-F5344CB8AC3E}">
         <p14:creationId xmlns:p14="http://schemas.microsoft.com/office/powerpoint/2010/main" val="1698314766"/>
-      </p:ext>
-    </p:extLst>
-  </p:cSld>
-  <p:clrMapOvr>
-    <a:masterClrMapping/>
-  </p:clrMapOvr>
-</p:sld>
-</file>
-
-<file path=ppt/slides/slide6.xml><?xml version="1.0" encoding="utf-8"?>
-<p:sld xmlns:a="http://schemas.openxmlformats.org/drawingml/2006/main" xmlns:r="http://schemas.openxmlformats.org/officeDocument/2006/relationships" xmlns:p="http://schemas.openxmlformats.org/presentationml/2006/main">
-  <p:cSld>
-    <p:spTree>
-      <p:nvGrpSpPr>
-        <p:cNvPr id="1" name=""/>
-        <p:cNvGrpSpPr/>
-        <p:nvPr/>
-      </p:nvGrpSpPr>
-      <p:grpSpPr>
-        <a:xfrm>
-          <a:off x="0" y="0"/>
-          <a:ext cx="0" cy="0"/>
-          <a:chOff x="0" y="0"/>
-          <a:chExt cx="0" cy="0"/>
-        </a:xfrm>
-      </p:grpSpPr>
-      <p:sp>
-        <p:nvSpPr>
-          <p:cNvPr id="2" name="Title 1">
-            <a:extLst>
-              <a:ext uri="{FF2B5EF4-FFF2-40B4-BE49-F238E27FC236}">
-                <a16:creationId xmlns:a16="http://schemas.microsoft.com/office/drawing/2014/main" id="{3AAFA8B7-F65A-4144-B8CA-2814837B984F}"/>
-              </a:ext>
-            </a:extLst>
-          </p:cNvPr>
-          <p:cNvSpPr>
-            <a:spLocks noGrp="1"/>
-          </p:cNvSpPr>
-          <p:nvPr>
-            <p:ph type="title"/>
-          </p:nvPr>
-        </p:nvSpPr>
-        <p:spPr/>
-        <p:txBody>
-          <a:bodyPr/>
-          <a:lstStyle/>
-          <a:p>
-            <a:r>
-              <a:rPr lang="en-US" dirty="0"/>
-              <a:t>Coefficients plot</a:t>
-            </a:r>
-          </a:p>
-        </p:txBody>
-      </p:sp>
-      <p:sp>
-        <p:nvSpPr>
-          <p:cNvPr id="3" name="Content Placeholder 2">
-            <a:extLst>
-              <a:ext uri="{FF2B5EF4-FFF2-40B4-BE49-F238E27FC236}">
-                <a16:creationId xmlns:a16="http://schemas.microsoft.com/office/drawing/2014/main" id="{EF9DCC9C-FAF5-CB4C-830C-27537C7ECA6F}"/>
-              </a:ext>
-            </a:extLst>
-          </p:cNvPr>
-          <p:cNvSpPr>
-            <a:spLocks noGrp="1"/>
-          </p:cNvSpPr>
-          <p:nvPr>
-            <p:ph idx="1"/>
-          </p:nvPr>
-        </p:nvSpPr>
-        <p:spPr/>
-        <p:txBody>
-          <a:bodyPr/>
-          <a:lstStyle/>
-          <a:p>
-            <a:r>
-              <a:rPr lang="en-US" dirty="0"/>
-              <a:t>Model 11</a:t>
-            </a:r>
-          </a:p>
-          <a:p>
-            <a:r>
-              <a:rPr lang="en-US" dirty="0"/>
-              <a:t>Model 6</a:t>
-            </a:r>
-          </a:p>
-        </p:txBody>
-      </p:sp>
-    </p:spTree>
-    <p:extLst>
-      <p:ext uri="{BB962C8B-B14F-4D97-AF65-F5344CB8AC3E}">
-        <p14:creationId xmlns:p14="http://schemas.microsoft.com/office/powerpoint/2010/main" val="2154362521"/>
       </p:ext>
     </p:extLst>
   </p:cSld>
@@ -19610,43 +20320,250 @@
             <p:ph type="title"/>
           </p:nvPr>
         </p:nvSpPr>
-        <p:spPr/>
+        <p:spPr>
+          <a:xfrm>
+            <a:off x="837707" y="252081"/>
+            <a:ext cx="10515600" cy="1325563"/>
+          </a:xfrm>
+        </p:spPr>
         <p:txBody>
           <a:bodyPr/>
           <a:lstStyle/>
           <a:p>
             <a:r>
               <a:rPr lang="en-US" dirty="0"/>
-              <a:t>Model vs. data</a:t>
+              <a:t>Model visualized with data: Model 11</a:t>
             </a:r>
           </a:p>
         </p:txBody>
       </p:sp>
       <p:sp>
         <p:nvSpPr>
-          <p:cNvPr id="3" name="Content Placeholder 2">
+          <p:cNvPr id="10" name="Rectangle: Rounded Corners 9">
             <a:extLst>
               <a:ext uri="{FF2B5EF4-FFF2-40B4-BE49-F238E27FC236}">
-                <a16:creationId xmlns:a16="http://schemas.microsoft.com/office/drawing/2014/main" id="{D033DE1A-8062-0643-90AB-0BD81CBFD405}"/>
+                <a16:creationId xmlns:a16="http://schemas.microsoft.com/office/drawing/2014/main" id="{5174B6B5-E63A-4275-BF91-46423B4B4004}"/>
               </a:ext>
             </a:extLst>
           </p:cNvPr>
-          <p:cNvSpPr>
-            <a:spLocks noGrp="1"/>
-          </p:cNvSpPr>
+          <p:cNvSpPr/>
+          <p:nvPr/>
+        </p:nvSpPr>
+        <p:spPr>
+          <a:xfrm>
+            <a:off x="759904" y="1261422"/>
+            <a:ext cx="10803340" cy="5480571"/>
+          </a:xfrm>
+          <a:prstGeom prst="roundRect">
+            <a:avLst>
+              <a:gd name="adj" fmla="val 4238"/>
+            </a:avLst>
+          </a:prstGeom>
+          <a:solidFill>
+            <a:schemeClr val="accent2"/>
+          </a:solidFill>
+        </p:spPr>
+        <p:style>
+          <a:lnRef idx="2">
+            <a:schemeClr val="accent2"/>
+          </a:lnRef>
+          <a:fillRef idx="1">
+            <a:schemeClr val="lt1"/>
+          </a:fillRef>
+          <a:effectRef idx="0">
+            <a:schemeClr val="accent2"/>
+          </a:effectRef>
+          <a:fontRef idx="minor">
+            <a:schemeClr val="dk1"/>
+          </a:fontRef>
+        </p:style>
+        <p:txBody>
+          <a:bodyPr rtlCol="0" anchor="ctr"/>
+          <a:lstStyle/>
+          <a:p>
+            <a:pPr algn="ctr"/>
+            <a:endParaRPr lang="en-CA"/>
+          </a:p>
+        </p:txBody>
+      </p:sp>
+      <p:pic>
+        <p:nvPicPr>
+          <p:cNvPr id="5" name="Content Placeholder 4">
+            <a:extLst>
+              <a:ext uri="{FF2B5EF4-FFF2-40B4-BE49-F238E27FC236}">
+                <a16:creationId xmlns:a16="http://schemas.microsoft.com/office/drawing/2014/main" id="{6962AFD2-37E0-45F2-ADA2-47CC70CF365A}"/>
+              </a:ext>
+            </a:extLst>
+          </p:cNvPr>
+          <p:cNvPicPr>
+            <a:picLocks noGrp="1" noChangeAspect="1"/>
+          </p:cNvPicPr>
           <p:nvPr>
             <p:ph idx="1"/>
           </p:nvPr>
-        </p:nvSpPr>
-        <p:spPr/>
-        <p:txBody>
-          <a:bodyPr/>
-          <a:lstStyle/>
-          <a:p>
-            <a:endParaRPr lang="en-US" dirty="0"/>
-          </a:p>
-        </p:txBody>
-      </p:sp>
+        </p:nvPicPr>
+        <p:blipFill>
+          <a:blip r:embed="rId3"/>
+          <a:stretch>
+            <a:fillRect/>
+          </a:stretch>
+        </p:blipFill>
+        <p:spPr>
+          <a:xfrm>
+            <a:off x="6310636" y="1431671"/>
+            <a:ext cx="5042671" cy="2520000"/>
+          </a:xfrm>
+          <a:prstGeom prst="rect">
+            <a:avLst/>
+          </a:prstGeom>
+          <a:solidFill>
+            <a:srgbClr val="FFFFFF">
+              <a:shade val="85000"/>
+            </a:srgbClr>
+          </a:solidFill>
+          <a:ln w="88900" cap="sq">
+            <a:solidFill>
+              <a:srgbClr val="FFFFFF"/>
+            </a:solidFill>
+            <a:miter lim="800000"/>
+          </a:ln>
+          <a:effectLst>
+            <a:outerShdw blurRad="55000" dist="18000" dir="5400000" algn="tl" rotWithShape="0">
+              <a:srgbClr val="000000">
+                <a:alpha val="40000"/>
+              </a:srgbClr>
+            </a:outerShdw>
+          </a:effectLst>
+          <a:scene3d>
+            <a:camera prst="orthographicFront"/>
+            <a:lightRig rig="twoPt" dir="t">
+              <a:rot lat="0" lon="0" rev="7200000"/>
+            </a:lightRig>
+          </a:scene3d>
+          <a:sp3d>
+            <a:bevelT w="25400" h="19050"/>
+            <a:contourClr>
+              <a:srgbClr val="FFFFFF"/>
+            </a:contourClr>
+          </a:sp3d>
+        </p:spPr>
+      </p:pic>
+      <p:pic>
+        <p:nvPicPr>
+          <p:cNvPr id="7" name="Picture 6">
+            <a:extLst>
+              <a:ext uri="{FF2B5EF4-FFF2-40B4-BE49-F238E27FC236}">
+                <a16:creationId xmlns:a16="http://schemas.microsoft.com/office/drawing/2014/main" id="{86C3172D-B8CF-46B7-B6FF-EA2A993BF75B}"/>
+              </a:ext>
+            </a:extLst>
+          </p:cNvPr>
+          <p:cNvPicPr>
+            <a:picLocks noChangeAspect="1"/>
+          </p:cNvPicPr>
+          <p:nvPr/>
+        </p:nvPicPr>
+        <p:blipFill>
+          <a:blip r:embed="rId4"/>
+          <a:stretch>
+            <a:fillRect/>
+          </a:stretch>
+        </p:blipFill>
+        <p:spPr>
+          <a:xfrm>
+            <a:off x="981291" y="1431671"/>
+            <a:ext cx="5042671" cy="2520000"/>
+          </a:xfrm>
+          <a:prstGeom prst="rect">
+            <a:avLst/>
+          </a:prstGeom>
+          <a:solidFill>
+            <a:srgbClr val="FFFFFF">
+              <a:shade val="85000"/>
+            </a:srgbClr>
+          </a:solidFill>
+          <a:ln w="88900" cap="sq">
+            <a:noFill/>
+            <a:miter lim="800000"/>
+          </a:ln>
+          <a:effectLst>
+            <a:outerShdw blurRad="55000" dist="18000" dir="5400000" algn="tl" rotWithShape="0">
+              <a:srgbClr val="000000">
+                <a:alpha val="40000"/>
+              </a:srgbClr>
+            </a:outerShdw>
+          </a:effectLst>
+          <a:scene3d>
+            <a:camera prst="orthographicFront"/>
+            <a:lightRig rig="twoPt" dir="t">
+              <a:rot lat="0" lon="0" rev="7200000"/>
+            </a:lightRig>
+          </a:scene3d>
+          <a:sp3d>
+            <a:bevelT w="25400" h="19050"/>
+            <a:contourClr>
+              <a:srgbClr val="FFFFFF"/>
+            </a:contourClr>
+          </a:sp3d>
+        </p:spPr>
+      </p:pic>
+      <p:pic>
+        <p:nvPicPr>
+          <p:cNvPr id="9" name="Picture 8">
+            <a:extLst>
+              <a:ext uri="{FF2B5EF4-FFF2-40B4-BE49-F238E27FC236}">
+                <a16:creationId xmlns:a16="http://schemas.microsoft.com/office/drawing/2014/main" id="{050B8EE8-277E-49F5-A9BF-AFADB9C6BCE3}"/>
+              </a:ext>
+            </a:extLst>
+          </p:cNvPr>
+          <p:cNvPicPr>
+            <a:picLocks noChangeAspect="1"/>
+          </p:cNvPicPr>
+          <p:nvPr/>
+        </p:nvPicPr>
+        <p:blipFill>
+          <a:blip r:embed="rId5"/>
+          <a:stretch>
+            <a:fillRect/>
+          </a:stretch>
+        </p:blipFill>
+        <p:spPr>
+          <a:xfrm>
+            <a:off x="3640239" y="4085919"/>
+            <a:ext cx="5042671" cy="2520000"/>
+          </a:xfrm>
+          <a:prstGeom prst="rect">
+            <a:avLst/>
+          </a:prstGeom>
+          <a:solidFill>
+            <a:srgbClr val="FFFFFF">
+              <a:shade val="85000"/>
+            </a:srgbClr>
+          </a:solidFill>
+          <a:ln w="88900" cap="sq">
+            <a:noFill/>
+            <a:miter lim="800000"/>
+          </a:ln>
+          <a:effectLst>
+            <a:outerShdw blurRad="55000" dist="18000" dir="5400000" algn="tl" rotWithShape="0">
+              <a:srgbClr val="000000">
+                <a:alpha val="40000"/>
+              </a:srgbClr>
+            </a:outerShdw>
+          </a:effectLst>
+          <a:scene3d>
+            <a:camera prst="orthographicFront"/>
+            <a:lightRig rig="twoPt" dir="t">
+              <a:rot lat="0" lon="0" rev="7200000"/>
+            </a:lightRig>
+          </a:scene3d>
+          <a:sp3d>
+            <a:bevelT w="25400" h="19050"/>
+            <a:contourClr>
+              <a:srgbClr val="FFFFFF"/>
+            </a:contourClr>
+          </a:sp3d>
+        </p:spPr>
+      </p:pic>
     </p:spTree>
     <p:extLst>
       <p:ext uri="{BB962C8B-B14F-4D97-AF65-F5344CB8AC3E}">

</xml_diff>